<commit_message>
update for OWA mrEKF
</commit_message>
<xml_diff>
--- a/paperwork/ppt/Ting_midterm.pptx
+++ b/paperwork/ppt/Ting_midterm.pptx
@@ -570,10 +570,34 @@
           <a:bodyPr/>
           <a:lstStyle/>
           <a:p>
+            <a:pPr marL="0" marR="0" lvl="0" indent="0" defTabSz="914400" eaLnBrk="1" fontAlgn="auto" latinLnBrk="0" hangingPunct="1">
+              <a:lnSpc>
+                <a:spcPct val="100000"/>
+              </a:lnSpc>
+              <a:spcBef>
+                <a:spcPts val="0"/>
+              </a:spcBef>
+              <a:spcAft>
+                <a:spcPts val="0"/>
+              </a:spcAft>
+              <a:buClrTx/>
+              <a:buSzTx/>
+              <a:buFontTx/>
+              <a:buNone/>
+              <a:tabLst/>
+              <a:defRPr/>
+            </a:pPr>
             <a:r>
               <a:rPr lang="nl-NL" dirty="0"/>
-              <a:t>Hi everyone, my name is Yiting LI, this is my midterm presentation about my thesis, the indoor localization with multi-rate kalman filter</a:t>
-            </a:r>
+              <a:t>Hi everyone, my name is Yiting LI, this is my midterm presentation about my thesis, </a:t>
+            </a:r>
+            <a:r>
+              <a:rPr lang="en-US" altLang="zh-CN" sz="1200" dirty="0"/>
+              <a:t>Indoor Localization with Multi-Rate Extended Kalman Filtering</a:t>
+            </a:r>
+          </a:p>
+          <a:p>
+            <a:endParaRPr lang="nl-NL" dirty="0"/>
           </a:p>
         </p:txBody>
       </p:sp>
@@ -656,12 +680,6 @@
           <a:p>
             <a:endParaRPr lang="en-GB" altLang="zh-CN" dirty="0"/>
           </a:p>
-          <a:p>
-            <a:r>
-              <a:rPr lang="en-GB" altLang="zh-CN" dirty="0"/>
-              <a:t>Moreover, data missing sometime happen due to the environment light. And noise is also exists.</a:t>
-            </a:r>
-          </a:p>
         </p:txBody>
       </p:sp>
     </p:spTree>
@@ -727,14 +745,9 @@
           <a:lstStyle/>
           <a:p>
             <a:r>
-              <a:rPr lang="en-GB" dirty="0"/>
-              <a:t>The real-time information become untracked if objects are too close</a:t>
-            </a:r>
-          </a:p>
-          <a:p>
-            <a:endParaRPr lang="en-GB" dirty="0"/>
-          </a:p>
-          <a:p>
+              <a:rPr lang="en-GB" altLang="zh-CN" dirty="0"/>
+              <a:t>Moreover, data missing sometime happen due to the environment light. </a:t>
+            </a:r>
             <a:endParaRPr lang="en-GB" dirty="0"/>
           </a:p>
         </p:txBody>
@@ -803,13 +816,8 @@
           <a:p>
             <a:r>
               <a:rPr lang="en-GB" dirty="0"/>
-              <a:t>The camera noise is relatively small, so the main bias from the camera side is the </a:t>
-            </a:r>
-            <a:r>
-              <a:rPr lang="en-GB"/>
-              <a:t>merging situation.</a:t>
-            </a:r>
-            <a:endParaRPr lang="en-GB" dirty="0"/>
+              <a:t>The camera noise is relatively small, so the main bias from the camera side is the merging situation.</a:t>
+            </a:r>
           </a:p>
           <a:p>
             <a:endParaRPr lang="en-GB" dirty="0"/>
@@ -1392,7 +1400,7 @@
               <a:rPr lang="en-US" altLang="zh-CN" sz="1200" dirty="0">
                 <a:latin typeface="Arial" panose="020B0604020202020204" pitchFamily="34" charset="0"/>
               </a:rPr>
-              <a:t>covariance matrix of the block noise </a:t>
+              <a:t>covariance matrix Q(k) of the block noise </a:t>
             </a:r>
             <a:endParaRPr lang="en-GB" dirty="0"/>
           </a:p>
@@ -1400,7 +1408,10 @@
             <a:endParaRPr lang="en-GB" dirty="0"/>
           </a:p>
           <a:p>
-            <a:endParaRPr lang="en-GB" dirty="0"/>
+            <a:r>
+              <a:rPr lang="en-GB" dirty="0"/>
+              <a:t>Then we can substitute the AM and QM to the algorithm</a:t>
+            </a:r>
           </a:p>
         </p:txBody>
       </p:sp>
@@ -1653,7 +1664,15 @@
           <a:p>
             <a:r>
               <a:rPr lang="en-GB" dirty="0"/>
-              <a:t>The presentation will be given in 4 parts: </a:t>
+              <a:t>Im </a:t>
+            </a:r>
+            <a:r>
+              <a:rPr lang="en-GB" dirty="0" err="1"/>
+              <a:t>gonna</a:t>
+            </a:r>
+            <a:r>
+              <a:rPr lang="en-GB" dirty="0"/>
+              <a:t> divide the presentation into 4 parts</a:t>
             </a:r>
           </a:p>
         </p:txBody>
@@ -1818,7 +1837,7 @@
           <a:p>
             <a:r>
               <a:rPr lang="en-GB" dirty="0"/>
-              <a:t>With the OWA style, the estimation may outperform than the estimation made by cascade style, because the error from odometry will grow larger while the camera are more accurate than the odometry.</a:t>
+              <a:t>With the OWA style, the estimation may outperform than the estimation made by cascade style, because the error from odometry will grow larger while the camera are more accurate than the odometry. So the adaptive OWA operator might behave better than cascade style.</a:t>
             </a:r>
           </a:p>
           <a:p>
@@ -1996,15 +2015,7 @@
             </a:r>
             <a:r>
               <a:rPr lang="en-GB" dirty="0"/>
-              <a:t> and 10 robots were released, they are far from each other at the beginning, then 10 </a:t>
-            </a:r>
-            <a:r>
-              <a:rPr lang="en-GB" dirty="0" err="1"/>
-              <a:t>sequances</a:t>
-            </a:r>
-            <a:r>
-              <a:rPr lang="en-GB" dirty="0"/>
-              <a:t> of random termination were assigned to each robots.</a:t>
+              <a:t> and 10 robots were released, they are far from each other at the beginning, we are assuming they know their initial state, then they moving randomly</a:t>
             </a:r>
           </a:p>
           <a:p>
@@ -2013,7 +2024,7 @@
           <a:p>
             <a:r>
               <a:rPr lang="en-US" dirty="0"/>
-              <a:t>The simulation are performed in 10 rounds. </a:t>
+              <a:t>The simulation are performed in Monte Carlo style, but due to limitation only 10 rounds are performed here. </a:t>
             </a:r>
           </a:p>
           <a:p>
@@ -2389,8 +2400,65 @@
           <a:p>
             <a:r>
               <a:rPr lang="en-GB" dirty="0"/>
-              <a:t>Definitions are important. The entry point for the question is the morphology, thus the shapes of ideal hierarchy networks</a:t>
-            </a:r>
+              <a:t>The main idea of the topic is how can we make the robot localizes itself better inside the room with certain sensors. If we set the coordination and heading angle as the state vector, the problem becomes a state estimation problem.</a:t>
+            </a:r>
+          </a:p>
+          <a:p>
+            <a:endParaRPr lang="en-GB" dirty="0"/>
+          </a:p>
+          <a:p>
+            <a:r>
+              <a:rPr lang="en-GB" dirty="0"/>
+              <a:t>Meanwhile, lots of sensors are available for the state estimation task, </a:t>
+            </a:r>
+            <a:r>
+              <a:rPr lang="en-US" altLang="zh-CN" sz="1200" dirty="0">
+                <a:latin typeface="Arial" panose="020B0604020202020204" pitchFamily="34" charset="0"/>
+              </a:rPr>
+              <a:t>but information is not always trustful, those measurement sometimes is absent, or with drift or wrong reading, </a:t>
+            </a:r>
+            <a:r>
+              <a:rPr lang="en-GB" altLang="zh-CN" sz="1200" dirty="0">
+                <a:latin typeface="Arial" panose="020B0604020202020204" pitchFamily="34" charset="0"/>
+              </a:rPr>
+              <a:t>moreover</a:t>
+            </a:r>
+            <a:r>
+              <a:rPr lang="en-GB" dirty="0"/>
+              <a:t> they are coming in different rate. How can we make full use of them?</a:t>
+            </a:r>
+          </a:p>
+          <a:p>
+            <a:endParaRPr lang="en-GB" dirty="0"/>
+          </a:p>
+          <a:p>
+            <a:r>
+              <a:rPr lang="en-US" altLang="zh-CN" sz="1200" dirty="0">
+                <a:latin typeface="Arial" panose="020B0604020202020204" pitchFamily="34" charset="0"/>
+              </a:rPr>
+              <a:t>Data fusion methods such as Kalman filter have been widely applied for state estimations, Integrated information from various sources often reduces the effect of biased measurement, therefore, often enhances the estimation accuracy.</a:t>
+            </a:r>
+          </a:p>
+          <a:p>
+            <a:endParaRPr lang="en-US" altLang="zh-CN" sz="1200" dirty="0">
+              <a:latin typeface="Arial" panose="020B0604020202020204" pitchFamily="34" charset="0"/>
+            </a:endParaRPr>
+          </a:p>
+          <a:p>
+            <a:r>
+              <a:rPr lang="en-US" altLang="zh-CN" sz="1200" dirty="0">
+                <a:latin typeface="Arial" panose="020B0604020202020204" pitchFamily="34" charset="0"/>
+              </a:rPr>
+              <a:t>So the main task is to based on data fusion method to construct an indoor localization architecture with multi-rate sensors and missing or biased measurement</a:t>
+            </a:r>
+          </a:p>
+          <a:p>
+            <a:endParaRPr lang="en-US" sz="1200" dirty="0">
+              <a:latin typeface="Arial" panose="020B0604020202020204" pitchFamily="34" charset="0"/>
+            </a:endParaRPr>
+          </a:p>
+          <a:p>
+            <a:endParaRPr lang="en-GB" dirty="0"/>
           </a:p>
         </p:txBody>
       </p:sp>
@@ -2456,7 +2524,10 @@
           <a:bodyPr/>
           <a:lstStyle/>
           <a:p>
-            <a:endParaRPr lang="en-GB"/>
+            <a:r>
+              <a:rPr lang="en-GB" dirty="0"/>
+              <a:t>The next part, I will give the system model</a:t>
+            </a:r>
           </a:p>
         </p:txBody>
       </p:sp>
@@ -2547,7 +2618,24 @@
           <a:p>
             <a:r>
               <a:rPr lang="en-GB" dirty="0"/>
-              <a:t>Robots have multiple sensors, some are set on the robot such as odometry, laser scanner, other are global sensors, like GNSS, camera. </a:t>
+              <a:t>First is the multi-sensor diagram</a:t>
+            </a:r>
+          </a:p>
+          <a:p>
+            <a:endParaRPr lang="en-GB" dirty="0"/>
+          </a:p>
+          <a:p>
+            <a:r>
+              <a:rPr lang="en-GB" dirty="0"/>
+              <a:t>Robots have multiple sensors, odometry, laser scanner, or </a:t>
+            </a:r>
+            <a:r>
+              <a:rPr lang="en-GB" altLang="zh-CN" dirty="0"/>
+              <a:t>camera, </a:t>
+            </a:r>
+            <a:r>
+              <a:rPr lang="en-GB" dirty="0"/>
+              <a:t>GNSS. In this task, we have odometry and camera.</a:t>
             </a:r>
           </a:p>
           <a:p>
@@ -2564,7 +2652,15 @@
             </a:r>
             <a:r>
               <a:rPr lang="en-GB" dirty="0"/>
-              <a:t>is 1, and the period of red arrow is the camera, due to the communication, we might make it slower than </a:t>
+              <a:t>is 1, and the red arrow is the camera, due to the communication </a:t>
+            </a:r>
+            <a:r>
+              <a:rPr lang="en-GB" dirty="0" err="1"/>
+              <a:t>limiation</a:t>
+            </a:r>
+            <a:r>
+              <a:rPr lang="en-GB" dirty="0"/>
+              <a:t>, we might make it slower than </a:t>
             </a:r>
             <a:r>
               <a:rPr lang="en-GB" altLang="zh-CN" dirty="0"/>
@@ -2581,7 +2677,7 @@
           <a:p>
             <a:r>
               <a:rPr lang="en-GB" dirty="0"/>
-              <a:t>Even more, sensor’s reading might got lost, this behaviour will be modelled later.</a:t>
+              <a:t>// Even more, sensor’s reading might got lost, this behaviour will be modelled later.</a:t>
             </a:r>
           </a:p>
         </p:txBody>
@@ -2668,7 +2764,7 @@
           <a:p>
             <a:r>
               <a:rPr lang="en-GB" dirty="0"/>
-              <a:t>The w stands for the noise in state transition, which is assumed as a zero-mean white noise, and unrelated with each other. Their covariance can be measurement through multiple experiments.</a:t>
+              <a:t>The w stands for the noise in state transition, which is assumed as a zero-mean white noise, and unrelated with each other. </a:t>
             </a:r>
           </a:p>
           <a:p>
@@ -2859,7 +2955,7 @@
           <a:p>
             <a:r>
               <a:rPr lang="en-GB" dirty="0"/>
-              <a:t>The real-time measurement can be checked in the software.</a:t>
+              <a:t>All the robot are tracked successful by the camera.</a:t>
             </a:r>
           </a:p>
           <a:p>
@@ -3063,7 +3159,7 @@
                 <a:effectLst/>
                 <a:extLst>
                   <a:ext uri="{C572A759-6A51-4108-AA02-DFA0A04FC94B}">
-                    <ma14:wrappingTextBoxFlag xmlns="" xmlns:ma14="http://schemas.microsoft.com/office/mac/drawingml/2011/main" xmlns:a14="http://schemas.microsoft.com/office/drawing/2010/main" xmlns:m="http://schemas.openxmlformats.org/officeDocument/2006/math" val="1"/>
+                    <ma14:wrappingTextBoxFlag xmlns:m="http://schemas.openxmlformats.org/officeDocument/2006/math" xmlns:a14="http://schemas.microsoft.com/office/drawing/2010/main" xmlns:ma14="http://schemas.microsoft.com/office/mac/drawingml/2011/main" xmlns="" val="1"/>
                   </a:ext>
                 </a:extLst>
               </p:spPr>
@@ -3168,7 +3264,7 @@
                 <a:effectLst/>
                 <a:extLst>
                   <a:ext uri="{C572A759-6A51-4108-AA02-DFA0A04FC94B}">
-                    <ma14:wrappingTextBoxFlag xmlns="" xmlns:ma14="http://schemas.microsoft.com/office/mac/drawingml/2011/main" xmlns:a14="http://schemas.microsoft.com/office/drawing/2010/main" xmlns:m="http://schemas.openxmlformats.org/officeDocument/2006/math" val="1"/>
+                    <ma14:wrappingTextBoxFlag xmlns:m="http://schemas.openxmlformats.org/officeDocument/2006/math" xmlns:a14="http://schemas.microsoft.com/office/drawing/2010/main" xmlns:ma14="http://schemas.microsoft.com/office/mac/drawingml/2011/main" xmlns="" val="1"/>
                   </a:ext>
                 </a:extLst>
               </p:spPr>
@@ -3219,7 +3315,7 @@
               <a:effectLst/>
               <a:extLst>
                 <a:ext uri="{C572A759-6A51-4108-AA02-DFA0A04FC94B}">
-                  <ma14:wrappingTextBoxFlag xmlns="" xmlns:ma14="http://schemas.microsoft.com/office/mac/drawingml/2011/main" xmlns:a14="http://schemas.microsoft.com/office/drawing/2010/main" xmlns:m="http://schemas.openxmlformats.org/officeDocument/2006/math" val="1"/>
+                  <ma14:wrappingTextBoxFlag xmlns:m="http://schemas.openxmlformats.org/officeDocument/2006/math" xmlns:a14="http://schemas.microsoft.com/office/drawing/2010/main" xmlns:ma14="http://schemas.microsoft.com/office/mac/drawingml/2011/main" xmlns="" val="1"/>
                 </a:ext>
               </a:extLst>
             </p:spPr>
@@ -3330,7 +3426,7 @@
                 <a:effectLst/>
                 <a:extLst>
                   <a:ext uri="{C572A759-6A51-4108-AA02-DFA0A04FC94B}">
-                    <ma14:wrappingTextBoxFlag xmlns="" xmlns:ma14="http://schemas.microsoft.com/office/mac/drawingml/2011/main" xmlns:a14="http://schemas.microsoft.com/office/drawing/2010/main" xmlns:m="http://schemas.openxmlformats.org/officeDocument/2006/math" val="1"/>
+                    <ma14:wrappingTextBoxFlag xmlns:m="http://schemas.openxmlformats.org/officeDocument/2006/math" xmlns:a14="http://schemas.microsoft.com/office/drawing/2010/main" xmlns:ma14="http://schemas.microsoft.com/office/mac/drawingml/2011/main" xmlns="" val="1"/>
                   </a:ext>
                 </a:extLst>
               </p:spPr>
@@ -3381,7 +3477,7 @@
               <a:effectLst/>
               <a:extLst>
                 <a:ext uri="{C572A759-6A51-4108-AA02-DFA0A04FC94B}">
-                  <ma14:wrappingTextBoxFlag xmlns="" xmlns:ma14="http://schemas.microsoft.com/office/mac/drawingml/2011/main" xmlns:a14="http://schemas.microsoft.com/office/drawing/2010/main" xmlns:m="http://schemas.openxmlformats.org/officeDocument/2006/math" val="1"/>
+                  <ma14:wrappingTextBoxFlag xmlns:m="http://schemas.openxmlformats.org/officeDocument/2006/math" xmlns:a14="http://schemas.microsoft.com/office/drawing/2010/main" xmlns:ma14="http://schemas.microsoft.com/office/mac/drawingml/2011/main" xmlns="" val="1"/>
                 </a:ext>
               </a:extLst>
             </p:spPr>
@@ -3719,7 +3815,7 @@
                 <a:effectLst/>
                 <a:extLst>
                   <a:ext uri="{C572A759-6A51-4108-AA02-DFA0A04FC94B}">
-                    <ma14:wrappingTextBoxFlag xmlns="" xmlns:ma14="http://schemas.microsoft.com/office/mac/drawingml/2011/main" xmlns:a14="http://schemas.microsoft.com/office/drawing/2010/main" xmlns:m="http://schemas.openxmlformats.org/officeDocument/2006/math" val="1"/>
+                    <ma14:wrappingTextBoxFlag xmlns:m="http://schemas.openxmlformats.org/officeDocument/2006/math" xmlns:a14="http://schemas.microsoft.com/office/drawing/2010/main" xmlns:ma14="http://schemas.microsoft.com/office/mac/drawingml/2011/main" xmlns="" val="1"/>
                   </a:ext>
                 </a:extLst>
               </p:spPr>
@@ -5218,7 +5314,7 @@
           </a:ln>
           <a:extLst>
             <a:ext uri="{C572A759-6A51-4108-AA02-DFA0A04FC94B}">
-              <ma14:wrappingTextBoxFlag xmlns="" xmlns:ma14="http://schemas.microsoft.com/office/mac/drawingml/2011/main" xmlns:a14="http://schemas.microsoft.com/office/drawing/2010/main" xmlns:m="http://schemas.openxmlformats.org/officeDocument/2006/math" val="1"/>
+              <ma14:wrappingTextBoxFlag xmlns:m="http://schemas.openxmlformats.org/officeDocument/2006/math" xmlns:a14="http://schemas.microsoft.com/office/drawing/2010/main" xmlns:ma14="http://schemas.microsoft.com/office/mac/drawingml/2011/main" xmlns="" val="1"/>
             </a:ext>
           </a:extLst>
         </p:spPr>
@@ -5492,7 +5588,7 @@
               <a:effectLst/>
               <a:extLst>
                 <a:ext uri="{C572A759-6A51-4108-AA02-DFA0A04FC94B}">
-                  <ma14:wrappingTextBoxFlag xmlns="" xmlns:ma14="http://schemas.microsoft.com/office/mac/drawingml/2011/main" xmlns:a14="http://schemas.microsoft.com/office/drawing/2010/main" xmlns:m="http://schemas.openxmlformats.org/officeDocument/2006/math" val="1"/>
+                  <ma14:wrappingTextBoxFlag xmlns:m="http://schemas.openxmlformats.org/officeDocument/2006/math" xmlns:a14="http://schemas.microsoft.com/office/drawing/2010/main" xmlns:ma14="http://schemas.microsoft.com/office/mac/drawingml/2011/main" xmlns="" val="1"/>
                 </a:ext>
               </a:extLst>
             </p:spPr>
@@ -5597,7 +5693,7 @@
               <a:effectLst/>
               <a:extLst>
                 <a:ext uri="{C572A759-6A51-4108-AA02-DFA0A04FC94B}">
-                  <ma14:wrappingTextBoxFlag xmlns="" xmlns:ma14="http://schemas.microsoft.com/office/mac/drawingml/2011/main" xmlns:a14="http://schemas.microsoft.com/office/drawing/2010/main" xmlns:m="http://schemas.openxmlformats.org/officeDocument/2006/math" val="1"/>
+                  <ma14:wrappingTextBoxFlag xmlns:m="http://schemas.openxmlformats.org/officeDocument/2006/math" xmlns:a14="http://schemas.microsoft.com/office/drawing/2010/main" xmlns:ma14="http://schemas.microsoft.com/office/mac/drawingml/2011/main" xmlns="" val="1"/>
                 </a:ext>
               </a:extLst>
             </p:spPr>
@@ -5648,7 +5744,7 @@
             <a:effectLst/>
             <a:extLst>
               <a:ext uri="{C572A759-6A51-4108-AA02-DFA0A04FC94B}">
-                <ma14:wrappingTextBoxFlag xmlns="" xmlns:ma14="http://schemas.microsoft.com/office/mac/drawingml/2011/main" xmlns:a14="http://schemas.microsoft.com/office/drawing/2010/main" xmlns:m="http://schemas.openxmlformats.org/officeDocument/2006/math" val="1"/>
+                <ma14:wrappingTextBoxFlag xmlns:m="http://schemas.openxmlformats.org/officeDocument/2006/math" xmlns:a14="http://schemas.microsoft.com/office/drawing/2010/main" xmlns:ma14="http://schemas.microsoft.com/office/mac/drawingml/2011/main" xmlns="" val="1"/>
               </a:ext>
             </a:extLst>
           </p:spPr>
@@ -5752,7 +5848,7 @@
               <a:effectLst/>
               <a:extLst>
                 <a:ext uri="{C572A759-6A51-4108-AA02-DFA0A04FC94B}">
-                  <ma14:wrappingTextBoxFlag xmlns="" xmlns:ma14="http://schemas.microsoft.com/office/mac/drawingml/2011/main" xmlns:a14="http://schemas.microsoft.com/office/drawing/2010/main" xmlns:m="http://schemas.openxmlformats.org/officeDocument/2006/math" val="1"/>
+                  <ma14:wrappingTextBoxFlag xmlns:m="http://schemas.openxmlformats.org/officeDocument/2006/math" xmlns:a14="http://schemas.microsoft.com/office/drawing/2010/main" xmlns:ma14="http://schemas.microsoft.com/office/mac/drawingml/2011/main" xmlns="" val="1"/>
                 </a:ext>
               </a:extLst>
             </p:spPr>
@@ -5803,7 +5899,7 @@
             <a:effectLst/>
             <a:extLst>
               <a:ext uri="{C572A759-6A51-4108-AA02-DFA0A04FC94B}">
-                <ma14:wrappingTextBoxFlag xmlns="" xmlns:ma14="http://schemas.microsoft.com/office/mac/drawingml/2011/main" xmlns:a14="http://schemas.microsoft.com/office/drawing/2010/main" xmlns:m="http://schemas.openxmlformats.org/officeDocument/2006/math" val="1"/>
+                <ma14:wrappingTextBoxFlag xmlns:m="http://schemas.openxmlformats.org/officeDocument/2006/math" xmlns:a14="http://schemas.microsoft.com/office/drawing/2010/main" xmlns:ma14="http://schemas.microsoft.com/office/mac/drawingml/2011/main" xmlns="" val="1"/>
               </a:ext>
             </a:extLst>
           </p:spPr>
@@ -7349,7 +7445,7 @@
                 <a:effectLst/>
                 <a:extLst>
                   <a:ext uri="{C572A759-6A51-4108-AA02-DFA0A04FC94B}">
-                    <ma14:wrappingTextBoxFlag xmlns="" xmlns:ma14="http://schemas.microsoft.com/office/mac/drawingml/2011/main" xmlns:a14="http://schemas.microsoft.com/office/drawing/2010/main" xmlns:m="http://schemas.openxmlformats.org/officeDocument/2006/math" val="1"/>
+                    <ma14:wrappingTextBoxFlag xmlns:m="http://schemas.openxmlformats.org/officeDocument/2006/math" xmlns:a14="http://schemas.microsoft.com/office/drawing/2010/main" xmlns:ma14="http://schemas.microsoft.com/office/mac/drawingml/2011/main" xmlns="" val="1"/>
                   </a:ext>
                 </a:extLst>
               </p:spPr>
@@ -7454,7 +7550,7 @@
                 <a:effectLst/>
                 <a:extLst>
                   <a:ext uri="{C572A759-6A51-4108-AA02-DFA0A04FC94B}">
-                    <ma14:wrappingTextBoxFlag xmlns="" xmlns:ma14="http://schemas.microsoft.com/office/mac/drawingml/2011/main" xmlns:a14="http://schemas.microsoft.com/office/drawing/2010/main" xmlns:m="http://schemas.openxmlformats.org/officeDocument/2006/math" val="1"/>
+                    <ma14:wrappingTextBoxFlag xmlns:m="http://schemas.openxmlformats.org/officeDocument/2006/math" xmlns:a14="http://schemas.microsoft.com/office/drawing/2010/main" xmlns:ma14="http://schemas.microsoft.com/office/mac/drawingml/2011/main" xmlns="" val="1"/>
                   </a:ext>
                 </a:extLst>
               </p:spPr>
@@ -7505,7 +7601,7 @@
               <a:effectLst/>
               <a:extLst>
                 <a:ext uri="{C572A759-6A51-4108-AA02-DFA0A04FC94B}">
-                  <ma14:wrappingTextBoxFlag xmlns="" xmlns:ma14="http://schemas.microsoft.com/office/mac/drawingml/2011/main" xmlns:a14="http://schemas.microsoft.com/office/drawing/2010/main" xmlns:m="http://schemas.openxmlformats.org/officeDocument/2006/math" val="1"/>
+                  <ma14:wrappingTextBoxFlag xmlns:m="http://schemas.openxmlformats.org/officeDocument/2006/math" xmlns:a14="http://schemas.microsoft.com/office/drawing/2010/main" xmlns:ma14="http://schemas.microsoft.com/office/mac/drawingml/2011/main" xmlns="" val="1"/>
                 </a:ext>
               </a:extLst>
             </p:spPr>
@@ -7616,7 +7712,7 @@
                 <a:effectLst/>
                 <a:extLst>
                   <a:ext uri="{C572A759-6A51-4108-AA02-DFA0A04FC94B}">
-                    <ma14:wrappingTextBoxFlag xmlns="" xmlns:ma14="http://schemas.microsoft.com/office/mac/drawingml/2011/main" xmlns:a14="http://schemas.microsoft.com/office/drawing/2010/main" xmlns:m="http://schemas.openxmlformats.org/officeDocument/2006/math" val="1"/>
+                    <ma14:wrappingTextBoxFlag xmlns:m="http://schemas.openxmlformats.org/officeDocument/2006/math" xmlns:a14="http://schemas.microsoft.com/office/drawing/2010/main" xmlns:ma14="http://schemas.microsoft.com/office/mac/drawingml/2011/main" xmlns="" val="1"/>
                   </a:ext>
                 </a:extLst>
               </p:spPr>
@@ -7667,7 +7763,7 @@
               <a:effectLst/>
               <a:extLst>
                 <a:ext uri="{C572A759-6A51-4108-AA02-DFA0A04FC94B}">
-                  <ma14:wrappingTextBoxFlag xmlns="" xmlns:ma14="http://schemas.microsoft.com/office/mac/drawingml/2011/main" xmlns:a14="http://schemas.microsoft.com/office/drawing/2010/main" xmlns:m="http://schemas.openxmlformats.org/officeDocument/2006/math" val="1"/>
+                  <ma14:wrappingTextBoxFlag xmlns:m="http://schemas.openxmlformats.org/officeDocument/2006/math" xmlns:a14="http://schemas.microsoft.com/office/drawing/2010/main" xmlns:ma14="http://schemas.microsoft.com/office/mac/drawingml/2011/main" xmlns="" val="1"/>
                 </a:ext>
               </a:extLst>
             </p:spPr>
@@ -8005,7 +8101,7 @@
                 <a:effectLst/>
                 <a:extLst>
                   <a:ext uri="{C572A759-6A51-4108-AA02-DFA0A04FC94B}">
-                    <ma14:wrappingTextBoxFlag xmlns="" xmlns:ma14="http://schemas.microsoft.com/office/mac/drawingml/2011/main" xmlns:a14="http://schemas.microsoft.com/office/drawing/2010/main" xmlns:m="http://schemas.openxmlformats.org/officeDocument/2006/math" val="1"/>
+                    <ma14:wrappingTextBoxFlag xmlns:m="http://schemas.openxmlformats.org/officeDocument/2006/math" xmlns:a14="http://schemas.microsoft.com/office/drawing/2010/main" xmlns:ma14="http://schemas.microsoft.com/office/mac/drawingml/2011/main" xmlns="" val="1"/>
                   </a:ext>
                 </a:extLst>
               </p:spPr>
@@ -11696,7 +11792,7 @@
           </a:ln>
           <a:extLst>
             <a:ext uri="{C572A759-6A51-4108-AA02-DFA0A04FC94B}">
-              <ma14:wrappingTextBoxFlag xmlns:ma14="http://schemas.microsoft.com/office/mac/drawingml/2011/main" xmlns:a14="http://schemas.microsoft.com/office/drawing/2010/main" xmlns:m="http://schemas.openxmlformats.org/officeDocument/2006/math" xmlns="" val="1"/>
+              <ma14:wrappingTextBoxFlag xmlns="" xmlns:m="http://schemas.openxmlformats.org/officeDocument/2006/math" xmlns:a14="http://schemas.microsoft.com/office/drawing/2010/main" xmlns:ma14="http://schemas.microsoft.com/office/mac/drawingml/2011/main" val="1"/>
             </a:ext>
           </a:extLst>
         </p:spPr>
@@ -13583,7 +13679,7 @@
           </a:ln>
           <a:extLst>
             <a:ext uri="{C572A759-6A51-4108-AA02-DFA0A04FC94B}">
-              <ma14:wrappingTextBoxFlag xmlns="" xmlns:ma14="http://schemas.microsoft.com/office/mac/drawingml/2011/main" xmlns:a14="http://schemas.microsoft.com/office/drawing/2010/main" xmlns:m="http://schemas.openxmlformats.org/officeDocument/2006/math" val="1"/>
+              <ma14:wrappingTextBoxFlag xmlns:m="http://schemas.openxmlformats.org/officeDocument/2006/math" xmlns:a14="http://schemas.microsoft.com/office/drawing/2010/main" xmlns:ma14="http://schemas.microsoft.com/office/mac/drawingml/2011/main" xmlns="" val="1"/>
             </a:ext>
           </a:extLst>
         </p:spPr>
@@ -13620,7 +13716,7 @@
           </a:ln>
           <a:extLst>
             <a:ext uri="{C572A759-6A51-4108-AA02-DFA0A04FC94B}">
-              <ma14:wrappingTextBoxFlag xmlns="" xmlns:ma14="http://schemas.microsoft.com/office/mac/drawingml/2011/main" xmlns:a14="http://schemas.microsoft.com/office/drawing/2010/main" xmlns:m="http://schemas.openxmlformats.org/officeDocument/2006/math" val="1"/>
+              <ma14:wrappingTextBoxFlag xmlns:m="http://schemas.openxmlformats.org/officeDocument/2006/math" xmlns:a14="http://schemas.microsoft.com/office/drawing/2010/main" xmlns:ma14="http://schemas.microsoft.com/office/mac/drawingml/2011/main" xmlns="" val="1"/>
             </a:ext>
           </a:extLst>
         </p:spPr>
@@ -14582,7 +14678,7 @@
           </a:prstGeom>
           <a:extLst>
             <a:ext uri="{C572A759-6A51-4108-AA02-DFA0A04FC94B}">
-              <ma14:wrappingTextBoxFlag xmlns="" xmlns:m="http://schemas.openxmlformats.org/officeDocument/2006/math" xmlns:a14="http://schemas.microsoft.com/office/drawing/2010/main" xmlns:ma14="http://schemas.microsoft.com/office/mac/drawingml/2011/main" val="1"/>
+              <ma14:wrappingTextBoxFlag xmlns:ma14="http://schemas.microsoft.com/office/mac/drawingml/2011/main" xmlns:a14="http://schemas.microsoft.com/office/drawing/2010/main" xmlns:m="http://schemas.openxmlformats.org/officeDocument/2006/math" xmlns="" val="1"/>
             </a:ext>
           </a:extLst>
         </p:spPr>
@@ -14618,7 +14714,7 @@
           </a:prstGeom>
           <a:extLst>
             <a:ext uri="{C572A759-6A51-4108-AA02-DFA0A04FC94B}">
-              <ma14:wrappingTextBoxFlag xmlns="" xmlns:m="http://schemas.openxmlformats.org/officeDocument/2006/math" xmlns:a14="http://schemas.microsoft.com/office/drawing/2010/main" xmlns:ma14="http://schemas.microsoft.com/office/mac/drawingml/2011/main" val="1"/>
+              <ma14:wrappingTextBoxFlag xmlns:ma14="http://schemas.microsoft.com/office/mac/drawingml/2011/main" xmlns:a14="http://schemas.microsoft.com/office/drawing/2010/main" xmlns:m="http://schemas.openxmlformats.org/officeDocument/2006/math" xmlns="" val="1"/>
             </a:ext>
           </a:extLst>
         </p:spPr>
@@ -15014,146 +15110,6 @@
     <a:masterClrMapping/>
   </p:clrMapOvr>
   <p:transition spd="med"/>
-  <p:timing>
-    <p:tnLst>
-      <p:par>
-        <p:cTn id="1" dur="indefinite" restart="never" nodeType="tmRoot">
-          <p:childTnLst>
-            <p:seq concurrent="1" nextAc="seek">
-              <p:cTn id="2" dur="indefinite" nodeType="mainSeq">
-                <p:childTnLst>
-                  <p:par>
-                    <p:cTn id="3" fill="hold">
-                      <p:stCondLst>
-                        <p:cond delay="indefinite"/>
-                      </p:stCondLst>
-                      <p:childTnLst>
-                        <p:par>
-                          <p:cTn id="4" fill="hold">
-                            <p:stCondLst>
-                              <p:cond delay="0"/>
-                            </p:stCondLst>
-                            <p:childTnLst>
-                              <p:par>
-                                <p:cTn id="5" presetID="1" presetClass="entr" presetSubtype="0" fill="hold" grpId="0" nodeType="clickEffect">
-                                  <p:stCondLst>
-                                    <p:cond delay="0"/>
-                                  </p:stCondLst>
-                                  <p:childTnLst>
-                                    <p:set>
-                                      <p:cBhvr>
-                                        <p:cTn id="6" dur="1" fill="hold">
-                                          <p:stCondLst>
-                                            <p:cond delay="0"/>
-                                          </p:stCondLst>
-                                        </p:cTn>
-                                        <p:tgtEl>
-                                          <p:spTgt spid="2"/>
-                                        </p:tgtEl>
-                                        <p:attrNameLst>
-                                          <p:attrName>style.visibility</p:attrName>
-                                        </p:attrNameLst>
-                                      </p:cBhvr>
-                                      <p:to>
-                                        <p:strVal val="visible"/>
-                                      </p:to>
-                                    </p:set>
-                                  </p:childTnLst>
-                                </p:cTn>
-                              </p:par>
-                            </p:childTnLst>
-                          </p:cTn>
-                        </p:par>
-                      </p:childTnLst>
-                    </p:cTn>
-                  </p:par>
-                  <p:par>
-                    <p:cTn id="7" fill="hold">
-                      <p:stCondLst>
-                        <p:cond delay="indefinite"/>
-                      </p:stCondLst>
-                      <p:childTnLst>
-                        <p:par>
-                          <p:cTn id="8" fill="hold">
-                            <p:stCondLst>
-                              <p:cond delay="0"/>
-                            </p:stCondLst>
-                            <p:childTnLst>
-                              <p:par>
-                                <p:cTn id="9" presetID="10" presetClass="entr" presetSubtype="0" fill="hold" grpId="0" nodeType="clickEffect">
-                                  <p:stCondLst>
-                                    <p:cond delay="0"/>
-                                  </p:stCondLst>
-                                  <p:childTnLst>
-                                    <p:set>
-                                      <p:cBhvr>
-                                        <p:cTn id="10" dur="1" fill="hold">
-                                          <p:stCondLst>
-                                            <p:cond delay="0"/>
-                                          </p:stCondLst>
-                                        </p:cTn>
-                                        <p:tgtEl>
-                                          <p:spTgt spid="3">
-                                            <p:txEl>
-                                              <p:pRg st="0" end="0"/>
-                                            </p:txEl>
-                                          </p:spTgt>
-                                        </p:tgtEl>
-                                        <p:attrNameLst>
-                                          <p:attrName>style.visibility</p:attrName>
-                                        </p:attrNameLst>
-                                      </p:cBhvr>
-                                      <p:to>
-                                        <p:strVal val="visible"/>
-                                      </p:to>
-                                    </p:set>
-                                    <p:animEffect transition="in" filter="fade">
-                                      <p:cBhvr>
-                                        <p:cTn id="11" dur="500"/>
-                                        <p:tgtEl>
-                                          <p:spTgt spid="3">
-                                            <p:txEl>
-                                              <p:pRg st="0" end="0"/>
-                                            </p:txEl>
-                                          </p:spTgt>
-                                        </p:tgtEl>
-                                      </p:cBhvr>
-                                    </p:animEffect>
-                                  </p:childTnLst>
-                                </p:cTn>
-                              </p:par>
-                            </p:childTnLst>
-                          </p:cTn>
-                        </p:par>
-                      </p:childTnLst>
-                    </p:cTn>
-                  </p:par>
-                </p:childTnLst>
-              </p:cTn>
-              <p:prevCondLst>
-                <p:cond evt="onPrev" delay="0">
-                  <p:tgtEl>
-                    <p:sldTgt/>
-                  </p:tgtEl>
-                </p:cond>
-              </p:prevCondLst>
-              <p:nextCondLst>
-                <p:cond evt="onNext" delay="0">
-                  <p:tgtEl>
-                    <p:sldTgt/>
-                  </p:tgtEl>
-                </p:cond>
-              </p:nextCondLst>
-            </p:seq>
-          </p:childTnLst>
-        </p:cTn>
-      </p:par>
-    </p:tnLst>
-    <p:bldLst>
-      <p:bldP spid="2" grpId="0" animBg="1"/>
-      <p:bldP spid="3" grpId="0" uiExpand="1" build="p"/>
-    </p:bldLst>
-  </p:timing>
 </p:sld>
 </file>
 
@@ -15481,146 +15437,6 @@
     <a:masterClrMapping/>
   </p:clrMapOvr>
   <p:transition spd="med"/>
-  <p:timing>
-    <p:tnLst>
-      <p:par>
-        <p:cTn id="1" dur="indefinite" restart="never" nodeType="tmRoot">
-          <p:childTnLst>
-            <p:seq concurrent="1" nextAc="seek">
-              <p:cTn id="2" dur="indefinite" nodeType="mainSeq">
-                <p:childTnLst>
-                  <p:par>
-                    <p:cTn id="3" fill="hold">
-                      <p:stCondLst>
-                        <p:cond delay="indefinite"/>
-                      </p:stCondLst>
-                      <p:childTnLst>
-                        <p:par>
-                          <p:cTn id="4" fill="hold">
-                            <p:stCondLst>
-                              <p:cond delay="0"/>
-                            </p:stCondLst>
-                            <p:childTnLst>
-                              <p:par>
-                                <p:cTn id="5" presetID="1" presetClass="entr" presetSubtype="0" fill="hold" grpId="0" nodeType="clickEffect">
-                                  <p:stCondLst>
-                                    <p:cond delay="0"/>
-                                  </p:stCondLst>
-                                  <p:childTnLst>
-                                    <p:set>
-                                      <p:cBhvr>
-                                        <p:cTn id="6" dur="1" fill="hold">
-                                          <p:stCondLst>
-                                            <p:cond delay="0"/>
-                                          </p:stCondLst>
-                                        </p:cTn>
-                                        <p:tgtEl>
-                                          <p:spTgt spid="2"/>
-                                        </p:tgtEl>
-                                        <p:attrNameLst>
-                                          <p:attrName>style.visibility</p:attrName>
-                                        </p:attrNameLst>
-                                      </p:cBhvr>
-                                      <p:to>
-                                        <p:strVal val="visible"/>
-                                      </p:to>
-                                    </p:set>
-                                  </p:childTnLst>
-                                </p:cTn>
-                              </p:par>
-                            </p:childTnLst>
-                          </p:cTn>
-                        </p:par>
-                      </p:childTnLst>
-                    </p:cTn>
-                  </p:par>
-                  <p:par>
-                    <p:cTn id="7" fill="hold">
-                      <p:stCondLst>
-                        <p:cond delay="indefinite"/>
-                      </p:stCondLst>
-                      <p:childTnLst>
-                        <p:par>
-                          <p:cTn id="8" fill="hold">
-                            <p:stCondLst>
-                              <p:cond delay="0"/>
-                            </p:stCondLst>
-                            <p:childTnLst>
-                              <p:par>
-                                <p:cTn id="9" presetID="10" presetClass="entr" presetSubtype="0" fill="hold" grpId="0" nodeType="clickEffect">
-                                  <p:stCondLst>
-                                    <p:cond delay="0"/>
-                                  </p:stCondLst>
-                                  <p:childTnLst>
-                                    <p:set>
-                                      <p:cBhvr>
-                                        <p:cTn id="10" dur="1" fill="hold">
-                                          <p:stCondLst>
-                                            <p:cond delay="0"/>
-                                          </p:stCondLst>
-                                        </p:cTn>
-                                        <p:tgtEl>
-                                          <p:spTgt spid="3">
-                                            <p:txEl>
-                                              <p:pRg st="0" end="0"/>
-                                            </p:txEl>
-                                          </p:spTgt>
-                                        </p:tgtEl>
-                                        <p:attrNameLst>
-                                          <p:attrName>style.visibility</p:attrName>
-                                        </p:attrNameLst>
-                                      </p:cBhvr>
-                                      <p:to>
-                                        <p:strVal val="visible"/>
-                                      </p:to>
-                                    </p:set>
-                                    <p:animEffect transition="in" filter="fade">
-                                      <p:cBhvr>
-                                        <p:cTn id="11" dur="500"/>
-                                        <p:tgtEl>
-                                          <p:spTgt spid="3">
-                                            <p:txEl>
-                                              <p:pRg st="0" end="0"/>
-                                            </p:txEl>
-                                          </p:spTgt>
-                                        </p:tgtEl>
-                                      </p:cBhvr>
-                                    </p:animEffect>
-                                  </p:childTnLst>
-                                </p:cTn>
-                              </p:par>
-                            </p:childTnLst>
-                          </p:cTn>
-                        </p:par>
-                      </p:childTnLst>
-                    </p:cTn>
-                  </p:par>
-                </p:childTnLst>
-              </p:cTn>
-              <p:prevCondLst>
-                <p:cond evt="onPrev" delay="0">
-                  <p:tgtEl>
-                    <p:sldTgt/>
-                  </p:tgtEl>
-                </p:cond>
-              </p:prevCondLst>
-              <p:nextCondLst>
-                <p:cond evt="onNext" delay="0">
-                  <p:tgtEl>
-                    <p:sldTgt/>
-                  </p:tgtEl>
-                </p:cond>
-              </p:nextCondLst>
-            </p:seq>
-          </p:childTnLst>
-        </p:cTn>
-      </p:par>
-    </p:tnLst>
-    <p:bldLst>
-      <p:bldP spid="2" grpId="0" animBg="1"/>
-      <p:bldP spid="3" grpId="0" uiExpand="1" build="p"/>
-    </p:bldLst>
-  </p:timing>
 </p:sld>
 </file>
 
@@ -15737,6 +15553,42 @@
           </a:p>
         </p:txBody>
       </p:sp>
+      <p:pic>
+        <p:nvPicPr>
+          <p:cNvPr id="7" name="图片 6" descr="图表, 散点图&#10;&#10;描述已自动生成">
+            <a:extLst>
+              <a:ext uri="{FF2B5EF4-FFF2-40B4-BE49-F238E27FC236}">
+                <a16:creationId xmlns:a16="http://schemas.microsoft.com/office/drawing/2014/main" id="{BE3CBE87-4084-C781-DE4A-DB8638EC54D0}"/>
+              </a:ext>
+            </a:extLst>
+          </p:cNvPr>
+          <p:cNvPicPr>
+            <a:picLocks noChangeAspect="1"/>
+          </p:cNvPicPr>
+          <p:nvPr/>
+        </p:nvPicPr>
+        <p:blipFill>
+          <a:blip r:embed="rId3">
+            <a:extLst>
+              <a:ext uri="{28A0092B-C50C-407E-A947-70E740481C1C}">
+                <a14:useLocalDpi xmlns:a14="http://schemas.microsoft.com/office/drawing/2010/main" val="0"/>
+              </a:ext>
+            </a:extLst>
+          </a:blip>
+          <a:stretch>
+            <a:fillRect/>
+          </a:stretch>
+        </p:blipFill>
+        <p:spPr>
+          <a:xfrm>
+            <a:off x="2438857" y="686143"/>
+            <a:ext cx="7314286" cy="5485714"/>
+          </a:xfrm>
+          <a:prstGeom prst="rect">
+            <a:avLst/>
+          </a:prstGeom>
+        </p:spPr>
+      </p:pic>
     </p:spTree>
     <p:extLst>
       <p:ext uri="{BB962C8B-B14F-4D97-AF65-F5344CB8AC3E}">
@@ -15748,146 +15600,6 @@
     <a:masterClrMapping/>
   </p:clrMapOvr>
   <p:transition spd="med"/>
-  <p:timing>
-    <p:tnLst>
-      <p:par>
-        <p:cTn id="1" dur="indefinite" restart="never" nodeType="tmRoot">
-          <p:childTnLst>
-            <p:seq concurrent="1" nextAc="seek">
-              <p:cTn id="2" dur="indefinite" nodeType="mainSeq">
-                <p:childTnLst>
-                  <p:par>
-                    <p:cTn id="3" fill="hold">
-                      <p:stCondLst>
-                        <p:cond delay="indefinite"/>
-                      </p:stCondLst>
-                      <p:childTnLst>
-                        <p:par>
-                          <p:cTn id="4" fill="hold">
-                            <p:stCondLst>
-                              <p:cond delay="0"/>
-                            </p:stCondLst>
-                            <p:childTnLst>
-                              <p:par>
-                                <p:cTn id="5" presetID="1" presetClass="entr" presetSubtype="0" fill="hold" grpId="0" nodeType="clickEffect">
-                                  <p:stCondLst>
-                                    <p:cond delay="0"/>
-                                  </p:stCondLst>
-                                  <p:childTnLst>
-                                    <p:set>
-                                      <p:cBhvr>
-                                        <p:cTn id="6" dur="1" fill="hold">
-                                          <p:stCondLst>
-                                            <p:cond delay="0"/>
-                                          </p:stCondLst>
-                                        </p:cTn>
-                                        <p:tgtEl>
-                                          <p:spTgt spid="2"/>
-                                        </p:tgtEl>
-                                        <p:attrNameLst>
-                                          <p:attrName>style.visibility</p:attrName>
-                                        </p:attrNameLst>
-                                      </p:cBhvr>
-                                      <p:to>
-                                        <p:strVal val="visible"/>
-                                      </p:to>
-                                    </p:set>
-                                  </p:childTnLst>
-                                </p:cTn>
-                              </p:par>
-                            </p:childTnLst>
-                          </p:cTn>
-                        </p:par>
-                      </p:childTnLst>
-                    </p:cTn>
-                  </p:par>
-                  <p:par>
-                    <p:cTn id="7" fill="hold">
-                      <p:stCondLst>
-                        <p:cond delay="indefinite"/>
-                      </p:stCondLst>
-                      <p:childTnLst>
-                        <p:par>
-                          <p:cTn id="8" fill="hold">
-                            <p:stCondLst>
-                              <p:cond delay="0"/>
-                            </p:stCondLst>
-                            <p:childTnLst>
-                              <p:par>
-                                <p:cTn id="9" presetID="10" presetClass="entr" presetSubtype="0" fill="hold" grpId="0" nodeType="clickEffect">
-                                  <p:stCondLst>
-                                    <p:cond delay="0"/>
-                                  </p:stCondLst>
-                                  <p:childTnLst>
-                                    <p:set>
-                                      <p:cBhvr>
-                                        <p:cTn id="10" dur="1" fill="hold">
-                                          <p:stCondLst>
-                                            <p:cond delay="0"/>
-                                          </p:stCondLst>
-                                        </p:cTn>
-                                        <p:tgtEl>
-                                          <p:spTgt spid="3">
-                                            <p:txEl>
-                                              <p:pRg st="0" end="0"/>
-                                            </p:txEl>
-                                          </p:spTgt>
-                                        </p:tgtEl>
-                                        <p:attrNameLst>
-                                          <p:attrName>style.visibility</p:attrName>
-                                        </p:attrNameLst>
-                                      </p:cBhvr>
-                                      <p:to>
-                                        <p:strVal val="visible"/>
-                                      </p:to>
-                                    </p:set>
-                                    <p:animEffect transition="in" filter="fade">
-                                      <p:cBhvr>
-                                        <p:cTn id="11" dur="500"/>
-                                        <p:tgtEl>
-                                          <p:spTgt spid="3">
-                                            <p:txEl>
-                                              <p:pRg st="0" end="0"/>
-                                            </p:txEl>
-                                          </p:spTgt>
-                                        </p:tgtEl>
-                                      </p:cBhvr>
-                                    </p:animEffect>
-                                  </p:childTnLst>
-                                </p:cTn>
-                              </p:par>
-                            </p:childTnLst>
-                          </p:cTn>
-                        </p:par>
-                      </p:childTnLst>
-                    </p:cTn>
-                  </p:par>
-                </p:childTnLst>
-              </p:cTn>
-              <p:prevCondLst>
-                <p:cond evt="onPrev" delay="0">
-                  <p:tgtEl>
-                    <p:sldTgt/>
-                  </p:tgtEl>
-                </p:cond>
-              </p:prevCondLst>
-              <p:nextCondLst>
-                <p:cond evt="onNext" delay="0">
-                  <p:tgtEl>
-                    <p:sldTgt/>
-                  </p:tgtEl>
-                </p:cond>
-              </p:nextCondLst>
-            </p:seq>
-          </p:childTnLst>
-        </p:cTn>
-      </p:par>
-    </p:tnLst>
-    <p:bldLst>
-      <p:bldP spid="2" grpId="0" animBg="1"/>
-      <p:bldP spid="3" grpId="0" uiExpand="1" build="p"/>
-    </p:bldLst>
-  </p:timing>
 </p:sld>
 </file>
 
@@ -16058,7 +15770,7 @@
           </a:ln>
           <a:extLst>
             <a:ext uri="{C572A759-6A51-4108-AA02-DFA0A04FC94B}">
-              <ma14:wrappingTextBoxFlag xmlns="" xmlns:ma14="http://schemas.microsoft.com/office/mac/drawingml/2011/main" xmlns:a14="http://schemas.microsoft.com/office/drawing/2010/main" xmlns:m="http://schemas.openxmlformats.org/officeDocument/2006/math" val="1"/>
+              <ma14:wrappingTextBoxFlag xmlns:m="http://schemas.openxmlformats.org/officeDocument/2006/math" xmlns:a14="http://schemas.microsoft.com/office/drawing/2010/main" xmlns:ma14="http://schemas.microsoft.com/office/mac/drawingml/2011/main" xmlns="" val="1"/>
             </a:ext>
           </a:extLst>
         </p:spPr>
@@ -16387,208 +16099,6 @@
     <a:masterClrMapping/>
   </p:clrMapOvr>
   <p:transition spd="med"/>
-  <p:timing>
-    <p:tnLst>
-      <p:par>
-        <p:cTn id="1" dur="indefinite" restart="never" nodeType="tmRoot">
-          <p:childTnLst>
-            <p:seq concurrent="1" nextAc="seek">
-              <p:cTn id="2" dur="indefinite" nodeType="mainSeq">
-                <p:childTnLst>
-                  <p:par>
-                    <p:cTn id="3" fill="hold">
-                      <p:stCondLst>
-                        <p:cond delay="indefinite"/>
-                      </p:stCondLst>
-                      <p:childTnLst>
-                        <p:par>
-                          <p:cTn id="4" fill="hold">
-                            <p:stCondLst>
-                              <p:cond delay="0"/>
-                            </p:stCondLst>
-                            <p:childTnLst>
-                              <p:par>
-                                <p:cTn id="5" presetID="1" presetClass="entr" presetSubtype="0" fill="hold" grpId="0" nodeType="clickEffect">
-                                  <p:stCondLst>
-                                    <p:cond delay="0"/>
-                                  </p:stCondLst>
-                                  <p:childTnLst>
-                                    <p:set>
-                                      <p:cBhvr>
-                                        <p:cTn id="6" dur="1" fill="hold">
-                                          <p:stCondLst>
-                                            <p:cond delay="0"/>
-                                          </p:stCondLst>
-                                        </p:cTn>
-                                        <p:tgtEl>
-                                          <p:spTgt spid="2"/>
-                                        </p:tgtEl>
-                                        <p:attrNameLst>
-                                          <p:attrName>style.visibility</p:attrName>
-                                        </p:attrNameLst>
-                                      </p:cBhvr>
-                                      <p:to>
-                                        <p:strVal val="visible"/>
-                                      </p:to>
-                                    </p:set>
-                                  </p:childTnLst>
-                                </p:cTn>
-                              </p:par>
-                            </p:childTnLst>
-                          </p:cTn>
-                        </p:par>
-                      </p:childTnLst>
-                    </p:cTn>
-                  </p:par>
-                  <p:par>
-                    <p:cTn id="7" fill="hold">
-                      <p:stCondLst>
-                        <p:cond delay="indefinite"/>
-                      </p:stCondLst>
-                      <p:childTnLst>
-                        <p:par>
-                          <p:cTn id="8" fill="hold">
-                            <p:stCondLst>
-                              <p:cond delay="0"/>
-                            </p:stCondLst>
-                            <p:childTnLst>
-                              <p:par>
-                                <p:cTn id="9" presetID="10" presetClass="entr" presetSubtype="0" fill="hold" grpId="0" nodeType="clickEffect">
-                                  <p:stCondLst>
-                                    <p:cond delay="0"/>
-                                  </p:stCondLst>
-                                  <p:childTnLst>
-                                    <p:set>
-                                      <p:cBhvr>
-                                        <p:cTn id="10" dur="1" fill="hold">
-                                          <p:stCondLst>
-                                            <p:cond delay="0"/>
-                                          </p:stCondLst>
-                                        </p:cTn>
-                                        <p:tgtEl>
-                                          <p:spTgt spid="3">
-                                            <p:txEl>
-                                              <p:pRg st="0" end="0"/>
-                                            </p:txEl>
-                                          </p:spTgt>
-                                        </p:tgtEl>
-                                        <p:attrNameLst>
-                                          <p:attrName>style.visibility</p:attrName>
-                                        </p:attrNameLst>
-                                      </p:cBhvr>
-                                      <p:to>
-                                        <p:strVal val="visible"/>
-                                      </p:to>
-                                    </p:set>
-                                    <p:animEffect transition="in" filter="fade">
-                                      <p:cBhvr>
-                                        <p:cTn id="11" dur="500"/>
-                                        <p:tgtEl>
-                                          <p:spTgt spid="3">
-                                            <p:txEl>
-                                              <p:pRg st="0" end="0"/>
-                                            </p:txEl>
-                                          </p:spTgt>
-                                        </p:tgtEl>
-                                      </p:cBhvr>
-                                    </p:animEffect>
-                                  </p:childTnLst>
-                                </p:cTn>
-                              </p:par>
-                            </p:childTnLst>
-                          </p:cTn>
-                        </p:par>
-                      </p:childTnLst>
-                    </p:cTn>
-                  </p:par>
-                  <p:par>
-                    <p:cTn id="12" fill="hold">
-                      <p:stCondLst>
-                        <p:cond delay="indefinite"/>
-                      </p:stCondLst>
-                      <p:childTnLst>
-                        <p:par>
-                          <p:cTn id="13" fill="hold">
-                            <p:stCondLst>
-                              <p:cond delay="0"/>
-                            </p:stCondLst>
-                            <p:childTnLst>
-                              <p:par>
-                                <p:cTn id="14" presetID="10" presetClass="entr" presetSubtype="0" fill="hold" grpId="0" nodeType="clickEffect">
-                                  <p:stCondLst>
-                                    <p:cond delay="0"/>
-                                  </p:stCondLst>
-                                  <p:childTnLst>
-                                    <p:set>
-                                      <p:cBhvr>
-                                        <p:cTn id="15" dur="1" fill="hold">
-                                          <p:stCondLst>
-                                            <p:cond delay="0"/>
-                                          </p:stCondLst>
-                                        </p:cTn>
-                                        <p:tgtEl>
-                                          <p:spTgt spid="4">
-                                            <p:txEl>
-                                              <p:pRg st="0" end="0"/>
-                                            </p:txEl>
-                                          </p:spTgt>
-                                        </p:tgtEl>
-                                        <p:attrNameLst>
-                                          <p:attrName>style.visibility</p:attrName>
-                                        </p:attrNameLst>
-                                      </p:cBhvr>
-                                      <p:to>
-                                        <p:strVal val="visible"/>
-                                      </p:to>
-                                    </p:set>
-                                    <p:animEffect transition="in" filter="fade">
-                                      <p:cBhvr>
-                                        <p:cTn id="16" dur="500"/>
-                                        <p:tgtEl>
-                                          <p:spTgt spid="4">
-                                            <p:txEl>
-                                              <p:pRg st="0" end="0"/>
-                                            </p:txEl>
-                                          </p:spTgt>
-                                        </p:tgtEl>
-                                      </p:cBhvr>
-                                    </p:animEffect>
-                                  </p:childTnLst>
-                                </p:cTn>
-                              </p:par>
-                            </p:childTnLst>
-                          </p:cTn>
-                        </p:par>
-                      </p:childTnLst>
-                    </p:cTn>
-                  </p:par>
-                </p:childTnLst>
-              </p:cTn>
-              <p:prevCondLst>
-                <p:cond evt="onPrev" delay="0">
-                  <p:tgtEl>
-                    <p:sldTgt/>
-                  </p:tgtEl>
-                </p:cond>
-              </p:prevCondLst>
-              <p:nextCondLst>
-                <p:cond evt="onNext" delay="0">
-                  <p:tgtEl>
-                    <p:sldTgt/>
-                  </p:tgtEl>
-                </p:cond>
-              </p:nextCondLst>
-            </p:seq>
-          </p:childTnLst>
-        </p:cTn>
-      </p:par>
-    </p:tnLst>
-    <p:bldLst>
-      <p:bldP spid="2" grpId="0" animBg="1"/>
-      <p:bldP spid="3" grpId="0" uiExpand="1" build="p"/>
-      <p:bldP spid="4" grpId="0" uiExpand="1" build="p"/>
-    </p:bldLst>
-  </p:timing>
 </p:sld>
 </file>
 
@@ -16840,84 +16350,6 @@
     <a:masterClrMapping/>
   </p:clrMapOvr>
   <p:transition spd="med"/>
-  <p:timing>
-    <p:tnLst>
-      <p:par>
-        <p:cTn id="1" dur="indefinite" restart="never" nodeType="tmRoot">
-          <p:childTnLst>
-            <p:seq concurrent="1" nextAc="seek">
-              <p:cTn id="2" dur="indefinite" nodeType="mainSeq">
-                <p:childTnLst>
-                  <p:par>
-                    <p:cTn id="3" fill="hold">
-                      <p:stCondLst>
-                        <p:cond delay="indefinite"/>
-                      </p:stCondLst>
-                      <p:childTnLst>
-                        <p:par>
-                          <p:cTn id="4" fill="hold">
-                            <p:stCondLst>
-                              <p:cond delay="0"/>
-                            </p:stCondLst>
-                            <p:childTnLst>
-                              <p:par>
-                                <p:cTn id="5" presetID="1" presetClass="entr" presetSubtype="0" fill="hold" grpId="0" nodeType="clickEffect">
-                                  <p:stCondLst>
-                                    <p:cond delay="0"/>
-                                  </p:stCondLst>
-                                  <p:childTnLst>
-                                    <p:set>
-                                      <p:cBhvr>
-                                        <p:cTn id="6" dur="1" fill="hold">
-                                          <p:stCondLst>
-                                            <p:cond delay="0"/>
-                                          </p:stCondLst>
-                                        </p:cTn>
-                                        <p:tgtEl>
-                                          <p:spTgt spid="2"/>
-                                        </p:tgtEl>
-                                        <p:attrNameLst>
-                                          <p:attrName>style.visibility</p:attrName>
-                                        </p:attrNameLst>
-                                      </p:cBhvr>
-                                      <p:to>
-                                        <p:strVal val="visible"/>
-                                      </p:to>
-                                    </p:set>
-                                  </p:childTnLst>
-                                </p:cTn>
-                              </p:par>
-                            </p:childTnLst>
-                          </p:cTn>
-                        </p:par>
-                      </p:childTnLst>
-                    </p:cTn>
-                  </p:par>
-                </p:childTnLst>
-              </p:cTn>
-              <p:prevCondLst>
-                <p:cond evt="onPrev" delay="0">
-                  <p:tgtEl>
-                    <p:sldTgt/>
-                  </p:tgtEl>
-                </p:cond>
-              </p:prevCondLst>
-              <p:nextCondLst>
-                <p:cond evt="onNext" delay="0">
-                  <p:tgtEl>
-                    <p:sldTgt/>
-                  </p:tgtEl>
-                </p:cond>
-              </p:nextCondLst>
-            </p:seq>
-          </p:childTnLst>
-        </p:cTn>
-      </p:par>
-    </p:tnLst>
-    <p:bldLst>
-      <p:bldP spid="2" grpId="0" animBg="1"/>
-    </p:bldLst>
-  </p:timing>
 </p:sld>
 </file>
 
@@ -17188,84 +16620,6 @@
     <a:masterClrMapping/>
   </p:clrMapOvr>
   <p:transition spd="med"/>
-  <p:timing>
-    <p:tnLst>
-      <p:par>
-        <p:cTn id="1" dur="indefinite" restart="never" nodeType="tmRoot">
-          <p:childTnLst>
-            <p:seq concurrent="1" nextAc="seek">
-              <p:cTn id="2" dur="indefinite" nodeType="mainSeq">
-                <p:childTnLst>
-                  <p:par>
-                    <p:cTn id="3" fill="hold">
-                      <p:stCondLst>
-                        <p:cond delay="indefinite"/>
-                      </p:stCondLst>
-                      <p:childTnLst>
-                        <p:par>
-                          <p:cTn id="4" fill="hold">
-                            <p:stCondLst>
-                              <p:cond delay="0"/>
-                            </p:stCondLst>
-                            <p:childTnLst>
-                              <p:par>
-                                <p:cTn id="5" presetID="1" presetClass="entr" presetSubtype="0" fill="hold" grpId="0" nodeType="clickEffect">
-                                  <p:stCondLst>
-                                    <p:cond delay="0"/>
-                                  </p:stCondLst>
-                                  <p:childTnLst>
-                                    <p:set>
-                                      <p:cBhvr>
-                                        <p:cTn id="6" dur="1" fill="hold">
-                                          <p:stCondLst>
-                                            <p:cond delay="0"/>
-                                          </p:stCondLst>
-                                        </p:cTn>
-                                        <p:tgtEl>
-                                          <p:spTgt spid="2"/>
-                                        </p:tgtEl>
-                                        <p:attrNameLst>
-                                          <p:attrName>style.visibility</p:attrName>
-                                        </p:attrNameLst>
-                                      </p:cBhvr>
-                                      <p:to>
-                                        <p:strVal val="visible"/>
-                                      </p:to>
-                                    </p:set>
-                                  </p:childTnLst>
-                                </p:cTn>
-                              </p:par>
-                            </p:childTnLst>
-                          </p:cTn>
-                        </p:par>
-                      </p:childTnLst>
-                    </p:cTn>
-                  </p:par>
-                </p:childTnLst>
-              </p:cTn>
-              <p:prevCondLst>
-                <p:cond evt="onPrev" delay="0">
-                  <p:tgtEl>
-                    <p:sldTgt/>
-                  </p:tgtEl>
-                </p:cond>
-              </p:prevCondLst>
-              <p:nextCondLst>
-                <p:cond evt="onNext" delay="0">
-                  <p:tgtEl>
-                    <p:sldTgt/>
-                  </p:tgtEl>
-                </p:cond>
-              </p:nextCondLst>
-            </p:seq>
-          </p:childTnLst>
-        </p:cTn>
-      </p:par>
-    </p:tnLst>
-    <p:bldLst>
-      <p:bldP spid="2" grpId="0" animBg="1"/>
-    </p:bldLst>
-  </p:timing>
 </p:sld>
 </file>
 
@@ -17496,7 +16850,7 @@
           </a:ln>
           <a:extLst>
             <a:ext uri="{C572A759-6A51-4108-AA02-DFA0A04FC94B}">
-              <ma14:wrappingTextBoxFlag xmlns="" xmlns:ma14="http://schemas.microsoft.com/office/mac/drawingml/2011/main" xmlns:a14="http://schemas.microsoft.com/office/drawing/2010/main" xmlns:m="http://schemas.openxmlformats.org/officeDocument/2006/math" val="1"/>
+              <ma14:wrappingTextBoxFlag xmlns:m="http://schemas.openxmlformats.org/officeDocument/2006/math" xmlns:a14="http://schemas.microsoft.com/office/drawing/2010/main" xmlns:ma14="http://schemas.microsoft.com/office/mac/drawingml/2011/main" xmlns="" val="1"/>
             </a:ext>
           </a:extLst>
         </p:spPr>
@@ -17789,208 +17143,6 @@
     <a:masterClrMapping/>
   </p:clrMapOvr>
   <p:transition spd="med"/>
-  <p:timing>
-    <p:tnLst>
-      <p:par>
-        <p:cTn id="1" dur="indefinite" restart="never" nodeType="tmRoot">
-          <p:childTnLst>
-            <p:seq concurrent="1" nextAc="seek">
-              <p:cTn id="2" dur="indefinite" nodeType="mainSeq">
-                <p:childTnLst>
-                  <p:par>
-                    <p:cTn id="3" fill="hold">
-                      <p:stCondLst>
-                        <p:cond delay="indefinite"/>
-                      </p:stCondLst>
-                      <p:childTnLst>
-                        <p:par>
-                          <p:cTn id="4" fill="hold">
-                            <p:stCondLst>
-                              <p:cond delay="0"/>
-                            </p:stCondLst>
-                            <p:childTnLst>
-                              <p:par>
-                                <p:cTn id="5" presetID="1" presetClass="entr" presetSubtype="0" fill="hold" grpId="0" nodeType="clickEffect">
-                                  <p:stCondLst>
-                                    <p:cond delay="0"/>
-                                  </p:stCondLst>
-                                  <p:childTnLst>
-                                    <p:set>
-                                      <p:cBhvr>
-                                        <p:cTn id="6" dur="1" fill="hold">
-                                          <p:stCondLst>
-                                            <p:cond delay="0"/>
-                                          </p:stCondLst>
-                                        </p:cTn>
-                                        <p:tgtEl>
-                                          <p:spTgt spid="2"/>
-                                        </p:tgtEl>
-                                        <p:attrNameLst>
-                                          <p:attrName>style.visibility</p:attrName>
-                                        </p:attrNameLst>
-                                      </p:cBhvr>
-                                      <p:to>
-                                        <p:strVal val="visible"/>
-                                      </p:to>
-                                    </p:set>
-                                  </p:childTnLst>
-                                </p:cTn>
-                              </p:par>
-                            </p:childTnLst>
-                          </p:cTn>
-                        </p:par>
-                      </p:childTnLst>
-                    </p:cTn>
-                  </p:par>
-                  <p:par>
-                    <p:cTn id="7" fill="hold">
-                      <p:stCondLst>
-                        <p:cond delay="indefinite"/>
-                      </p:stCondLst>
-                      <p:childTnLst>
-                        <p:par>
-                          <p:cTn id="8" fill="hold">
-                            <p:stCondLst>
-                              <p:cond delay="0"/>
-                            </p:stCondLst>
-                            <p:childTnLst>
-                              <p:par>
-                                <p:cTn id="9" presetID="10" presetClass="entr" presetSubtype="0" fill="hold" grpId="0" nodeType="clickEffect">
-                                  <p:stCondLst>
-                                    <p:cond delay="0"/>
-                                  </p:stCondLst>
-                                  <p:childTnLst>
-                                    <p:set>
-                                      <p:cBhvr>
-                                        <p:cTn id="10" dur="1" fill="hold">
-                                          <p:stCondLst>
-                                            <p:cond delay="0"/>
-                                          </p:stCondLst>
-                                        </p:cTn>
-                                        <p:tgtEl>
-                                          <p:spTgt spid="3">
-                                            <p:txEl>
-                                              <p:pRg st="0" end="0"/>
-                                            </p:txEl>
-                                          </p:spTgt>
-                                        </p:tgtEl>
-                                        <p:attrNameLst>
-                                          <p:attrName>style.visibility</p:attrName>
-                                        </p:attrNameLst>
-                                      </p:cBhvr>
-                                      <p:to>
-                                        <p:strVal val="visible"/>
-                                      </p:to>
-                                    </p:set>
-                                    <p:animEffect transition="in" filter="fade">
-                                      <p:cBhvr>
-                                        <p:cTn id="11" dur="500"/>
-                                        <p:tgtEl>
-                                          <p:spTgt spid="3">
-                                            <p:txEl>
-                                              <p:pRg st="0" end="0"/>
-                                            </p:txEl>
-                                          </p:spTgt>
-                                        </p:tgtEl>
-                                      </p:cBhvr>
-                                    </p:animEffect>
-                                  </p:childTnLst>
-                                </p:cTn>
-                              </p:par>
-                            </p:childTnLst>
-                          </p:cTn>
-                        </p:par>
-                      </p:childTnLst>
-                    </p:cTn>
-                  </p:par>
-                  <p:par>
-                    <p:cTn id="12" fill="hold">
-                      <p:stCondLst>
-                        <p:cond delay="indefinite"/>
-                      </p:stCondLst>
-                      <p:childTnLst>
-                        <p:par>
-                          <p:cTn id="13" fill="hold">
-                            <p:stCondLst>
-                              <p:cond delay="0"/>
-                            </p:stCondLst>
-                            <p:childTnLst>
-                              <p:par>
-                                <p:cTn id="14" presetID="10" presetClass="entr" presetSubtype="0" fill="hold" grpId="0" nodeType="clickEffect">
-                                  <p:stCondLst>
-                                    <p:cond delay="0"/>
-                                  </p:stCondLst>
-                                  <p:childTnLst>
-                                    <p:set>
-                                      <p:cBhvr>
-                                        <p:cTn id="15" dur="1" fill="hold">
-                                          <p:stCondLst>
-                                            <p:cond delay="0"/>
-                                          </p:stCondLst>
-                                        </p:cTn>
-                                        <p:tgtEl>
-                                          <p:spTgt spid="9">
-                                            <p:txEl>
-                                              <p:pRg st="0" end="0"/>
-                                            </p:txEl>
-                                          </p:spTgt>
-                                        </p:tgtEl>
-                                        <p:attrNameLst>
-                                          <p:attrName>style.visibility</p:attrName>
-                                        </p:attrNameLst>
-                                      </p:cBhvr>
-                                      <p:to>
-                                        <p:strVal val="visible"/>
-                                      </p:to>
-                                    </p:set>
-                                    <p:animEffect transition="in" filter="fade">
-                                      <p:cBhvr>
-                                        <p:cTn id="16" dur="500"/>
-                                        <p:tgtEl>
-                                          <p:spTgt spid="9">
-                                            <p:txEl>
-                                              <p:pRg st="0" end="0"/>
-                                            </p:txEl>
-                                          </p:spTgt>
-                                        </p:tgtEl>
-                                      </p:cBhvr>
-                                    </p:animEffect>
-                                  </p:childTnLst>
-                                </p:cTn>
-                              </p:par>
-                            </p:childTnLst>
-                          </p:cTn>
-                        </p:par>
-                      </p:childTnLst>
-                    </p:cTn>
-                  </p:par>
-                </p:childTnLst>
-              </p:cTn>
-              <p:prevCondLst>
-                <p:cond evt="onPrev" delay="0">
-                  <p:tgtEl>
-                    <p:sldTgt/>
-                  </p:tgtEl>
-                </p:cond>
-              </p:prevCondLst>
-              <p:nextCondLst>
-                <p:cond evt="onNext" delay="0">
-                  <p:tgtEl>
-                    <p:sldTgt/>
-                  </p:tgtEl>
-                </p:cond>
-              </p:nextCondLst>
-            </p:seq>
-          </p:childTnLst>
-        </p:cTn>
-      </p:par>
-    </p:tnLst>
-    <p:bldLst>
-      <p:bldP spid="2" grpId="0" animBg="1"/>
-      <p:bldP spid="3" grpId="0" uiExpand="1" build="p"/>
-      <p:bldP spid="9" grpId="0" uiExpand="1" build="p"/>
-    </p:bldLst>
-  </p:timing>
 </p:sld>
 </file>
 
@@ -18145,146 +17297,6 @@
     <a:masterClrMapping/>
   </p:clrMapOvr>
   <p:transition spd="med"/>
-  <p:timing>
-    <p:tnLst>
-      <p:par>
-        <p:cTn id="1" dur="indefinite" restart="never" nodeType="tmRoot">
-          <p:childTnLst>
-            <p:seq concurrent="1" nextAc="seek">
-              <p:cTn id="2" dur="indefinite" nodeType="mainSeq">
-                <p:childTnLst>
-                  <p:par>
-                    <p:cTn id="3" fill="hold">
-                      <p:stCondLst>
-                        <p:cond delay="indefinite"/>
-                      </p:stCondLst>
-                      <p:childTnLst>
-                        <p:par>
-                          <p:cTn id="4" fill="hold">
-                            <p:stCondLst>
-                              <p:cond delay="0"/>
-                            </p:stCondLst>
-                            <p:childTnLst>
-                              <p:par>
-                                <p:cTn id="5" presetID="1" presetClass="entr" presetSubtype="0" fill="hold" grpId="0" nodeType="clickEffect">
-                                  <p:stCondLst>
-                                    <p:cond delay="0"/>
-                                  </p:stCondLst>
-                                  <p:childTnLst>
-                                    <p:set>
-                                      <p:cBhvr>
-                                        <p:cTn id="6" dur="1" fill="hold">
-                                          <p:stCondLst>
-                                            <p:cond delay="0"/>
-                                          </p:stCondLst>
-                                        </p:cTn>
-                                        <p:tgtEl>
-                                          <p:spTgt spid="2"/>
-                                        </p:tgtEl>
-                                        <p:attrNameLst>
-                                          <p:attrName>style.visibility</p:attrName>
-                                        </p:attrNameLst>
-                                      </p:cBhvr>
-                                      <p:to>
-                                        <p:strVal val="visible"/>
-                                      </p:to>
-                                    </p:set>
-                                  </p:childTnLst>
-                                </p:cTn>
-                              </p:par>
-                            </p:childTnLst>
-                          </p:cTn>
-                        </p:par>
-                      </p:childTnLst>
-                    </p:cTn>
-                  </p:par>
-                  <p:par>
-                    <p:cTn id="7" fill="hold">
-                      <p:stCondLst>
-                        <p:cond delay="indefinite"/>
-                      </p:stCondLst>
-                      <p:childTnLst>
-                        <p:par>
-                          <p:cTn id="8" fill="hold">
-                            <p:stCondLst>
-                              <p:cond delay="0"/>
-                            </p:stCondLst>
-                            <p:childTnLst>
-                              <p:par>
-                                <p:cTn id="9" presetID="10" presetClass="entr" presetSubtype="0" fill="hold" grpId="0" nodeType="clickEffect">
-                                  <p:stCondLst>
-                                    <p:cond delay="0"/>
-                                  </p:stCondLst>
-                                  <p:childTnLst>
-                                    <p:set>
-                                      <p:cBhvr>
-                                        <p:cTn id="10" dur="1" fill="hold">
-                                          <p:stCondLst>
-                                            <p:cond delay="0"/>
-                                          </p:stCondLst>
-                                        </p:cTn>
-                                        <p:tgtEl>
-                                          <p:spTgt spid="3">
-                                            <p:txEl>
-                                              <p:pRg st="0" end="0"/>
-                                            </p:txEl>
-                                          </p:spTgt>
-                                        </p:tgtEl>
-                                        <p:attrNameLst>
-                                          <p:attrName>style.visibility</p:attrName>
-                                        </p:attrNameLst>
-                                      </p:cBhvr>
-                                      <p:to>
-                                        <p:strVal val="visible"/>
-                                      </p:to>
-                                    </p:set>
-                                    <p:animEffect transition="in" filter="fade">
-                                      <p:cBhvr>
-                                        <p:cTn id="11" dur="500"/>
-                                        <p:tgtEl>
-                                          <p:spTgt spid="3">
-                                            <p:txEl>
-                                              <p:pRg st="0" end="0"/>
-                                            </p:txEl>
-                                          </p:spTgt>
-                                        </p:tgtEl>
-                                      </p:cBhvr>
-                                    </p:animEffect>
-                                  </p:childTnLst>
-                                </p:cTn>
-                              </p:par>
-                            </p:childTnLst>
-                          </p:cTn>
-                        </p:par>
-                      </p:childTnLst>
-                    </p:cTn>
-                  </p:par>
-                </p:childTnLst>
-              </p:cTn>
-              <p:prevCondLst>
-                <p:cond evt="onPrev" delay="0">
-                  <p:tgtEl>
-                    <p:sldTgt/>
-                  </p:tgtEl>
-                </p:cond>
-              </p:prevCondLst>
-              <p:nextCondLst>
-                <p:cond evt="onNext" delay="0">
-                  <p:tgtEl>
-                    <p:sldTgt/>
-                  </p:tgtEl>
-                </p:cond>
-              </p:nextCondLst>
-            </p:seq>
-          </p:childTnLst>
-        </p:cTn>
-      </p:par>
-    </p:tnLst>
-    <p:bldLst>
-      <p:bldP spid="2" grpId="0" animBg="1"/>
-      <p:bldP spid="3" grpId="0" uiExpand="1" build="p"/>
-    </p:bldLst>
-  </p:timing>
 </p:sld>
 </file>
 
@@ -18453,146 +17465,6 @@
     <a:masterClrMapping/>
   </p:clrMapOvr>
   <p:transition spd="med"/>
-  <p:timing>
-    <p:tnLst>
-      <p:par>
-        <p:cTn id="1" dur="indefinite" restart="never" nodeType="tmRoot">
-          <p:childTnLst>
-            <p:seq concurrent="1" nextAc="seek">
-              <p:cTn id="2" dur="indefinite" nodeType="mainSeq">
-                <p:childTnLst>
-                  <p:par>
-                    <p:cTn id="3" fill="hold">
-                      <p:stCondLst>
-                        <p:cond delay="indefinite"/>
-                      </p:stCondLst>
-                      <p:childTnLst>
-                        <p:par>
-                          <p:cTn id="4" fill="hold">
-                            <p:stCondLst>
-                              <p:cond delay="0"/>
-                            </p:stCondLst>
-                            <p:childTnLst>
-                              <p:par>
-                                <p:cTn id="5" presetID="1" presetClass="entr" presetSubtype="0" fill="hold" grpId="0" nodeType="clickEffect">
-                                  <p:stCondLst>
-                                    <p:cond delay="0"/>
-                                  </p:stCondLst>
-                                  <p:childTnLst>
-                                    <p:set>
-                                      <p:cBhvr>
-                                        <p:cTn id="6" dur="1" fill="hold">
-                                          <p:stCondLst>
-                                            <p:cond delay="0"/>
-                                          </p:stCondLst>
-                                        </p:cTn>
-                                        <p:tgtEl>
-                                          <p:spTgt spid="2"/>
-                                        </p:tgtEl>
-                                        <p:attrNameLst>
-                                          <p:attrName>style.visibility</p:attrName>
-                                        </p:attrNameLst>
-                                      </p:cBhvr>
-                                      <p:to>
-                                        <p:strVal val="visible"/>
-                                      </p:to>
-                                    </p:set>
-                                  </p:childTnLst>
-                                </p:cTn>
-                              </p:par>
-                            </p:childTnLst>
-                          </p:cTn>
-                        </p:par>
-                      </p:childTnLst>
-                    </p:cTn>
-                  </p:par>
-                  <p:par>
-                    <p:cTn id="7" fill="hold">
-                      <p:stCondLst>
-                        <p:cond delay="indefinite"/>
-                      </p:stCondLst>
-                      <p:childTnLst>
-                        <p:par>
-                          <p:cTn id="8" fill="hold">
-                            <p:stCondLst>
-                              <p:cond delay="0"/>
-                            </p:stCondLst>
-                            <p:childTnLst>
-                              <p:par>
-                                <p:cTn id="9" presetID="10" presetClass="entr" presetSubtype="0" fill="hold" grpId="0" nodeType="clickEffect">
-                                  <p:stCondLst>
-                                    <p:cond delay="0"/>
-                                  </p:stCondLst>
-                                  <p:childTnLst>
-                                    <p:set>
-                                      <p:cBhvr>
-                                        <p:cTn id="10" dur="1" fill="hold">
-                                          <p:stCondLst>
-                                            <p:cond delay="0"/>
-                                          </p:stCondLst>
-                                        </p:cTn>
-                                        <p:tgtEl>
-                                          <p:spTgt spid="3">
-                                            <p:txEl>
-                                              <p:pRg st="0" end="0"/>
-                                            </p:txEl>
-                                          </p:spTgt>
-                                        </p:tgtEl>
-                                        <p:attrNameLst>
-                                          <p:attrName>style.visibility</p:attrName>
-                                        </p:attrNameLst>
-                                      </p:cBhvr>
-                                      <p:to>
-                                        <p:strVal val="visible"/>
-                                      </p:to>
-                                    </p:set>
-                                    <p:animEffect transition="in" filter="fade">
-                                      <p:cBhvr>
-                                        <p:cTn id="11" dur="500"/>
-                                        <p:tgtEl>
-                                          <p:spTgt spid="3">
-                                            <p:txEl>
-                                              <p:pRg st="0" end="0"/>
-                                            </p:txEl>
-                                          </p:spTgt>
-                                        </p:tgtEl>
-                                      </p:cBhvr>
-                                    </p:animEffect>
-                                  </p:childTnLst>
-                                </p:cTn>
-                              </p:par>
-                            </p:childTnLst>
-                          </p:cTn>
-                        </p:par>
-                      </p:childTnLst>
-                    </p:cTn>
-                  </p:par>
-                </p:childTnLst>
-              </p:cTn>
-              <p:prevCondLst>
-                <p:cond evt="onPrev" delay="0">
-                  <p:tgtEl>
-                    <p:sldTgt/>
-                  </p:tgtEl>
-                </p:cond>
-              </p:prevCondLst>
-              <p:nextCondLst>
-                <p:cond evt="onNext" delay="0">
-                  <p:tgtEl>
-                    <p:sldTgt/>
-                  </p:tgtEl>
-                </p:cond>
-              </p:nextCondLst>
-            </p:seq>
-          </p:childTnLst>
-        </p:cTn>
-      </p:par>
-    </p:tnLst>
-    <p:bldLst>
-      <p:bldP spid="2" grpId="0" animBg="1"/>
-      <p:bldP spid="3" grpId="0" uiExpand="1" build="p"/>
-    </p:bldLst>
-  </p:timing>
 </p:sld>
 </file>
 
@@ -18789,7 +17661,7 @@
           </a:ln>
           <a:extLst>
             <a:ext uri="{C572A759-6A51-4108-AA02-DFA0A04FC94B}">
-              <ma14:wrappingTextBoxFlag xmlns:ma14="http://schemas.microsoft.com/office/mac/drawingml/2011/main" xmlns:a14="http://schemas.microsoft.com/office/drawing/2010/main" xmlns:m="http://schemas.openxmlformats.org/officeDocument/2006/math" xmlns="" val="1"/>
+              <ma14:wrappingTextBoxFlag xmlns="" xmlns:m="http://schemas.openxmlformats.org/officeDocument/2006/math" xmlns:a14="http://schemas.microsoft.com/office/drawing/2010/main" xmlns:ma14="http://schemas.microsoft.com/office/mac/drawingml/2011/main" val="1"/>
             </a:ext>
           </a:extLst>
         </p:spPr>
@@ -19281,146 +18153,6 @@
     <a:masterClrMapping/>
   </p:clrMapOvr>
   <p:transition spd="med"/>
-  <p:timing>
-    <p:tnLst>
-      <p:par>
-        <p:cTn id="1" dur="indefinite" restart="never" nodeType="tmRoot">
-          <p:childTnLst>
-            <p:seq concurrent="1" nextAc="seek">
-              <p:cTn id="2" dur="indefinite" nodeType="mainSeq">
-                <p:childTnLst>
-                  <p:par>
-                    <p:cTn id="3" fill="hold">
-                      <p:stCondLst>
-                        <p:cond delay="indefinite"/>
-                      </p:stCondLst>
-                      <p:childTnLst>
-                        <p:par>
-                          <p:cTn id="4" fill="hold">
-                            <p:stCondLst>
-                              <p:cond delay="0"/>
-                            </p:stCondLst>
-                            <p:childTnLst>
-                              <p:par>
-                                <p:cTn id="5" presetID="1" presetClass="entr" presetSubtype="0" fill="hold" grpId="0" nodeType="clickEffect">
-                                  <p:stCondLst>
-                                    <p:cond delay="0"/>
-                                  </p:stCondLst>
-                                  <p:childTnLst>
-                                    <p:set>
-                                      <p:cBhvr>
-                                        <p:cTn id="6" dur="1" fill="hold">
-                                          <p:stCondLst>
-                                            <p:cond delay="0"/>
-                                          </p:stCondLst>
-                                        </p:cTn>
-                                        <p:tgtEl>
-                                          <p:spTgt spid="2"/>
-                                        </p:tgtEl>
-                                        <p:attrNameLst>
-                                          <p:attrName>style.visibility</p:attrName>
-                                        </p:attrNameLst>
-                                      </p:cBhvr>
-                                      <p:to>
-                                        <p:strVal val="visible"/>
-                                      </p:to>
-                                    </p:set>
-                                  </p:childTnLst>
-                                </p:cTn>
-                              </p:par>
-                            </p:childTnLst>
-                          </p:cTn>
-                        </p:par>
-                      </p:childTnLst>
-                    </p:cTn>
-                  </p:par>
-                  <p:par>
-                    <p:cTn id="7" fill="hold">
-                      <p:stCondLst>
-                        <p:cond delay="indefinite"/>
-                      </p:stCondLst>
-                      <p:childTnLst>
-                        <p:par>
-                          <p:cTn id="8" fill="hold">
-                            <p:stCondLst>
-                              <p:cond delay="0"/>
-                            </p:stCondLst>
-                            <p:childTnLst>
-                              <p:par>
-                                <p:cTn id="9" presetID="10" presetClass="entr" presetSubtype="0" fill="hold" grpId="0" nodeType="clickEffect">
-                                  <p:stCondLst>
-                                    <p:cond delay="0"/>
-                                  </p:stCondLst>
-                                  <p:childTnLst>
-                                    <p:set>
-                                      <p:cBhvr>
-                                        <p:cTn id="10" dur="1" fill="hold">
-                                          <p:stCondLst>
-                                            <p:cond delay="0"/>
-                                          </p:stCondLst>
-                                        </p:cTn>
-                                        <p:tgtEl>
-                                          <p:spTgt spid="3">
-                                            <p:txEl>
-                                              <p:pRg st="0" end="0"/>
-                                            </p:txEl>
-                                          </p:spTgt>
-                                        </p:tgtEl>
-                                        <p:attrNameLst>
-                                          <p:attrName>style.visibility</p:attrName>
-                                        </p:attrNameLst>
-                                      </p:cBhvr>
-                                      <p:to>
-                                        <p:strVal val="visible"/>
-                                      </p:to>
-                                    </p:set>
-                                    <p:animEffect transition="in" filter="fade">
-                                      <p:cBhvr>
-                                        <p:cTn id="11" dur="500"/>
-                                        <p:tgtEl>
-                                          <p:spTgt spid="3">
-                                            <p:txEl>
-                                              <p:pRg st="0" end="0"/>
-                                            </p:txEl>
-                                          </p:spTgt>
-                                        </p:tgtEl>
-                                      </p:cBhvr>
-                                    </p:animEffect>
-                                  </p:childTnLst>
-                                </p:cTn>
-                              </p:par>
-                            </p:childTnLst>
-                          </p:cTn>
-                        </p:par>
-                      </p:childTnLst>
-                    </p:cTn>
-                  </p:par>
-                </p:childTnLst>
-              </p:cTn>
-              <p:prevCondLst>
-                <p:cond evt="onPrev" delay="0">
-                  <p:tgtEl>
-                    <p:sldTgt/>
-                  </p:tgtEl>
-                </p:cond>
-              </p:prevCondLst>
-              <p:nextCondLst>
-                <p:cond evt="onNext" delay="0">
-                  <p:tgtEl>
-                    <p:sldTgt/>
-                  </p:tgtEl>
-                </p:cond>
-              </p:nextCondLst>
-            </p:seq>
-          </p:childTnLst>
-        </p:cTn>
-      </p:par>
-    </p:tnLst>
-    <p:bldLst>
-      <p:bldP spid="2" grpId="0" animBg="1"/>
-      <p:bldP spid="3" grpId="0" uiExpand="1" build="p"/>
-    </p:bldLst>
-  </p:timing>
 </p:sld>
 </file>
 
@@ -19583,146 +18315,6 @@
     <a:masterClrMapping/>
   </p:clrMapOvr>
   <p:transition spd="med"/>
-  <p:timing>
-    <p:tnLst>
-      <p:par>
-        <p:cTn id="1" dur="indefinite" restart="never" nodeType="tmRoot">
-          <p:childTnLst>
-            <p:seq concurrent="1" nextAc="seek">
-              <p:cTn id="2" dur="indefinite" nodeType="mainSeq">
-                <p:childTnLst>
-                  <p:par>
-                    <p:cTn id="3" fill="hold">
-                      <p:stCondLst>
-                        <p:cond delay="indefinite"/>
-                      </p:stCondLst>
-                      <p:childTnLst>
-                        <p:par>
-                          <p:cTn id="4" fill="hold">
-                            <p:stCondLst>
-                              <p:cond delay="0"/>
-                            </p:stCondLst>
-                            <p:childTnLst>
-                              <p:par>
-                                <p:cTn id="5" presetID="1" presetClass="entr" presetSubtype="0" fill="hold" grpId="0" nodeType="clickEffect">
-                                  <p:stCondLst>
-                                    <p:cond delay="0"/>
-                                  </p:stCondLst>
-                                  <p:childTnLst>
-                                    <p:set>
-                                      <p:cBhvr>
-                                        <p:cTn id="6" dur="1" fill="hold">
-                                          <p:stCondLst>
-                                            <p:cond delay="0"/>
-                                          </p:stCondLst>
-                                        </p:cTn>
-                                        <p:tgtEl>
-                                          <p:spTgt spid="2"/>
-                                        </p:tgtEl>
-                                        <p:attrNameLst>
-                                          <p:attrName>style.visibility</p:attrName>
-                                        </p:attrNameLst>
-                                      </p:cBhvr>
-                                      <p:to>
-                                        <p:strVal val="visible"/>
-                                      </p:to>
-                                    </p:set>
-                                  </p:childTnLst>
-                                </p:cTn>
-                              </p:par>
-                            </p:childTnLst>
-                          </p:cTn>
-                        </p:par>
-                      </p:childTnLst>
-                    </p:cTn>
-                  </p:par>
-                  <p:par>
-                    <p:cTn id="7" fill="hold">
-                      <p:stCondLst>
-                        <p:cond delay="indefinite"/>
-                      </p:stCondLst>
-                      <p:childTnLst>
-                        <p:par>
-                          <p:cTn id="8" fill="hold">
-                            <p:stCondLst>
-                              <p:cond delay="0"/>
-                            </p:stCondLst>
-                            <p:childTnLst>
-                              <p:par>
-                                <p:cTn id="9" presetID="10" presetClass="entr" presetSubtype="0" fill="hold" grpId="0" nodeType="clickEffect">
-                                  <p:stCondLst>
-                                    <p:cond delay="0"/>
-                                  </p:stCondLst>
-                                  <p:childTnLst>
-                                    <p:set>
-                                      <p:cBhvr>
-                                        <p:cTn id="10" dur="1" fill="hold">
-                                          <p:stCondLst>
-                                            <p:cond delay="0"/>
-                                          </p:stCondLst>
-                                        </p:cTn>
-                                        <p:tgtEl>
-                                          <p:spTgt spid="3">
-                                            <p:txEl>
-                                              <p:pRg st="0" end="0"/>
-                                            </p:txEl>
-                                          </p:spTgt>
-                                        </p:tgtEl>
-                                        <p:attrNameLst>
-                                          <p:attrName>style.visibility</p:attrName>
-                                        </p:attrNameLst>
-                                      </p:cBhvr>
-                                      <p:to>
-                                        <p:strVal val="visible"/>
-                                      </p:to>
-                                    </p:set>
-                                    <p:animEffect transition="in" filter="fade">
-                                      <p:cBhvr>
-                                        <p:cTn id="11" dur="500"/>
-                                        <p:tgtEl>
-                                          <p:spTgt spid="3">
-                                            <p:txEl>
-                                              <p:pRg st="0" end="0"/>
-                                            </p:txEl>
-                                          </p:spTgt>
-                                        </p:tgtEl>
-                                      </p:cBhvr>
-                                    </p:animEffect>
-                                  </p:childTnLst>
-                                </p:cTn>
-                              </p:par>
-                            </p:childTnLst>
-                          </p:cTn>
-                        </p:par>
-                      </p:childTnLst>
-                    </p:cTn>
-                  </p:par>
-                </p:childTnLst>
-              </p:cTn>
-              <p:prevCondLst>
-                <p:cond evt="onPrev" delay="0">
-                  <p:tgtEl>
-                    <p:sldTgt/>
-                  </p:tgtEl>
-                </p:cond>
-              </p:prevCondLst>
-              <p:nextCondLst>
-                <p:cond evt="onNext" delay="0">
-                  <p:tgtEl>
-                    <p:sldTgt/>
-                  </p:tgtEl>
-                </p:cond>
-              </p:nextCondLst>
-            </p:seq>
-          </p:childTnLst>
-        </p:cTn>
-      </p:par>
-    </p:tnLst>
-    <p:bldLst>
-      <p:bldP spid="2" grpId="0" animBg="1"/>
-      <p:bldP spid="3" grpId="0" uiExpand="1" build="p"/>
-    </p:bldLst>
-  </p:timing>
 </p:sld>
 </file>
 
@@ -19983,7 +18575,7 @@
         </p:spPr>
         <p:txBody>
           <a:bodyPr>
-            <a:normAutofit/>
+            <a:normAutofit fontScale="92500"/>
           </a:bodyPr>
           <a:lstStyle/>
           <a:p>
@@ -20028,7 +18620,7 @@
               <a:rPr lang="en-GB" altLang="zh-CN" sz="2400" dirty="0">
                 <a:latin typeface="Arial" panose="020B0604020202020204" pitchFamily="34" charset="0"/>
               </a:rPr>
-              <a:t> positions are known</a:t>
+              <a:t> positions are known, randomly move</a:t>
             </a:r>
           </a:p>
           <a:p>
@@ -20122,329 +18714,6 @@
     <a:masterClrMapping/>
   </p:clrMapOvr>
   <p:transition spd="med"/>
-  <p:timing>
-    <p:tnLst>
-      <p:par>
-        <p:cTn id="1" dur="indefinite" restart="never" nodeType="tmRoot">
-          <p:childTnLst>
-            <p:seq concurrent="1" nextAc="seek">
-              <p:cTn id="2" dur="indefinite" nodeType="mainSeq">
-                <p:childTnLst>
-                  <p:par>
-                    <p:cTn id="3" fill="hold">
-                      <p:stCondLst>
-                        <p:cond delay="indefinite"/>
-                      </p:stCondLst>
-                      <p:childTnLst>
-                        <p:par>
-                          <p:cTn id="4" fill="hold">
-                            <p:stCondLst>
-                              <p:cond delay="0"/>
-                            </p:stCondLst>
-                            <p:childTnLst>
-                              <p:par>
-                                <p:cTn id="5" presetID="1" presetClass="entr" presetSubtype="0" fill="hold" grpId="0" nodeType="clickEffect">
-                                  <p:stCondLst>
-                                    <p:cond delay="0"/>
-                                  </p:stCondLst>
-                                  <p:childTnLst>
-                                    <p:set>
-                                      <p:cBhvr>
-                                        <p:cTn id="6" dur="1" fill="hold">
-                                          <p:stCondLst>
-                                            <p:cond delay="0"/>
-                                          </p:stCondLst>
-                                        </p:cTn>
-                                        <p:tgtEl>
-                                          <p:spTgt spid="2"/>
-                                        </p:tgtEl>
-                                        <p:attrNameLst>
-                                          <p:attrName>style.visibility</p:attrName>
-                                        </p:attrNameLst>
-                                      </p:cBhvr>
-                                      <p:to>
-                                        <p:strVal val="visible"/>
-                                      </p:to>
-                                    </p:set>
-                                  </p:childTnLst>
-                                </p:cTn>
-                              </p:par>
-                            </p:childTnLst>
-                          </p:cTn>
-                        </p:par>
-                      </p:childTnLst>
-                    </p:cTn>
-                  </p:par>
-                  <p:par>
-                    <p:cTn id="7" fill="hold">
-                      <p:stCondLst>
-                        <p:cond delay="indefinite"/>
-                      </p:stCondLst>
-                      <p:childTnLst>
-                        <p:par>
-                          <p:cTn id="8" fill="hold">
-                            <p:stCondLst>
-                              <p:cond delay="0"/>
-                            </p:stCondLst>
-                            <p:childTnLst>
-                              <p:par>
-                                <p:cTn id="9" presetID="10" presetClass="entr" presetSubtype="0" fill="hold" grpId="0" nodeType="clickEffect">
-                                  <p:stCondLst>
-                                    <p:cond delay="0"/>
-                                  </p:stCondLst>
-                                  <p:childTnLst>
-                                    <p:set>
-                                      <p:cBhvr>
-                                        <p:cTn id="10" dur="1" fill="hold">
-                                          <p:stCondLst>
-                                            <p:cond delay="0"/>
-                                          </p:stCondLst>
-                                        </p:cTn>
-                                        <p:tgtEl>
-                                          <p:spTgt spid="3">
-                                            <p:txEl>
-                                              <p:pRg st="0" end="0"/>
-                                            </p:txEl>
-                                          </p:spTgt>
-                                        </p:tgtEl>
-                                        <p:attrNameLst>
-                                          <p:attrName>style.visibility</p:attrName>
-                                        </p:attrNameLst>
-                                      </p:cBhvr>
-                                      <p:to>
-                                        <p:strVal val="visible"/>
-                                      </p:to>
-                                    </p:set>
-                                    <p:animEffect transition="in" filter="fade">
-                                      <p:cBhvr>
-                                        <p:cTn id="11" dur="500"/>
-                                        <p:tgtEl>
-                                          <p:spTgt spid="3">
-                                            <p:txEl>
-                                              <p:pRg st="0" end="0"/>
-                                            </p:txEl>
-                                          </p:spTgt>
-                                        </p:tgtEl>
-                                      </p:cBhvr>
-                                    </p:animEffect>
-                                  </p:childTnLst>
-                                </p:cTn>
-                              </p:par>
-                            </p:childTnLst>
-                          </p:cTn>
-                        </p:par>
-                      </p:childTnLst>
-                    </p:cTn>
-                  </p:par>
-                  <p:par>
-                    <p:cTn id="12" fill="hold">
-                      <p:stCondLst>
-                        <p:cond delay="indefinite"/>
-                      </p:stCondLst>
-                      <p:childTnLst>
-                        <p:par>
-                          <p:cTn id="13" fill="hold">
-                            <p:stCondLst>
-                              <p:cond delay="0"/>
-                            </p:stCondLst>
-                            <p:childTnLst>
-                              <p:par>
-                                <p:cTn id="14" presetID="10" presetClass="entr" presetSubtype="0" fill="hold" grpId="0" nodeType="clickEffect">
-                                  <p:stCondLst>
-                                    <p:cond delay="0"/>
-                                  </p:stCondLst>
-                                  <p:childTnLst>
-                                    <p:set>
-                                      <p:cBhvr>
-                                        <p:cTn id="15" dur="1" fill="hold">
-                                          <p:stCondLst>
-                                            <p:cond delay="0"/>
-                                          </p:stCondLst>
-                                        </p:cTn>
-                                        <p:tgtEl>
-                                          <p:spTgt spid="3">
-                                            <p:txEl>
-                                              <p:pRg st="1" end="1"/>
-                                            </p:txEl>
-                                          </p:spTgt>
-                                        </p:tgtEl>
-                                        <p:attrNameLst>
-                                          <p:attrName>style.visibility</p:attrName>
-                                        </p:attrNameLst>
-                                      </p:cBhvr>
-                                      <p:to>
-                                        <p:strVal val="visible"/>
-                                      </p:to>
-                                    </p:set>
-                                    <p:animEffect transition="in" filter="fade">
-                                      <p:cBhvr>
-                                        <p:cTn id="16" dur="500"/>
-                                        <p:tgtEl>
-                                          <p:spTgt spid="3">
-                                            <p:txEl>
-                                              <p:pRg st="1" end="1"/>
-                                            </p:txEl>
-                                          </p:spTgt>
-                                        </p:tgtEl>
-                                      </p:cBhvr>
-                                    </p:animEffect>
-                                  </p:childTnLst>
-                                </p:cTn>
-                              </p:par>
-                            </p:childTnLst>
-                          </p:cTn>
-                        </p:par>
-                      </p:childTnLst>
-                    </p:cTn>
-                  </p:par>
-                  <p:par>
-                    <p:cTn id="17" fill="hold">
-                      <p:stCondLst>
-                        <p:cond delay="indefinite"/>
-                      </p:stCondLst>
-                      <p:childTnLst>
-                        <p:par>
-                          <p:cTn id="18" fill="hold">
-                            <p:stCondLst>
-                              <p:cond delay="0"/>
-                            </p:stCondLst>
-                            <p:childTnLst>
-                              <p:par>
-                                <p:cTn id="19" presetID="10" presetClass="entr" presetSubtype="0" fill="hold" grpId="0" nodeType="clickEffect">
-                                  <p:stCondLst>
-                                    <p:cond delay="0"/>
-                                  </p:stCondLst>
-                                  <p:childTnLst>
-                                    <p:set>
-                                      <p:cBhvr>
-                                        <p:cTn id="20" dur="1" fill="hold">
-                                          <p:stCondLst>
-                                            <p:cond delay="0"/>
-                                          </p:stCondLst>
-                                        </p:cTn>
-                                        <p:tgtEl>
-                                          <p:spTgt spid="3">
-                                            <p:txEl>
-                                              <p:pRg st="2" end="2"/>
-                                            </p:txEl>
-                                          </p:spTgt>
-                                        </p:tgtEl>
-                                        <p:attrNameLst>
-                                          <p:attrName>style.visibility</p:attrName>
-                                        </p:attrNameLst>
-                                      </p:cBhvr>
-                                      <p:to>
-                                        <p:strVal val="visible"/>
-                                      </p:to>
-                                    </p:set>
-                                    <p:animEffect transition="in" filter="fade">
-                                      <p:cBhvr>
-                                        <p:cTn id="21" dur="500"/>
-                                        <p:tgtEl>
-                                          <p:spTgt spid="3">
-                                            <p:txEl>
-                                              <p:pRg st="2" end="2"/>
-                                            </p:txEl>
-                                          </p:spTgt>
-                                        </p:tgtEl>
-                                      </p:cBhvr>
-                                    </p:animEffect>
-                                  </p:childTnLst>
-                                </p:cTn>
-                              </p:par>
-                            </p:childTnLst>
-                          </p:cTn>
-                        </p:par>
-                      </p:childTnLst>
-                    </p:cTn>
-                  </p:par>
-                  <p:par>
-                    <p:cTn id="22" fill="hold">
-                      <p:stCondLst>
-                        <p:cond delay="indefinite"/>
-                      </p:stCondLst>
-                      <p:childTnLst>
-                        <p:par>
-                          <p:cTn id="23" fill="hold">
-                            <p:stCondLst>
-                              <p:cond delay="0"/>
-                            </p:stCondLst>
-                            <p:childTnLst>
-                              <p:par>
-                                <p:cTn id="24" presetID="10" presetClass="entr" presetSubtype="0" fill="hold" grpId="0" nodeType="clickEffect">
-                                  <p:stCondLst>
-                                    <p:cond delay="0"/>
-                                  </p:stCondLst>
-                                  <p:childTnLst>
-                                    <p:set>
-                                      <p:cBhvr>
-                                        <p:cTn id="25" dur="1" fill="hold">
-                                          <p:stCondLst>
-                                            <p:cond delay="0"/>
-                                          </p:stCondLst>
-                                        </p:cTn>
-                                        <p:tgtEl>
-                                          <p:spTgt spid="3">
-                                            <p:txEl>
-                                              <p:pRg st="3" end="3"/>
-                                            </p:txEl>
-                                          </p:spTgt>
-                                        </p:tgtEl>
-                                        <p:attrNameLst>
-                                          <p:attrName>style.visibility</p:attrName>
-                                        </p:attrNameLst>
-                                      </p:cBhvr>
-                                      <p:to>
-                                        <p:strVal val="visible"/>
-                                      </p:to>
-                                    </p:set>
-                                    <p:animEffect transition="in" filter="fade">
-                                      <p:cBhvr>
-                                        <p:cTn id="26" dur="500"/>
-                                        <p:tgtEl>
-                                          <p:spTgt spid="3">
-                                            <p:txEl>
-                                              <p:pRg st="3" end="3"/>
-                                            </p:txEl>
-                                          </p:spTgt>
-                                        </p:tgtEl>
-                                      </p:cBhvr>
-                                    </p:animEffect>
-                                  </p:childTnLst>
-                                </p:cTn>
-                              </p:par>
-                            </p:childTnLst>
-                          </p:cTn>
-                        </p:par>
-                      </p:childTnLst>
-                    </p:cTn>
-                  </p:par>
-                </p:childTnLst>
-              </p:cTn>
-              <p:prevCondLst>
-                <p:cond evt="onPrev" delay="0">
-                  <p:tgtEl>
-                    <p:sldTgt/>
-                  </p:tgtEl>
-                </p:cond>
-              </p:prevCondLst>
-              <p:nextCondLst>
-                <p:cond evt="onNext" delay="0">
-                  <p:tgtEl>
-                    <p:sldTgt/>
-                  </p:tgtEl>
-                </p:cond>
-              </p:nextCondLst>
-            </p:seq>
-          </p:childTnLst>
-        </p:cTn>
-      </p:par>
-    </p:tnLst>
-    <p:bldLst>
-      <p:bldP spid="2" grpId="0" animBg="1"/>
-      <p:bldP spid="3" grpId="0" uiExpand="1" build="p"/>
-    </p:bldLst>
-  </p:timing>
 </p:sld>
 </file>
 
@@ -20565,146 +18834,6 @@
     <a:masterClrMapping/>
   </p:clrMapOvr>
   <p:transition spd="med"/>
-  <p:timing>
-    <p:tnLst>
-      <p:par>
-        <p:cTn id="1" dur="indefinite" restart="never" nodeType="tmRoot">
-          <p:childTnLst>
-            <p:seq concurrent="1" nextAc="seek">
-              <p:cTn id="2" dur="indefinite" nodeType="mainSeq">
-                <p:childTnLst>
-                  <p:par>
-                    <p:cTn id="3" fill="hold">
-                      <p:stCondLst>
-                        <p:cond delay="indefinite"/>
-                      </p:stCondLst>
-                      <p:childTnLst>
-                        <p:par>
-                          <p:cTn id="4" fill="hold">
-                            <p:stCondLst>
-                              <p:cond delay="0"/>
-                            </p:stCondLst>
-                            <p:childTnLst>
-                              <p:par>
-                                <p:cTn id="5" presetID="1" presetClass="entr" presetSubtype="0" fill="hold" grpId="0" nodeType="clickEffect">
-                                  <p:stCondLst>
-                                    <p:cond delay="0"/>
-                                  </p:stCondLst>
-                                  <p:childTnLst>
-                                    <p:set>
-                                      <p:cBhvr>
-                                        <p:cTn id="6" dur="1" fill="hold">
-                                          <p:stCondLst>
-                                            <p:cond delay="0"/>
-                                          </p:stCondLst>
-                                        </p:cTn>
-                                        <p:tgtEl>
-                                          <p:spTgt spid="2"/>
-                                        </p:tgtEl>
-                                        <p:attrNameLst>
-                                          <p:attrName>style.visibility</p:attrName>
-                                        </p:attrNameLst>
-                                      </p:cBhvr>
-                                      <p:to>
-                                        <p:strVal val="visible"/>
-                                      </p:to>
-                                    </p:set>
-                                  </p:childTnLst>
-                                </p:cTn>
-                              </p:par>
-                            </p:childTnLst>
-                          </p:cTn>
-                        </p:par>
-                      </p:childTnLst>
-                    </p:cTn>
-                  </p:par>
-                  <p:par>
-                    <p:cTn id="7" fill="hold">
-                      <p:stCondLst>
-                        <p:cond delay="indefinite"/>
-                      </p:stCondLst>
-                      <p:childTnLst>
-                        <p:par>
-                          <p:cTn id="8" fill="hold">
-                            <p:stCondLst>
-                              <p:cond delay="0"/>
-                            </p:stCondLst>
-                            <p:childTnLst>
-                              <p:par>
-                                <p:cTn id="9" presetID="10" presetClass="entr" presetSubtype="0" fill="hold" grpId="0" nodeType="clickEffect">
-                                  <p:stCondLst>
-                                    <p:cond delay="0"/>
-                                  </p:stCondLst>
-                                  <p:childTnLst>
-                                    <p:set>
-                                      <p:cBhvr>
-                                        <p:cTn id="10" dur="1" fill="hold">
-                                          <p:stCondLst>
-                                            <p:cond delay="0"/>
-                                          </p:stCondLst>
-                                        </p:cTn>
-                                        <p:tgtEl>
-                                          <p:spTgt spid="3">
-                                            <p:txEl>
-                                              <p:pRg st="0" end="0"/>
-                                            </p:txEl>
-                                          </p:spTgt>
-                                        </p:tgtEl>
-                                        <p:attrNameLst>
-                                          <p:attrName>style.visibility</p:attrName>
-                                        </p:attrNameLst>
-                                      </p:cBhvr>
-                                      <p:to>
-                                        <p:strVal val="visible"/>
-                                      </p:to>
-                                    </p:set>
-                                    <p:animEffect transition="in" filter="fade">
-                                      <p:cBhvr>
-                                        <p:cTn id="11" dur="500"/>
-                                        <p:tgtEl>
-                                          <p:spTgt spid="3">
-                                            <p:txEl>
-                                              <p:pRg st="0" end="0"/>
-                                            </p:txEl>
-                                          </p:spTgt>
-                                        </p:tgtEl>
-                                      </p:cBhvr>
-                                    </p:animEffect>
-                                  </p:childTnLst>
-                                </p:cTn>
-                              </p:par>
-                            </p:childTnLst>
-                          </p:cTn>
-                        </p:par>
-                      </p:childTnLst>
-                    </p:cTn>
-                  </p:par>
-                </p:childTnLst>
-              </p:cTn>
-              <p:prevCondLst>
-                <p:cond evt="onPrev" delay="0">
-                  <p:tgtEl>
-                    <p:sldTgt/>
-                  </p:tgtEl>
-                </p:cond>
-              </p:prevCondLst>
-              <p:nextCondLst>
-                <p:cond evt="onNext" delay="0">
-                  <p:tgtEl>
-                    <p:sldTgt/>
-                  </p:tgtEl>
-                </p:cond>
-              </p:nextCondLst>
-            </p:seq>
-          </p:childTnLst>
-        </p:cTn>
-      </p:par>
-    </p:tnLst>
-    <p:bldLst>
-      <p:bldP spid="2" grpId="0" animBg="1"/>
-      <p:bldP spid="3" grpId="0" uiExpand="1" build="p"/>
-    </p:bldLst>
-  </p:timing>
 </p:sld>
 </file>
 
@@ -20859,207 +18988,6 @@
     <a:masterClrMapping/>
   </p:clrMapOvr>
   <p:transition spd="med"/>
-  <p:timing>
-    <p:tnLst>
-      <p:par>
-        <p:cTn id="1" dur="indefinite" restart="never" nodeType="tmRoot">
-          <p:childTnLst>
-            <p:seq concurrent="1" nextAc="seek">
-              <p:cTn id="2" dur="indefinite" nodeType="mainSeq">
-                <p:childTnLst>
-                  <p:par>
-                    <p:cTn id="3" fill="hold">
-                      <p:stCondLst>
-                        <p:cond delay="indefinite"/>
-                      </p:stCondLst>
-                      <p:childTnLst>
-                        <p:par>
-                          <p:cTn id="4" fill="hold">
-                            <p:stCondLst>
-                              <p:cond delay="0"/>
-                            </p:stCondLst>
-                            <p:childTnLst>
-                              <p:par>
-                                <p:cTn id="5" presetID="1" presetClass="entr" presetSubtype="0" fill="hold" grpId="0" nodeType="clickEffect">
-                                  <p:stCondLst>
-                                    <p:cond delay="0"/>
-                                  </p:stCondLst>
-                                  <p:childTnLst>
-                                    <p:set>
-                                      <p:cBhvr>
-                                        <p:cTn id="6" dur="1" fill="hold">
-                                          <p:stCondLst>
-                                            <p:cond delay="0"/>
-                                          </p:stCondLst>
-                                        </p:cTn>
-                                        <p:tgtEl>
-                                          <p:spTgt spid="2"/>
-                                        </p:tgtEl>
-                                        <p:attrNameLst>
-                                          <p:attrName>style.visibility</p:attrName>
-                                        </p:attrNameLst>
-                                      </p:cBhvr>
-                                      <p:to>
-                                        <p:strVal val="visible"/>
-                                      </p:to>
-                                    </p:set>
-                                  </p:childTnLst>
-                                </p:cTn>
-                              </p:par>
-                            </p:childTnLst>
-                          </p:cTn>
-                        </p:par>
-                      </p:childTnLst>
-                    </p:cTn>
-                  </p:par>
-                  <p:par>
-                    <p:cTn id="7" fill="hold">
-                      <p:stCondLst>
-                        <p:cond delay="indefinite"/>
-                      </p:stCondLst>
-                      <p:childTnLst>
-                        <p:par>
-                          <p:cTn id="8" fill="hold">
-                            <p:stCondLst>
-                              <p:cond delay="0"/>
-                            </p:stCondLst>
-                            <p:childTnLst>
-                              <p:par>
-                                <p:cTn id="9" presetID="10" presetClass="entr" presetSubtype="0" fill="hold" grpId="0" nodeType="clickEffect">
-                                  <p:stCondLst>
-                                    <p:cond delay="0"/>
-                                  </p:stCondLst>
-                                  <p:childTnLst>
-                                    <p:set>
-                                      <p:cBhvr>
-                                        <p:cTn id="10" dur="1" fill="hold">
-                                          <p:stCondLst>
-                                            <p:cond delay="0"/>
-                                          </p:stCondLst>
-                                        </p:cTn>
-                                        <p:tgtEl>
-                                          <p:spTgt spid="3">
-                                            <p:txEl>
-                                              <p:pRg st="0" end="0"/>
-                                            </p:txEl>
-                                          </p:spTgt>
-                                        </p:tgtEl>
-                                        <p:attrNameLst>
-                                          <p:attrName>style.visibility</p:attrName>
-                                        </p:attrNameLst>
-                                      </p:cBhvr>
-                                      <p:to>
-                                        <p:strVal val="visible"/>
-                                      </p:to>
-                                    </p:set>
-                                    <p:animEffect transition="in" filter="fade">
-                                      <p:cBhvr>
-                                        <p:cTn id="11" dur="500"/>
-                                        <p:tgtEl>
-                                          <p:spTgt spid="3">
-                                            <p:txEl>
-                                              <p:pRg st="0" end="0"/>
-                                            </p:txEl>
-                                          </p:spTgt>
-                                        </p:tgtEl>
-                                      </p:cBhvr>
-                                    </p:animEffect>
-                                  </p:childTnLst>
-                                </p:cTn>
-                              </p:par>
-                            </p:childTnLst>
-                          </p:cTn>
-                        </p:par>
-                      </p:childTnLst>
-                    </p:cTn>
-                  </p:par>
-                  <p:par>
-                    <p:cTn id="12" fill="hold">
-                      <p:stCondLst>
-                        <p:cond delay="indefinite"/>
-                      </p:stCondLst>
-                      <p:childTnLst>
-                        <p:par>
-                          <p:cTn id="13" fill="hold">
-                            <p:stCondLst>
-                              <p:cond delay="0"/>
-                            </p:stCondLst>
-                            <p:childTnLst>
-                              <p:par>
-                                <p:cTn id="14" presetID="10" presetClass="entr" presetSubtype="0" fill="hold" grpId="0" nodeType="clickEffect">
-                                  <p:stCondLst>
-                                    <p:cond delay="0"/>
-                                  </p:stCondLst>
-                                  <p:childTnLst>
-                                    <p:set>
-                                      <p:cBhvr>
-                                        <p:cTn id="15" dur="1" fill="hold">
-                                          <p:stCondLst>
-                                            <p:cond delay="0"/>
-                                          </p:stCondLst>
-                                        </p:cTn>
-                                        <p:tgtEl>
-                                          <p:spTgt spid="3">
-                                            <p:txEl>
-                                              <p:pRg st="1" end="1"/>
-                                            </p:txEl>
-                                          </p:spTgt>
-                                        </p:tgtEl>
-                                        <p:attrNameLst>
-                                          <p:attrName>style.visibility</p:attrName>
-                                        </p:attrNameLst>
-                                      </p:cBhvr>
-                                      <p:to>
-                                        <p:strVal val="visible"/>
-                                      </p:to>
-                                    </p:set>
-                                    <p:animEffect transition="in" filter="fade">
-                                      <p:cBhvr>
-                                        <p:cTn id="16" dur="500"/>
-                                        <p:tgtEl>
-                                          <p:spTgt spid="3">
-                                            <p:txEl>
-                                              <p:pRg st="1" end="1"/>
-                                            </p:txEl>
-                                          </p:spTgt>
-                                        </p:tgtEl>
-                                      </p:cBhvr>
-                                    </p:animEffect>
-                                  </p:childTnLst>
-                                </p:cTn>
-                              </p:par>
-                            </p:childTnLst>
-                          </p:cTn>
-                        </p:par>
-                      </p:childTnLst>
-                    </p:cTn>
-                  </p:par>
-                </p:childTnLst>
-              </p:cTn>
-              <p:prevCondLst>
-                <p:cond evt="onPrev" delay="0">
-                  <p:tgtEl>
-                    <p:sldTgt/>
-                  </p:tgtEl>
-                </p:cond>
-              </p:prevCondLst>
-              <p:nextCondLst>
-                <p:cond evt="onNext" delay="0">
-                  <p:tgtEl>
-                    <p:sldTgt/>
-                  </p:tgtEl>
-                </p:cond>
-              </p:nextCondLst>
-            </p:seq>
-          </p:childTnLst>
-        </p:cTn>
-      </p:par>
-    </p:tnLst>
-    <p:bldLst>
-      <p:bldP spid="2" grpId="0" animBg="1"/>
-      <p:bldP spid="3" grpId="0" uiExpand="1" build="p"/>
-    </p:bldLst>
-  </p:timing>
 </p:sld>
 </file>
 
@@ -21385,7 +19313,7 @@
         </p:nvSpPr>
         <p:spPr>
           <a:xfrm>
-            <a:off x="698500" y="1774780"/>
+            <a:off x="698500" y="1889291"/>
             <a:ext cx="10773500" cy="3638468"/>
           </a:xfrm>
         </p:spPr>
@@ -21397,58 +19325,77 @@
           <a:p>
             <a:pPr marL="712788">
               <a:lnSpc>
-                <a:spcPct val="250000"/>
+                <a:spcPct val="150000"/>
               </a:lnSpc>
               <a:buFont typeface="Arial" panose="020B0604020202020204" pitchFamily="34" charset="0"/>
               <a:buChar char="•"/>
             </a:pPr>
             <a:r>
-              <a:rPr lang="en-GB" sz="2400" b="0" i="0" dirty="0">
-                <a:effectLst/>
+              <a:rPr lang="en-GB" sz="2000" dirty="0">
                 <a:latin typeface="Arial" panose="020B0604020202020204" pitchFamily="34" charset="0"/>
               </a:rPr>
-              <a:t>How</a:t>
+              <a:t>Robot’s state estimation </a:t>
             </a:r>
           </a:p>
           <a:p>
             <a:pPr marL="712788">
               <a:lnSpc>
-                <a:spcPct val="250000"/>
+                <a:spcPct val="150000"/>
               </a:lnSpc>
               <a:buFont typeface="Arial" panose="020B0604020202020204" pitchFamily="34" charset="0"/>
               <a:buChar char="•"/>
             </a:pPr>
             <a:r>
-              <a:rPr lang="en-US" sz="2400" dirty="0">
+              <a:rPr lang="en-US" sz="2000" dirty="0">
                 <a:latin typeface="Arial" panose="020B0604020202020204" pitchFamily="34" charset="0"/>
               </a:rPr>
-              <a:t>Integrated information from various sources often enhances the estimation accuracy and consequently strengthens the robustness of observations</a:t>
-            </a:r>
-            <a:endParaRPr lang="en-GB" sz="2400" dirty="0">
+              <a:t>Multiple sensors are available, but information is not always trustful</a:t>
+            </a:r>
+            <a:endParaRPr lang="en-GB" sz="2000" dirty="0">
               <a:latin typeface="Arial" panose="020B0604020202020204" pitchFamily="34" charset="0"/>
             </a:endParaRPr>
           </a:p>
           <a:p>
             <a:pPr marL="712788">
               <a:lnSpc>
-                <a:spcPct val="250000"/>
+                <a:spcPct val="150000"/>
               </a:lnSpc>
               <a:buFont typeface="Arial" panose="020B0604020202020204" pitchFamily="34" charset="0"/>
               <a:buChar char="•"/>
             </a:pPr>
-            <a:endParaRPr lang="en-GB" sz="2400" dirty="0">
+            <a:r>
+              <a:rPr lang="en-GB" sz="2000" dirty="0">
+                <a:latin typeface="Arial" panose="020B0604020202020204" pitchFamily="34" charset="0"/>
+              </a:rPr>
+              <a:t>Data fusion methods were </a:t>
+            </a:r>
+            <a:r>
+              <a:rPr lang="en-US" altLang="zh-CN" sz="2000" dirty="0">
+                <a:latin typeface="Arial" panose="020B0604020202020204" pitchFamily="34" charset="0"/>
+              </a:rPr>
+              <a:t>widely applied for state estimations</a:t>
+            </a:r>
+            <a:endParaRPr lang="en-GB" sz="2000" dirty="0">
               <a:latin typeface="Arial" panose="020B0604020202020204" pitchFamily="34" charset="0"/>
             </a:endParaRPr>
           </a:p>
           <a:p>
             <a:pPr marL="712788">
               <a:lnSpc>
-                <a:spcPct val="250000"/>
+                <a:spcPct val="150000"/>
               </a:lnSpc>
               <a:buFont typeface="Arial" panose="020B0604020202020204" pitchFamily="34" charset="0"/>
               <a:buChar char="•"/>
             </a:pPr>
-            <a:endParaRPr lang="en-GB" sz="2400" dirty="0"/>
+            <a:r>
+              <a:rPr lang="en-US" sz="2000" dirty="0">
+                <a:latin typeface="Arial" panose="020B0604020202020204" pitchFamily="34" charset="0"/>
+              </a:rPr>
+              <a:t>Based on data fusion method to construct an indoor localization architecture with specific sensors coming in different sampling rate and missing or biased measurement</a:t>
+            </a:r>
+            <a:endParaRPr lang="en-GB" sz="2000" dirty="0">
+              <a:latin typeface="Arial" panose="020B0604020202020204" pitchFamily="34" charset="0"/>
+            </a:endParaRPr>
           </a:p>
         </p:txBody>
       </p:sp>
@@ -21463,207 +19410,6 @@
     <a:masterClrMapping/>
   </p:clrMapOvr>
   <p:transition spd="med"/>
-  <p:timing>
-    <p:tnLst>
-      <p:par>
-        <p:cTn id="1" dur="indefinite" restart="never" nodeType="tmRoot">
-          <p:childTnLst>
-            <p:seq concurrent="1" nextAc="seek">
-              <p:cTn id="2" dur="indefinite" nodeType="mainSeq">
-                <p:childTnLst>
-                  <p:par>
-                    <p:cTn id="3" fill="hold">
-                      <p:stCondLst>
-                        <p:cond delay="indefinite"/>
-                      </p:stCondLst>
-                      <p:childTnLst>
-                        <p:par>
-                          <p:cTn id="4" fill="hold">
-                            <p:stCondLst>
-                              <p:cond delay="0"/>
-                            </p:stCondLst>
-                            <p:childTnLst>
-                              <p:par>
-                                <p:cTn id="5" presetID="1" presetClass="entr" presetSubtype="0" fill="hold" grpId="0" nodeType="clickEffect">
-                                  <p:stCondLst>
-                                    <p:cond delay="0"/>
-                                  </p:stCondLst>
-                                  <p:childTnLst>
-                                    <p:set>
-                                      <p:cBhvr>
-                                        <p:cTn id="6" dur="1" fill="hold">
-                                          <p:stCondLst>
-                                            <p:cond delay="0"/>
-                                          </p:stCondLst>
-                                        </p:cTn>
-                                        <p:tgtEl>
-                                          <p:spTgt spid="2"/>
-                                        </p:tgtEl>
-                                        <p:attrNameLst>
-                                          <p:attrName>style.visibility</p:attrName>
-                                        </p:attrNameLst>
-                                      </p:cBhvr>
-                                      <p:to>
-                                        <p:strVal val="visible"/>
-                                      </p:to>
-                                    </p:set>
-                                  </p:childTnLst>
-                                </p:cTn>
-                              </p:par>
-                            </p:childTnLst>
-                          </p:cTn>
-                        </p:par>
-                      </p:childTnLst>
-                    </p:cTn>
-                  </p:par>
-                  <p:par>
-                    <p:cTn id="7" fill="hold">
-                      <p:stCondLst>
-                        <p:cond delay="indefinite"/>
-                      </p:stCondLst>
-                      <p:childTnLst>
-                        <p:par>
-                          <p:cTn id="8" fill="hold">
-                            <p:stCondLst>
-                              <p:cond delay="0"/>
-                            </p:stCondLst>
-                            <p:childTnLst>
-                              <p:par>
-                                <p:cTn id="9" presetID="10" presetClass="entr" presetSubtype="0" fill="hold" grpId="0" nodeType="clickEffect">
-                                  <p:stCondLst>
-                                    <p:cond delay="0"/>
-                                  </p:stCondLst>
-                                  <p:childTnLst>
-                                    <p:set>
-                                      <p:cBhvr>
-                                        <p:cTn id="10" dur="1" fill="hold">
-                                          <p:stCondLst>
-                                            <p:cond delay="0"/>
-                                          </p:stCondLst>
-                                        </p:cTn>
-                                        <p:tgtEl>
-                                          <p:spTgt spid="3">
-                                            <p:txEl>
-                                              <p:pRg st="0" end="0"/>
-                                            </p:txEl>
-                                          </p:spTgt>
-                                        </p:tgtEl>
-                                        <p:attrNameLst>
-                                          <p:attrName>style.visibility</p:attrName>
-                                        </p:attrNameLst>
-                                      </p:cBhvr>
-                                      <p:to>
-                                        <p:strVal val="visible"/>
-                                      </p:to>
-                                    </p:set>
-                                    <p:animEffect transition="in" filter="fade">
-                                      <p:cBhvr>
-                                        <p:cTn id="11" dur="500"/>
-                                        <p:tgtEl>
-                                          <p:spTgt spid="3">
-                                            <p:txEl>
-                                              <p:pRg st="0" end="0"/>
-                                            </p:txEl>
-                                          </p:spTgt>
-                                        </p:tgtEl>
-                                      </p:cBhvr>
-                                    </p:animEffect>
-                                  </p:childTnLst>
-                                </p:cTn>
-                              </p:par>
-                            </p:childTnLst>
-                          </p:cTn>
-                        </p:par>
-                      </p:childTnLst>
-                    </p:cTn>
-                  </p:par>
-                  <p:par>
-                    <p:cTn id="12" fill="hold">
-                      <p:stCondLst>
-                        <p:cond delay="indefinite"/>
-                      </p:stCondLst>
-                      <p:childTnLst>
-                        <p:par>
-                          <p:cTn id="13" fill="hold">
-                            <p:stCondLst>
-                              <p:cond delay="0"/>
-                            </p:stCondLst>
-                            <p:childTnLst>
-                              <p:par>
-                                <p:cTn id="14" presetID="10" presetClass="entr" presetSubtype="0" fill="hold" grpId="0" nodeType="clickEffect">
-                                  <p:stCondLst>
-                                    <p:cond delay="0"/>
-                                  </p:stCondLst>
-                                  <p:childTnLst>
-                                    <p:set>
-                                      <p:cBhvr>
-                                        <p:cTn id="15" dur="1" fill="hold">
-                                          <p:stCondLst>
-                                            <p:cond delay="0"/>
-                                          </p:stCondLst>
-                                        </p:cTn>
-                                        <p:tgtEl>
-                                          <p:spTgt spid="3">
-                                            <p:txEl>
-                                              <p:pRg st="1" end="1"/>
-                                            </p:txEl>
-                                          </p:spTgt>
-                                        </p:tgtEl>
-                                        <p:attrNameLst>
-                                          <p:attrName>style.visibility</p:attrName>
-                                        </p:attrNameLst>
-                                      </p:cBhvr>
-                                      <p:to>
-                                        <p:strVal val="visible"/>
-                                      </p:to>
-                                    </p:set>
-                                    <p:animEffect transition="in" filter="fade">
-                                      <p:cBhvr>
-                                        <p:cTn id="16" dur="500"/>
-                                        <p:tgtEl>
-                                          <p:spTgt spid="3">
-                                            <p:txEl>
-                                              <p:pRg st="1" end="1"/>
-                                            </p:txEl>
-                                          </p:spTgt>
-                                        </p:tgtEl>
-                                      </p:cBhvr>
-                                    </p:animEffect>
-                                  </p:childTnLst>
-                                </p:cTn>
-                              </p:par>
-                            </p:childTnLst>
-                          </p:cTn>
-                        </p:par>
-                      </p:childTnLst>
-                    </p:cTn>
-                  </p:par>
-                </p:childTnLst>
-              </p:cTn>
-              <p:prevCondLst>
-                <p:cond evt="onPrev" delay="0">
-                  <p:tgtEl>
-                    <p:sldTgt/>
-                  </p:tgtEl>
-                </p:cond>
-              </p:prevCondLst>
-              <p:nextCondLst>
-                <p:cond evt="onNext" delay="0">
-                  <p:tgtEl>
-                    <p:sldTgt/>
-                  </p:tgtEl>
-                </p:cond>
-              </p:nextCondLst>
-            </p:seq>
-          </p:childTnLst>
-        </p:cTn>
-      </p:par>
-    </p:tnLst>
-    <p:bldLst>
-      <p:bldP spid="2" grpId="0" animBg="1"/>
-      <p:bldP spid="3" grpId="0" uiExpand="1" build="p"/>
-    </p:bldLst>
-  </p:timing>
 </p:sld>
 </file>
 
@@ -21911,84 +19657,6 @@
     <a:masterClrMapping/>
   </p:clrMapOvr>
   <p:transition spd="med"/>
-  <p:timing>
-    <p:tnLst>
-      <p:par>
-        <p:cTn id="1" dur="indefinite" restart="never" nodeType="tmRoot">
-          <p:childTnLst>
-            <p:seq concurrent="1" nextAc="seek">
-              <p:cTn id="2" dur="indefinite" nodeType="mainSeq">
-                <p:childTnLst>
-                  <p:par>
-                    <p:cTn id="3" fill="hold">
-                      <p:stCondLst>
-                        <p:cond delay="indefinite"/>
-                      </p:stCondLst>
-                      <p:childTnLst>
-                        <p:par>
-                          <p:cTn id="4" fill="hold">
-                            <p:stCondLst>
-                              <p:cond delay="0"/>
-                            </p:stCondLst>
-                            <p:childTnLst>
-                              <p:par>
-                                <p:cTn id="5" presetID="1" presetClass="entr" presetSubtype="0" fill="hold" grpId="0" nodeType="clickEffect">
-                                  <p:stCondLst>
-                                    <p:cond delay="0"/>
-                                  </p:stCondLst>
-                                  <p:childTnLst>
-                                    <p:set>
-                                      <p:cBhvr>
-                                        <p:cTn id="6" dur="1" fill="hold">
-                                          <p:stCondLst>
-                                            <p:cond delay="0"/>
-                                          </p:stCondLst>
-                                        </p:cTn>
-                                        <p:tgtEl>
-                                          <p:spTgt spid="2"/>
-                                        </p:tgtEl>
-                                        <p:attrNameLst>
-                                          <p:attrName>style.visibility</p:attrName>
-                                        </p:attrNameLst>
-                                      </p:cBhvr>
-                                      <p:to>
-                                        <p:strVal val="visible"/>
-                                      </p:to>
-                                    </p:set>
-                                  </p:childTnLst>
-                                </p:cTn>
-                              </p:par>
-                            </p:childTnLst>
-                          </p:cTn>
-                        </p:par>
-                      </p:childTnLst>
-                    </p:cTn>
-                  </p:par>
-                </p:childTnLst>
-              </p:cTn>
-              <p:prevCondLst>
-                <p:cond evt="onPrev" delay="0">
-                  <p:tgtEl>
-                    <p:sldTgt/>
-                  </p:tgtEl>
-                </p:cond>
-              </p:prevCondLst>
-              <p:nextCondLst>
-                <p:cond evt="onNext" delay="0">
-                  <p:tgtEl>
-                    <p:sldTgt/>
-                  </p:tgtEl>
-                </p:cond>
-              </p:nextCondLst>
-            </p:seq>
-          </p:childTnLst>
-        </p:cTn>
-      </p:par>
-    </p:tnLst>
-    <p:bldLst>
-      <p:bldP spid="2" grpId="0" animBg="1"/>
-    </p:bldLst>
-  </p:timing>
 </p:sld>
 </file>
 
@@ -22108,7 +19776,7 @@
               <a:rPr lang="en-GB" dirty="0">
                 <a:latin typeface="Arial" panose="020B0604020202020204" pitchFamily="34" charset="0"/>
               </a:rPr>
-              <a:t>System Model</a:t>
+              <a:t>System Dynamic Model</a:t>
             </a:r>
             <a:endParaRPr lang="en-GB" dirty="0"/>
           </a:p>
@@ -22193,7 +19861,7 @@
           </a:ln>
           <a:extLst>
             <a:ext uri="{C572A759-6A51-4108-AA02-DFA0A04FC94B}">
-              <ma14:wrappingTextBoxFlag xmlns="" xmlns:ma14="http://schemas.microsoft.com/office/mac/drawingml/2011/main" xmlns:a14="http://schemas.microsoft.com/office/drawing/2010/main" xmlns:m="http://schemas.openxmlformats.org/officeDocument/2006/math" val="1"/>
+              <ma14:wrappingTextBoxFlag xmlns:m="http://schemas.openxmlformats.org/officeDocument/2006/math" xmlns:a14="http://schemas.microsoft.com/office/drawing/2010/main" xmlns:ma14="http://schemas.microsoft.com/office/mac/drawingml/2011/main" xmlns="" val="1"/>
             </a:ext>
           </a:extLst>
         </p:spPr>
@@ -22507,7 +20175,7 @@
                             </p:stCondLst>
                             <p:childTnLst>
                               <p:par>
-                                <p:cTn id="5" presetID="1" presetClass="entr" presetSubtype="0" fill="hold" grpId="0" nodeType="clickEffect">
+                                <p:cTn id="5" presetID="10" presetClass="entr" presetSubtype="0" fill="hold" grpId="0" nodeType="clickEffect">
                                   <p:stCondLst>
                                     <p:cond delay="0"/>
                                   </p:stCondLst>
@@ -22515,51 +20183,6 @@
                                     <p:set>
                                       <p:cBhvr>
                                         <p:cTn id="6" dur="1" fill="hold">
-                                          <p:stCondLst>
-                                            <p:cond delay="0"/>
-                                          </p:stCondLst>
-                                        </p:cTn>
-                                        <p:tgtEl>
-                                          <p:spTgt spid="2"/>
-                                        </p:tgtEl>
-                                        <p:attrNameLst>
-                                          <p:attrName>style.visibility</p:attrName>
-                                        </p:attrNameLst>
-                                      </p:cBhvr>
-                                      <p:to>
-                                        <p:strVal val="visible"/>
-                                      </p:to>
-                                    </p:set>
-                                  </p:childTnLst>
-                                </p:cTn>
-                              </p:par>
-                            </p:childTnLst>
-                          </p:cTn>
-                        </p:par>
-                      </p:childTnLst>
-                    </p:cTn>
-                  </p:par>
-                  <p:par>
-                    <p:cTn id="7" fill="hold">
-                      <p:stCondLst>
-                        <p:cond delay="indefinite"/>
-                      </p:stCondLst>
-                      <p:childTnLst>
-                        <p:par>
-                          <p:cTn id="8" fill="hold">
-                            <p:stCondLst>
-                              <p:cond delay="0"/>
-                            </p:stCondLst>
-                            <p:childTnLst>
-                              <p:par>
-                                <p:cTn id="9" presetID="10" presetClass="entr" presetSubtype="0" fill="hold" grpId="0" nodeType="clickEffect">
-                                  <p:stCondLst>
-                                    <p:cond delay="0"/>
-                                  </p:stCondLst>
-                                  <p:childTnLst>
-                                    <p:set>
-                                      <p:cBhvr>
-                                        <p:cTn id="10" dur="1" fill="hold">
                                           <p:stCondLst>
                                             <p:cond delay="0"/>
                                           </p:stCondLst>
@@ -22581,7 +20204,7 @@
                                     </p:set>
                                     <p:animEffect transition="in" filter="fade">
                                       <p:cBhvr>
-                                        <p:cTn id="11" dur="500"/>
+                                        <p:cTn id="7" dur="500"/>
                                         <p:tgtEl>
                                           <p:spTgt spid="3">
                                             <p:txEl>
@@ -22601,36 +20224,32 @@
                     </p:cTn>
                   </p:par>
                   <p:par>
-                    <p:cTn id="12" fill="hold">
+                    <p:cTn id="8" fill="hold">
                       <p:stCondLst>
                         <p:cond delay="indefinite"/>
                       </p:stCondLst>
                       <p:childTnLst>
                         <p:par>
-                          <p:cTn id="13" fill="hold">
+                          <p:cTn id="9" fill="hold">
                             <p:stCondLst>
                               <p:cond delay="0"/>
                             </p:stCondLst>
                             <p:childTnLst>
                               <p:par>
-                                <p:cTn id="14" presetID="10" presetClass="entr" presetSubtype="0" fill="hold" grpId="0" nodeType="clickEffect">
+                                <p:cTn id="10" presetID="10" presetClass="entr" presetSubtype="0" fill="hold" nodeType="clickEffect">
                                   <p:stCondLst>
                                     <p:cond delay="0"/>
                                   </p:stCondLst>
                                   <p:childTnLst>
                                     <p:set>
                                       <p:cBhvr>
-                                        <p:cTn id="15" dur="1" fill="hold">
+                                        <p:cTn id="11" dur="1" fill="hold">
                                           <p:stCondLst>
                                             <p:cond delay="0"/>
                                           </p:stCondLst>
                                         </p:cTn>
                                         <p:tgtEl>
-                                          <p:spTgt spid="4">
-                                            <p:txEl>
-                                              <p:pRg st="0" end="0"/>
-                                            </p:txEl>
-                                          </p:spTgt>
+                                          <p:spTgt spid="11"/>
                                         </p:tgtEl>
                                         <p:attrNameLst>
                                           <p:attrName>style.visibility</p:attrName>
@@ -22642,13 +20261,115 @@
                                     </p:set>
                                     <p:animEffect transition="in" filter="fade">
                                       <p:cBhvr>
-                                        <p:cTn id="16" dur="500"/>
+                                        <p:cTn id="12" dur="500"/>
                                         <p:tgtEl>
-                                          <p:spTgt spid="4">
-                                            <p:txEl>
-                                              <p:pRg st="0" end="0"/>
-                                            </p:txEl>
-                                          </p:spTgt>
+                                          <p:spTgt spid="11"/>
+                                        </p:tgtEl>
+                                      </p:cBhvr>
+                                    </p:animEffect>
+                                  </p:childTnLst>
+                                </p:cTn>
+                              </p:par>
+                            </p:childTnLst>
+                          </p:cTn>
+                        </p:par>
+                      </p:childTnLst>
+                    </p:cTn>
+                  </p:par>
+                  <p:par>
+                    <p:cTn id="13" fill="hold">
+                      <p:stCondLst>
+                        <p:cond delay="indefinite"/>
+                      </p:stCondLst>
+                      <p:childTnLst>
+                        <p:par>
+                          <p:cTn id="14" fill="hold">
+                            <p:stCondLst>
+                              <p:cond delay="0"/>
+                            </p:stCondLst>
+                            <p:childTnLst>
+                              <p:par>
+                                <p:cTn id="15" presetID="10" presetClass="entr" presetSubtype="0" fill="hold" grpId="0" nodeType="clickEffect">
+                                  <p:stCondLst>
+                                    <p:cond delay="0"/>
+                                  </p:stCondLst>
+                                  <p:childTnLst>
+                                    <p:set>
+                                      <p:cBhvr>
+                                        <p:cTn id="16" dur="1" fill="hold">
+                                          <p:stCondLst>
+                                            <p:cond delay="0"/>
+                                          </p:stCondLst>
+                                        </p:cTn>
+                                        <p:tgtEl>
+                                          <p:spTgt spid="4"/>
+                                        </p:tgtEl>
+                                        <p:attrNameLst>
+                                          <p:attrName>style.visibility</p:attrName>
+                                        </p:attrNameLst>
+                                      </p:cBhvr>
+                                      <p:to>
+                                        <p:strVal val="visible"/>
+                                      </p:to>
+                                    </p:set>
+                                    <p:animEffect transition="in" filter="fade">
+                                      <p:cBhvr>
+                                        <p:cTn id="17" dur="500"/>
+                                        <p:tgtEl>
+                                          <p:spTgt spid="4"/>
+                                        </p:tgtEl>
+                                      </p:cBhvr>
+                                    </p:animEffect>
+                                  </p:childTnLst>
+                                </p:cTn>
+                              </p:par>
+                            </p:childTnLst>
+                          </p:cTn>
+                        </p:par>
+                      </p:childTnLst>
+                    </p:cTn>
+                  </p:par>
+                  <p:par>
+                    <p:cTn id="18" fill="hold">
+                      <p:stCondLst>
+                        <p:cond delay="indefinite"/>
+                      </p:stCondLst>
+                      <p:childTnLst>
+                        <p:par>
+                          <p:cTn id="19" fill="hold">
+                            <p:stCondLst>
+                              <p:cond delay="0"/>
+                            </p:stCondLst>
+                            <p:childTnLst>
+                              <p:par>
+                                <p:cTn id="20" presetID="10" presetClass="entr" presetSubtype="0" fill="hold" nodeType="clickEffect">
+                                  <p:stCondLst>
+                                    <p:cond delay="0"/>
+                                  </p:stCondLst>
+                                  <p:childTnLst>
+                                    <p:set>
+                                      <p:cBhvr>
+                                        <p:cTn id="21" dur="1" fill="hold">
+                                          <p:stCondLst>
+                                            <p:cond delay="0"/>
+                                          </p:stCondLst>
+                                        </p:cTn>
+                                        <p:tgtEl>
+                                          <p:spTgt spid="9"/>
+                                        </p:tgtEl>
+                                        <p:attrNameLst>
+                                          <p:attrName>style.visibility</p:attrName>
+                                        </p:attrNameLst>
+                                      </p:cBhvr>
+                                      <p:to>
+                                        <p:strVal val="visible"/>
+                                      </p:to>
+                                    </p:set>
+                                    <p:animEffect transition="in" filter="fade">
+                                      <p:cBhvr>
+                                        <p:cTn id="22" dur="500"/>
+                                        <p:tgtEl>
+                                          <p:spTgt spid="9"/>
                                         </p:tgtEl>
                                       </p:cBhvr>
                                     </p:animEffect>
@@ -22683,9 +20404,8 @@
       </p:par>
     </p:tnLst>
     <p:bldLst>
-      <p:bldP spid="2" grpId="0" animBg="1"/>
       <p:bldP spid="3" grpId="0" uiExpand="1" build="p"/>
-      <p:bldP spid="4" grpId="0" uiExpand="1" build="p"/>
+      <p:bldP spid="4" grpId="0" animBg="1"/>
     </p:bldLst>
   </p:timing>
 </p:sld>
@@ -22886,146 +20606,6 @@
     <a:masterClrMapping/>
   </p:clrMapOvr>
   <p:transition spd="med"/>
-  <p:timing>
-    <p:tnLst>
-      <p:par>
-        <p:cTn id="1" dur="indefinite" restart="never" nodeType="tmRoot">
-          <p:childTnLst>
-            <p:seq concurrent="1" nextAc="seek">
-              <p:cTn id="2" dur="indefinite" nodeType="mainSeq">
-                <p:childTnLst>
-                  <p:par>
-                    <p:cTn id="3" fill="hold">
-                      <p:stCondLst>
-                        <p:cond delay="indefinite"/>
-                      </p:stCondLst>
-                      <p:childTnLst>
-                        <p:par>
-                          <p:cTn id="4" fill="hold">
-                            <p:stCondLst>
-                              <p:cond delay="0"/>
-                            </p:stCondLst>
-                            <p:childTnLst>
-                              <p:par>
-                                <p:cTn id="5" presetID="1" presetClass="entr" presetSubtype="0" fill="hold" grpId="0" nodeType="clickEffect">
-                                  <p:stCondLst>
-                                    <p:cond delay="0"/>
-                                  </p:stCondLst>
-                                  <p:childTnLst>
-                                    <p:set>
-                                      <p:cBhvr>
-                                        <p:cTn id="6" dur="1" fill="hold">
-                                          <p:stCondLst>
-                                            <p:cond delay="0"/>
-                                          </p:stCondLst>
-                                        </p:cTn>
-                                        <p:tgtEl>
-                                          <p:spTgt spid="2"/>
-                                        </p:tgtEl>
-                                        <p:attrNameLst>
-                                          <p:attrName>style.visibility</p:attrName>
-                                        </p:attrNameLst>
-                                      </p:cBhvr>
-                                      <p:to>
-                                        <p:strVal val="visible"/>
-                                      </p:to>
-                                    </p:set>
-                                  </p:childTnLst>
-                                </p:cTn>
-                              </p:par>
-                            </p:childTnLst>
-                          </p:cTn>
-                        </p:par>
-                      </p:childTnLst>
-                    </p:cTn>
-                  </p:par>
-                  <p:par>
-                    <p:cTn id="7" fill="hold">
-                      <p:stCondLst>
-                        <p:cond delay="indefinite"/>
-                      </p:stCondLst>
-                      <p:childTnLst>
-                        <p:par>
-                          <p:cTn id="8" fill="hold">
-                            <p:stCondLst>
-                              <p:cond delay="0"/>
-                            </p:stCondLst>
-                            <p:childTnLst>
-                              <p:par>
-                                <p:cTn id="9" presetID="10" presetClass="entr" presetSubtype="0" fill="hold" grpId="0" nodeType="clickEffect">
-                                  <p:stCondLst>
-                                    <p:cond delay="0"/>
-                                  </p:stCondLst>
-                                  <p:childTnLst>
-                                    <p:set>
-                                      <p:cBhvr>
-                                        <p:cTn id="10" dur="1" fill="hold">
-                                          <p:stCondLst>
-                                            <p:cond delay="0"/>
-                                          </p:stCondLst>
-                                        </p:cTn>
-                                        <p:tgtEl>
-                                          <p:spTgt spid="3">
-                                            <p:txEl>
-                                              <p:pRg st="0" end="0"/>
-                                            </p:txEl>
-                                          </p:spTgt>
-                                        </p:tgtEl>
-                                        <p:attrNameLst>
-                                          <p:attrName>style.visibility</p:attrName>
-                                        </p:attrNameLst>
-                                      </p:cBhvr>
-                                      <p:to>
-                                        <p:strVal val="visible"/>
-                                      </p:to>
-                                    </p:set>
-                                    <p:animEffect transition="in" filter="fade">
-                                      <p:cBhvr>
-                                        <p:cTn id="11" dur="500"/>
-                                        <p:tgtEl>
-                                          <p:spTgt spid="3">
-                                            <p:txEl>
-                                              <p:pRg st="0" end="0"/>
-                                            </p:txEl>
-                                          </p:spTgt>
-                                        </p:tgtEl>
-                                      </p:cBhvr>
-                                    </p:animEffect>
-                                  </p:childTnLst>
-                                </p:cTn>
-                              </p:par>
-                            </p:childTnLst>
-                          </p:cTn>
-                        </p:par>
-                      </p:childTnLst>
-                    </p:cTn>
-                  </p:par>
-                </p:childTnLst>
-              </p:cTn>
-              <p:prevCondLst>
-                <p:cond evt="onPrev" delay="0">
-                  <p:tgtEl>
-                    <p:sldTgt/>
-                  </p:tgtEl>
-                </p:cond>
-              </p:prevCondLst>
-              <p:nextCondLst>
-                <p:cond evt="onNext" delay="0">
-                  <p:tgtEl>
-                    <p:sldTgt/>
-                  </p:tgtEl>
-                </p:cond>
-              </p:nextCondLst>
-            </p:seq>
-          </p:childTnLst>
-        </p:cTn>
-      </p:par>
-    </p:tnLst>
-    <p:bldLst>
-      <p:bldP spid="2" grpId="0" animBg="1"/>
-      <p:bldP spid="3" grpId="0" uiExpand="1" build="p"/>
-    </p:bldLst>
-  </p:timing>
 </p:sld>
 </file>
 
@@ -23189,146 +20769,6 @@
     <a:masterClrMapping/>
   </p:clrMapOvr>
   <p:transition spd="med"/>
-  <p:timing>
-    <p:tnLst>
-      <p:par>
-        <p:cTn id="1" dur="indefinite" restart="never" nodeType="tmRoot">
-          <p:childTnLst>
-            <p:seq concurrent="1" nextAc="seek">
-              <p:cTn id="2" dur="indefinite" nodeType="mainSeq">
-                <p:childTnLst>
-                  <p:par>
-                    <p:cTn id="3" fill="hold">
-                      <p:stCondLst>
-                        <p:cond delay="indefinite"/>
-                      </p:stCondLst>
-                      <p:childTnLst>
-                        <p:par>
-                          <p:cTn id="4" fill="hold">
-                            <p:stCondLst>
-                              <p:cond delay="0"/>
-                            </p:stCondLst>
-                            <p:childTnLst>
-                              <p:par>
-                                <p:cTn id="5" presetID="1" presetClass="entr" presetSubtype="0" fill="hold" grpId="0" nodeType="clickEffect">
-                                  <p:stCondLst>
-                                    <p:cond delay="0"/>
-                                  </p:stCondLst>
-                                  <p:childTnLst>
-                                    <p:set>
-                                      <p:cBhvr>
-                                        <p:cTn id="6" dur="1" fill="hold">
-                                          <p:stCondLst>
-                                            <p:cond delay="0"/>
-                                          </p:stCondLst>
-                                        </p:cTn>
-                                        <p:tgtEl>
-                                          <p:spTgt spid="2"/>
-                                        </p:tgtEl>
-                                        <p:attrNameLst>
-                                          <p:attrName>style.visibility</p:attrName>
-                                        </p:attrNameLst>
-                                      </p:cBhvr>
-                                      <p:to>
-                                        <p:strVal val="visible"/>
-                                      </p:to>
-                                    </p:set>
-                                  </p:childTnLst>
-                                </p:cTn>
-                              </p:par>
-                            </p:childTnLst>
-                          </p:cTn>
-                        </p:par>
-                      </p:childTnLst>
-                    </p:cTn>
-                  </p:par>
-                  <p:par>
-                    <p:cTn id="7" fill="hold">
-                      <p:stCondLst>
-                        <p:cond delay="indefinite"/>
-                      </p:stCondLst>
-                      <p:childTnLst>
-                        <p:par>
-                          <p:cTn id="8" fill="hold">
-                            <p:stCondLst>
-                              <p:cond delay="0"/>
-                            </p:stCondLst>
-                            <p:childTnLst>
-                              <p:par>
-                                <p:cTn id="9" presetID="10" presetClass="entr" presetSubtype="0" fill="hold" grpId="0" nodeType="clickEffect">
-                                  <p:stCondLst>
-                                    <p:cond delay="0"/>
-                                  </p:stCondLst>
-                                  <p:childTnLst>
-                                    <p:set>
-                                      <p:cBhvr>
-                                        <p:cTn id="10" dur="1" fill="hold">
-                                          <p:stCondLst>
-                                            <p:cond delay="0"/>
-                                          </p:stCondLst>
-                                        </p:cTn>
-                                        <p:tgtEl>
-                                          <p:spTgt spid="3">
-                                            <p:txEl>
-                                              <p:pRg st="0" end="0"/>
-                                            </p:txEl>
-                                          </p:spTgt>
-                                        </p:tgtEl>
-                                        <p:attrNameLst>
-                                          <p:attrName>style.visibility</p:attrName>
-                                        </p:attrNameLst>
-                                      </p:cBhvr>
-                                      <p:to>
-                                        <p:strVal val="visible"/>
-                                      </p:to>
-                                    </p:set>
-                                    <p:animEffect transition="in" filter="fade">
-                                      <p:cBhvr>
-                                        <p:cTn id="11" dur="500"/>
-                                        <p:tgtEl>
-                                          <p:spTgt spid="3">
-                                            <p:txEl>
-                                              <p:pRg st="0" end="0"/>
-                                            </p:txEl>
-                                          </p:spTgt>
-                                        </p:tgtEl>
-                                      </p:cBhvr>
-                                    </p:animEffect>
-                                  </p:childTnLst>
-                                </p:cTn>
-                              </p:par>
-                            </p:childTnLst>
-                          </p:cTn>
-                        </p:par>
-                      </p:childTnLst>
-                    </p:cTn>
-                  </p:par>
-                </p:childTnLst>
-              </p:cTn>
-              <p:prevCondLst>
-                <p:cond evt="onPrev" delay="0">
-                  <p:tgtEl>
-                    <p:sldTgt/>
-                  </p:tgtEl>
-                </p:cond>
-              </p:prevCondLst>
-              <p:nextCondLst>
-                <p:cond evt="onNext" delay="0">
-                  <p:tgtEl>
-                    <p:sldTgt/>
-                  </p:tgtEl>
-                </p:cond>
-              </p:nextCondLst>
-            </p:seq>
-          </p:childTnLst>
-        </p:cTn>
-      </p:par>
-    </p:tnLst>
-    <p:bldLst>
-      <p:bldP spid="2" grpId="0" animBg="1"/>
-      <p:bldP spid="3" grpId="0" uiExpand="1" build="p"/>
-    </p:bldLst>
-  </p:timing>
 </p:sld>
 </file>
 
@@ -25644,15 +23084,6 @@
 </file>
 
 <file path=customXml/item2.xml><?xml version="1.0" encoding="utf-8"?>
-<?mso-contentType ?>
-<FormTemplates xmlns="http://schemas.microsoft.com/sharepoint/v3/contenttype/forms">
-  <Display>DocumentLibraryForm</Display>
-  <Edit>DocumentLibraryForm</Edit>
-  <New>DocumentLibraryForm</New>
-</FormTemplates>
-</file>
-
-<file path=customXml/item3.xml><?xml version="1.0" encoding="utf-8"?>
 <p:properties xmlns:p="http://schemas.microsoft.com/office/2006/metadata/properties" xmlns:xsi="http://www.w3.org/2001/XMLSchema-instance" xmlns:pc="http://schemas.microsoft.com/office/infopath/2007/PartnerControls">
   <documentManagement>
     <SharedWithUsers xmlns="4878a322-d110-404d-8591-8977e4f7768d">
@@ -25669,6 +23100,15 @@
     </SharedWithUsers>
   </documentManagement>
 </p:properties>
+</file>
+
+<file path=customXml/item3.xml><?xml version="1.0" encoding="utf-8"?>
+<?mso-contentType ?>
+<FormTemplates xmlns="http://schemas.microsoft.com/sharepoint/v3/contenttype/forms">
+  <Display>DocumentLibraryForm</Display>
+  <Edit>DocumentLibraryForm</Edit>
+  <New>DocumentLibraryForm</New>
+</FormTemplates>
 </file>
 
 <file path=customXml/itemProps1.xml><?xml version="1.0" encoding="utf-8"?>
@@ -25691,14 +23131,6 @@
 </file>
 
 <file path=customXml/itemProps2.xml><?xml version="1.0" encoding="utf-8"?>
-<ds:datastoreItem xmlns:ds="http://schemas.openxmlformats.org/officeDocument/2006/customXml" ds:itemID="{AA0E60D1-47F0-4938-95EF-8D82199D5953}">
-  <ds:schemaRefs>
-    <ds:schemaRef ds:uri="http://schemas.microsoft.com/sharepoint/v3/contenttype/forms"/>
-  </ds:schemaRefs>
-</ds:datastoreItem>
-</file>
-
-<file path=customXml/itemProps3.xml><?xml version="1.0" encoding="utf-8"?>
 <ds:datastoreItem xmlns:ds="http://schemas.openxmlformats.org/officeDocument/2006/customXml" ds:itemID="{F5C1CCE6-C8A7-4511-AAE7-C62DEFECE697}">
   <ds:schemaRefs>
     <ds:schemaRef ds:uri="http://schemas.microsoft.com/office/2006/documentManagement/types"/>
@@ -25713,4 +23145,12 @@
     <ds:schemaRef ds:uri="0fee4eeb-e725-4e09-a2c6-b2e7e1963b2c"/>
   </ds:schemaRefs>
 </ds:datastoreItem>
+</file>
+
+<file path=customXml/itemProps3.xml><?xml version="1.0" encoding="utf-8"?>
+<ds:datastoreItem xmlns:ds="http://schemas.openxmlformats.org/officeDocument/2006/customXml" ds:itemID="{AA0E60D1-47F0-4938-95EF-8D82199D5953}">
+  <ds:schemaRefs>
+    <ds:schemaRef ds:uri="http://schemas.microsoft.com/sharepoint/v3/contenttype/forms"/>
+  </ds:schemaRefs>
+</ds:datastoreItem>
 </file>
</xml_diff>

<commit_message>
update the final verison of midterm
</commit_message>
<xml_diff>
--- a/paperwork/ppt/Ting_midterm.pptx
+++ b/paperwork/ppt/Ting_midterm.pptx
@@ -5,7 +5,7 @@
     <p:sldMasterId id="2147483648" r:id="rId4"/>
   </p:sldMasterIdLst>
   <p:notesMasterIdLst>
-    <p:notesMasterId r:id="rId31"/>
+    <p:notesMasterId r:id="rId32"/>
   </p:notesMasterIdLst>
   <p:sldIdLst>
     <p:sldId id="687" r:id="rId5"/>
@@ -32,8 +32,9 @@
     <p:sldId id="719" r:id="rId26"/>
     <p:sldId id="730" r:id="rId27"/>
     <p:sldId id="731" r:id="rId28"/>
-    <p:sldId id="724" r:id="rId29"/>
-    <p:sldId id="704" r:id="rId30"/>
+    <p:sldId id="740" r:id="rId29"/>
+    <p:sldId id="724" r:id="rId30"/>
+    <p:sldId id="704" r:id="rId31"/>
   </p:sldIdLst>
   <p:sldSz cx="12192000" cy="6858000"/>
   <p:notesSz cx="6858000" cy="9144000"/>
@@ -2015,7 +2016,7 @@
             </a:r>
             <a:r>
               <a:rPr lang="en-GB" dirty="0"/>
-              <a:t> and 10 robots were released, they are far from each other at the beginning, we are assuming they know their initial state, then they moving randomly</a:t>
+              <a:t> and 10 robots were released, they are far from each other at the beginning, we are assuming they know their initial state, then they moving randomly, and no obstacles avoiding is applied. </a:t>
             </a:r>
           </a:p>
           <a:p>
@@ -2101,9 +2102,37 @@
           <a:bodyPr/>
           <a:lstStyle/>
           <a:p>
-            <a:endParaRPr lang="en-GB" dirty="0"/>
-          </a:p>
-          <a:p>
+            <a:r>
+              <a:rPr lang="en-US" dirty="0"/>
+              <a:t>We first check the trajectory, </a:t>
+            </a:r>
+          </a:p>
+          <a:p>
+            <a:endParaRPr lang="en-US" dirty="0"/>
+          </a:p>
+          <a:p>
+            <a:r>
+              <a:rPr lang="en-US" dirty="0"/>
+              <a:t>The left side shows the odometry has large drift, without other information, the estimation will have large bias.</a:t>
+            </a:r>
+          </a:p>
+          <a:p>
+            <a:endParaRPr lang="en-US" dirty="0"/>
+          </a:p>
+          <a:p>
+            <a:r>
+              <a:rPr lang="en-US" dirty="0"/>
+              <a:t>The right-side shows that applying OWA style multi-rate EKF, the estimation is basically follows the true trajectory. </a:t>
+            </a:r>
+          </a:p>
+          <a:p>
+            <a:endParaRPr lang="en-US" dirty="0"/>
+          </a:p>
+          <a:p>
+            <a:r>
+              <a:rPr lang="en-US" dirty="0"/>
+              <a:t>The orange raising indicates at that time, the merging situation happened, with the OWA multi-rate EKF, the localization system can overcome this disturbance.</a:t>
+            </a:r>
             <a:endParaRPr lang="en-GB" dirty="0"/>
           </a:p>
         </p:txBody>
@@ -2172,7 +2201,155 @@
           <a:p>
             <a:r>
               <a:rPr lang="en-GB" dirty="0"/>
-              <a:t>With above work, the tasks on the coming months would be first implement the localization into real robot</a:t>
+              <a:t>Then we compare the MSE under different localization method.</a:t>
+            </a:r>
+          </a:p>
+          <a:p>
+            <a:endParaRPr lang="en-GB" dirty="0"/>
+          </a:p>
+          <a:p>
+            <a:r>
+              <a:rPr lang="en-GB" dirty="0"/>
+              <a:t>Each block of data in the upper table, stands for the average MSE of 10 robots in one round under one method.</a:t>
+            </a:r>
+          </a:p>
+          <a:p>
+            <a:endParaRPr lang="en-GB" dirty="0"/>
+          </a:p>
+          <a:p>
+            <a:r>
+              <a:rPr lang="en-GB" dirty="0"/>
+              <a:t>In each row, data are relatively close to each other, but some biased data also exist, for example, in the last row, with the OWA multi-rate EKF, in the first round, the MSE is larger than other. This is because the random processing noise and random moving, when lots of robots are gathering, the only reliable source is odometry, and the odometry is drifted, in that case, </a:t>
+            </a:r>
+            <a:r>
+              <a:rPr lang="en-US" altLang="zh-CN" b="0" i="0" dirty="0">
+                <a:solidFill>
+                  <a:srgbClr val="BDC1C6"/>
+                </a:solidFill>
+                <a:effectLst/>
+                <a:latin typeface="arial" panose="020B0604020202020204" pitchFamily="34" charset="0"/>
+              </a:rPr>
+              <a:t>outliers might show up.</a:t>
+            </a:r>
+          </a:p>
+          <a:p>
+            <a:endParaRPr lang="en-US" b="0" i="0" dirty="0">
+              <a:solidFill>
+                <a:srgbClr val="BDC1C6"/>
+              </a:solidFill>
+              <a:effectLst/>
+              <a:latin typeface="arial" panose="020B0604020202020204" pitchFamily="34" charset="0"/>
+            </a:endParaRPr>
+          </a:p>
+          <a:p>
+            <a:r>
+              <a:rPr lang="en-GB" dirty="0"/>
+              <a:t>Then we take the average MSE among all rounds, we can get the table below. </a:t>
+            </a:r>
+          </a:p>
+          <a:p>
+            <a:endParaRPr lang="en-GB" dirty="0"/>
+          </a:p>
+          <a:p>
+            <a:r>
+              <a:rPr lang="en-GB" dirty="0"/>
+              <a:t>These results show that by applying data fusion method, the estimation accuracy is improved. </a:t>
+            </a:r>
+          </a:p>
+          <a:p>
+            <a:endParaRPr lang="en-GB" dirty="0"/>
+          </a:p>
+          <a:p>
+            <a:r>
+              <a:rPr lang="en-GB" dirty="0"/>
+              <a:t>The multi-rate EKF doesn’t outperform the single-rate EKF, but the way we combining different Kalman filter do make a difference. </a:t>
+            </a:r>
+          </a:p>
+          <a:p>
+            <a:endParaRPr lang="en-GB" dirty="0"/>
+          </a:p>
+          <a:p>
+            <a:r>
+              <a:rPr lang="en-GB" dirty="0"/>
+              <a:t>The OWA adaptive style is better than the cascade style, and performance gap might be enlarged in long term application, because the drift will be become larger as time goes by.</a:t>
+            </a:r>
+          </a:p>
+          <a:p>
+            <a:endParaRPr lang="en-GB" dirty="0"/>
+          </a:p>
+          <a:p>
+            <a:endParaRPr lang="en-GB" dirty="0"/>
+          </a:p>
+          <a:p>
+            <a:endParaRPr lang="en-GB" dirty="0"/>
+          </a:p>
+        </p:txBody>
+      </p:sp>
+    </p:spTree>
+    <p:extLst>
+      <p:ext uri="{BB962C8B-B14F-4D97-AF65-F5344CB8AC3E}">
+        <p14:creationId xmlns:p14="http://schemas.microsoft.com/office/powerpoint/2010/main" val="737010858"/>
+      </p:ext>
+    </p:extLst>
+  </p:cSld>
+  <p:clrMapOvr>
+    <a:masterClrMapping/>
+  </p:clrMapOvr>
+</p:notes>
+</file>
+
+<file path=ppt/notesSlides/notesSlide26.xml><?xml version="1.0" encoding="utf-8"?>
+<p:notes xmlns:a="http://schemas.openxmlformats.org/drawingml/2006/main" xmlns:r="http://schemas.openxmlformats.org/officeDocument/2006/relationships" xmlns:p="http://schemas.openxmlformats.org/presentationml/2006/main">
+  <p:cSld>
+    <p:spTree>
+      <p:nvGrpSpPr>
+        <p:cNvPr id="1" name=""/>
+        <p:cNvGrpSpPr/>
+        <p:nvPr/>
+      </p:nvGrpSpPr>
+      <p:grpSpPr>
+        <a:xfrm>
+          <a:off x="0" y="0"/>
+          <a:ext cx="0" cy="0"/>
+          <a:chOff x="0" y="0"/>
+          <a:chExt cx="0" cy="0"/>
+        </a:xfrm>
+      </p:grpSpPr>
+      <p:sp>
+        <p:nvSpPr>
+          <p:cNvPr id="2" name="Slide Image Placeholder 1"/>
+          <p:cNvSpPr>
+            <a:spLocks noGrp="1" noRot="1" noChangeAspect="1"/>
+          </p:cNvSpPr>
+          <p:nvPr>
+            <p:ph type="sldImg"/>
+          </p:nvPr>
+        </p:nvSpPr>
+        <p:spPr>
+          <a:xfrm>
+            <a:off x="381000" y="685800"/>
+            <a:ext cx="6096000" cy="3429000"/>
+          </a:xfrm>
+        </p:spPr>
+      </p:sp>
+      <p:sp>
+        <p:nvSpPr>
+          <p:cNvPr id="3" name="Notes Placeholder 2"/>
+          <p:cNvSpPr>
+            <a:spLocks noGrp="1"/>
+          </p:cNvSpPr>
+          <p:nvPr>
+            <p:ph type="body" idx="1"/>
+          </p:nvPr>
+        </p:nvSpPr>
+        <p:spPr/>
+        <p:txBody>
+          <a:bodyPr/>
+          <a:lstStyle/>
+          <a:p>
+            <a:r>
+              <a:rPr lang="en-GB" dirty="0"/>
+              <a:t>With above result, we can say that the above architectures raise the estimation accuracy, the tasks on the coming months would be first implement the localization into real robot, and conduct experiment on real object.</a:t>
             </a:r>
           </a:p>
         </p:txBody>
@@ -2190,7 +2367,7 @@
 </p:notes>
 </file>
 
-<file path=ppt/notesSlides/notesSlide26.xml><?xml version="1.0" encoding="utf-8"?>
+<file path=ppt/notesSlides/notesSlide27.xml><?xml version="1.0" encoding="utf-8"?>
 <p:notes xmlns:a="http://schemas.openxmlformats.org/drawingml/2006/main" xmlns:r="http://schemas.openxmlformats.org/officeDocument/2006/relationships" xmlns:p="http://schemas.openxmlformats.org/presentationml/2006/main">
   <p:cSld>
     <p:spTree>
@@ -3159,7 +3336,7 @@
                 <a:effectLst/>
                 <a:extLst>
                   <a:ext uri="{C572A759-6A51-4108-AA02-DFA0A04FC94B}">
-                    <ma14:wrappingTextBoxFlag xmlns:m="http://schemas.openxmlformats.org/officeDocument/2006/math" xmlns:a14="http://schemas.microsoft.com/office/drawing/2010/main" xmlns:ma14="http://schemas.microsoft.com/office/mac/drawingml/2011/main" xmlns="" val="1"/>
+                    <ma14:wrappingTextBoxFlag xmlns="" xmlns:ma14="http://schemas.microsoft.com/office/mac/drawingml/2011/main" xmlns:a14="http://schemas.microsoft.com/office/drawing/2010/main" xmlns:m="http://schemas.openxmlformats.org/officeDocument/2006/math" val="1"/>
                   </a:ext>
                 </a:extLst>
               </p:spPr>
@@ -3264,7 +3441,7 @@
                 <a:effectLst/>
                 <a:extLst>
                   <a:ext uri="{C572A759-6A51-4108-AA02-DFA0A04FC94B}">
-                    <ma14:wrappingTextBoxFlag xmlns:m="http://schemas.openxmlformats.org/officeDocument/2006/math" xmlns:a14="http://schemas.microsoft.com/office/drawing/2010/main" xmlns:ma14="http://schemas.microsoft.com/office/mac/drawingml/2011/main" xmlns="" val="1"/>
+                    <ma14:wrappingTextBoxFlag xmlns="" xmlns:ma14="http://schemas.microsoft.com/office/mac/drawingml/2011/main" xmlns:a14="http://schemas.microsoft.com/office/drawing/2010/main" xmlns:m="http://schemas.openxmlformats.org/officeDocument/2006/math" val="1"/>
                   </a:ext>
                 </a:extLst>
               </p:spPr>
@@ -3315,7 +3492,7 @@
               <a:effectLst/>
               <a:extLst>
                 <a:ext uri="{C572A759-6A51-4108-AA02-DFA0A04FC94B}">
-                  <ma14:wrappingTextBoxFlag xmlns:m="http://schemas.openxmlformats.org/officeDocument/2006/math" xmlns:a14="http://schemas.microsoft.com/office/drawing/2010/main" xmlns:ma14="http://schemas.microsoft.com/office/mac/drawingml/2011/main" xmlns="" val="1"/>
+                  <ma14:wrappingTextBoxFlag xmlns="" xmlns:ma14="http://schemas.microsoft.com/office/mac/drawingml/2011/main" xmlns:a14="http://schemas.microsoft.com/office/drawing/2010/main" xmlns:m="http://schemas.openxmlformats.org/officeDocument/2006/math" val="1"/>
                 </a:ext>
               </a:extLst>
             </p:spPr>
@@ -3426,7 +3603,7 @@
                 <a:effectLst/>
                 <a:extLst>
                   <a:ext uri="{C572A759-6A51-4108-AA02-DFA0A04FC94B}">
-                    <ma14:wrappingTextBoxFlag xmlns:m="http://schemas.openxmlformats.org/officeDocument/2006/math" xmlns:a14="http://schemas.microsoft.com/office/drawing/2010/main" xmlns:ma14="http://schemas.microsoft.com/office/mac/drawingml/2011/main" xmlns="" val="1"/>
+                    <ma14:wrappingTextBoxFlag xmlns="" xmlns:ma14="http://schemas.microsoft.com/office/mac/drawingml/2011/main" xmlns:a14="http://schemas.microsoft.com/office/drawing/2010/main" xmlns:m="http://schemas.openxmlformats.org/officeDocument/2006/math" val="1"/>
                   </a:ext>
                 </a:extLst>
               </p:spPr>
@@ -3477,7 +3654,7 @@
               <a:effectLst/>
               <a:extLst>
                 <a:ext uri="{C572A759-6A51-4108-AA02-DFA0A04FC94B}">
-                  <ma14:wrappingTextBoxFlag xmlns:m="http://schemas.openxmlformats.org/officeDocument/2006/math" xmlns:a14="http://schemas.microsoft.com/office/drawing/2010/main" xmlns:ma14="http://schemas.microsoft.com/office/mac/drawingml/2011/main" xmlns="" val="1"/>
+                  <ma14:wrappingTextBoxFlag xmlns="" xmlns:ma14="http://schemas.microsoft.com/office/mac/drawingml/2011/main" xmlns:a14="http://schemas.microsoft.com/office/drawing/2010/main" xmlns:m="http://schemas.openxmlformats.org/officeDocument/2006/math" val="1"/>
                 </a:ext>
               </a:extLst>
             </p:spPr>
@@ -3815,7 +3992,7 @@
                 <a:effectLst/>
                 <a:extLst>
                   <a:ext uri="{C572A759-6A51-4108-AA02-DFA0A04FC94B}">
-                    <ma14:wrappingTextBoxFlag xmlns:m="http://schemas.openxmlformats.org/officeDocument/2006/math" xmlns:a14="http://schemas.microsoft.com/office/drawing/2010/main" xmlns:ma14="http://schemas.microsoft.com/office/mac/drawingml/2011/main" xmlns="" val="1"/>
+                    <ma14:wrappingTextBoxFlag xmlns="" xmlns:ma14="http://schemas.microsoft.com/office/mac/drawingml/2011/main" xmlns:a14="http://schemas.microsoft.com/office/drawing/2010/main" xmlns:m="http://schemas.openxmlformats.org/officeDocument/2006/math" val="1"/>
                   </a:ext>
                 </a:extLst>
               </p:spPr>
@@ -5314,7 +5491,7 @@
           </a:ln>
           <a:extLst>
             <a:ext uri="{C572A759-6A51-4108-AA02-DFA0A04FC94B}">
-              <ma14:wrappingTextBoxFlag xmlns:m="http://schemas.openxmlformats.org/officeDocument/2006/math" xmlns:a14="http://schemas.microsoft.com/office/drawing/2010/main" xmlns:ma14="http://schemas.microsoft.com/office/mac/drawingml/2011/main" xmlns="" val="1"/>
+              <ma14:wrappingTextBoxFlag xmlns="" xmlns:ma14="http://schemas.microsoft.com/office/mac/drawingml/2011/main" xmlns:a14="http://schemas.microsoft.com/office/drawing/2010/main" xmlns:m="http://schemas.openxmlformats.org/officeDocument/2006/math" val="1"/>
             </a:ext>
           </a:extLst>
         </p:spPr>
@@ -5588,7 +5765,7 @@
               <a:effectLst/>
               <a:extLst>
                 <a:ext uri="{C572A759-6A51-4108-AA02-DFA0A04FC94B}">
-                  <ma14:wrappingTextBoxFlag xmlns:m="http://schemas.openxmlformats.org/officeDocument/2006/math" xmlns:a14="http://schemas.microsoft.com/office/drawing/2010/main" xmlns:ma14="http://schemas.microsoft.com/office/mac/drawingml/2011/main" xmlns="" val="1"/>
+                  <ma14:wrappingTextBoxFlag xmlns="" xmlns:ma14="http://schemas.microsoft.com/office/mac/drawingml/2011/main" xmlns:a14="http://schemas.microsoft.com/office/drawing/2010/main" xmlns:m="http://schemas.openxmlformats.org/officeDocument/2006/math" val="1"/>
                 </a:ext>
               </a:extLst>
             </p:spPr>
@@ -5693,7 +5870,7 @@
               <a:effectLst/>
               <a:extLst>
                 <a:ext uri="{C572A759-6A51-4108-AA02-DFA0A04FC94B}">
-                  <ma14:wrappingTextBoxFlag xmlns:m="http://schemas.openxmlformats.org/officeDocument/2006/math" xmlns:a14="http://schemas.microsoft.com/office/drawing/2010/main" xmlns:ma14="http://schemas.microsoft.com/office/mac/drawingml/2011/main" xmlns="" val="1"/>
+                  <ma14:wrappingTextBoxFlag xmlns="" xmlns:ma14="http://schemas.microsoft.com/office/mac/drawingml/2011/main" xmlns:a14="http://schemas.microsoft.com/office/drawing/2010/main" xmlns:m="http://schemas.openxmlformats.org/officeDocument/2006/math" val="1"/>
                 </a:ext>
               </a:extLst>
             </p:spPr>
@@ -5744,7 +5921,7 @@
             <a:effectLst/>
             <a:extLst>
               <a:ext uri="{C572A759-6A51-4108-AA02-DFA0A04FC94B}">
-                <ma14:wrappingTextBoxFlag xmlns:m="http://schemas.openxmlformats.org/officeDocument/2006/math" xmlns:a14="http://schemas.microsoft.com/office/drawing/2010/main" xmlns:ma14="http://schemas.microsoft.com/office/mac/drawingml/2011/main" xmlns="" val="1"/>
+                <ma14:wrappingTextBoxFlag xmlns="" xmlns:ma14="http://schemas.microsoft.com/office/mac/drawingml/2011/main" xmlns:a14="http://schemas.microsoft.com/office/drawing/2010/main" xmlns:m="http://schemas.openxmlformats.org/officeDocument/2006/math" val="1"/>
               </a:ext>
             </a:extLst>
           </p:spPr>
@@ -5848,7 +6025,7 @@
               <a:effectLst/>
               <a:extLst>
                 <a:ext uri="{C572A759-6A51-4108-AA02-DFA0A04FC94B}">
-                  <ma14:wrappingTextBoxFlag xmlns:m="http://schemas.openxmlformats.org/officeDocument/2006/math" xmlns:a14="http://schemas.microsoft.com/office/drawing/2010/main" xmlns:ma14="http://schemas.microsoft.com/office/mac/drawingml/2011/main" xmlns="" val="1"/>
+                  <ma14:wrappingTextBoxFlag xmlns="" xmlns:ma14="http://schemas.microsoft.com/office/mac/drawingml/2011/main" xmlns:a14="http://schemas.microsoft.com/office/drawing/2010/main" xmlns:m="http://schemas.openxmlformats.org/officeDocument/2006/math" val="1"/>
                 </a:ext>
               </a:extLst>
             </p:spPr>
@@ -5899,7 +6076,7 @@
             <a:effectLst/>
             <a:extLst>
               <a:ext uri="{C572A759-6A51-4108-AA02-DFA0A04FC94B}">
-                <ma14:wrappingTextBoxFlag xmlns:m="http://schemas.openxmlformats.org/officeDocument/2006/math" xmlns:a14="http://schemas.microsoft.com/office/drawing/2010/main" xmlns:ma14="http://schemas.microsoft.com/office/mac/drawingml/2011/main" xmlns="" val="1"/>
+                <ma14:wrappingTextBoxFlag xmlns="" xmlns:ma14="http://schemas.microsoft.com/office/mac/drawingml/2011/main" xmlns:a14="http://schemas.microsoft.com/office/drawing/2010/main" xmlns:m="http://schemas.openxmlformats.org/officeDocument/2006/math" val="1"/>
               </a:ext>
             </a:extLst>
           </p:spPr>
@@ -7445,7 +7622,7 @@
                 <a:effectLst/>
                 <a:extLst>
                   <a:ext uri="{C572A759-6A51-4108-AA02-DFA0A04FC94B}">
-                    <ma14:wrappingTextBoxFlag xmlns:m="http://schemas.openxmlformats.org/officeDocument/2006/math" xmlns:a14="http://schemas.microsoft.com/office/drawing/2010/main" xmlns:ma14="http://schemas.microsoft.com/office/mac/drawingml/2011/main" xmlns="" val="1"/>
+                    <ma14:wrappingTextBoxFlag xmlns="" xmlns:ma14="http://schemas.microsoft.com/office/mac/drawingml/2011/main" xmlns:a14="http://schemas.microsoft.com/office/drawing/2010/main" xmlns:m="http://schemas.openxmlformats.org/officeDocument/2006/math" val="1"/>
                   </a:ext>
                 </a:extLst>
               </p:spPr>
@@ -7550,7 +7727,7 @@
                 <a:effectLst/>
                 <a:extLst>
                   <a:ext uri="{C572A759-6A51-4108-AA02-DFA0A04FC94B}">
-                    <ma14:wrappingTextBoxFlag xmlns:m="http://schemas.openxmlformats.org/officeDocument/2006/math" xmlns:a14="http://schemas.microsoft.com/office/drawing/2010/main" xmlns:ma14="http://schemas.microsoft.com/office/mac/drawingml/2011/main" xmlns="" val="1"/>
+                    <ma14:wrappingTextBoxFlag xmlns="" xmlns:ma14="http://schemas.microsoft.com/office/mac/drawingml/2011/main" xmlns:a14="http://schemas.microsoft.com/office/drawing/2010/main" xmlns:m="http://schemas.openxmlformats.org/officeDocument/2006/math" val="1"/>
                   </a:ext>
                 </a:extLst>
               </p:spPr>
@@ -7601,7 +7778,7 @@
               <a:effectLst/>
               <a:extLst>
                 <a:ext uri="{C572A759-6A51-4108-AA02-DFA0A04FC94B}">
-                  <ma14:wrappingTextBoxFlag xmlns:m="http://schemas.openxmlformats.org/officeDocument/2006/math" xmlns:a14="http://schemas.microsoft.com/office/drawing/2010/main" xmlns:ma14="http://schemas.microsoft.com/office/mac/drawingml/2011/main" xmlns="" val="1"/>
+                  <ma14:wrappingTextBoxFlag xmlns="" xmlns:ma14="http://schemas.microsoft.com/office/mac/drawingml/2011/main" xmlns:a14="http://schemas.microsoft.com/office/drawing/2010/main" xmlns:m="http://schemas.openxmlformats.org/officeDocument/2006/math" val="1"/>
                 </a:ext>
               </a:extLst>
             </p:spPr>
@@ -7712,7 +7889,7 @@
                 <a:effectLst/>
                 <a:extLst>
                   <a:ext uri="{C572A759-6A51-4108-AA02-DFA0A04FC94B}">
-                    <ma14:wrappingTextBoxFlag xmlns:m="http://schemas.openxmlformats.org/officeDocument/2006/math" xmlns:a14="http://schemas.microsoft.com/office/drawing/2010/main" xmlns:ma14="http://schemas.microsoft.com/office/mac/drawingml/2011/main" xmlns="" val="1"/>
+                    <ma14:wrappingTextBoxFlag xmlns="" xmlns:ma14="http://schemas.microsoft.com/office/mac/drawingml/2011/main" xmlns:a14="http://schemas.microsoft.com/office/drawing/2010/main" xmlns:m="http://schemas.openxmlformats.org/officeDocument/2006/math" val="1"/>
                   </a:ext>
                 </a:extLst>
               </p:spPr>
@@ -7763,7 +7940,7 @@
               <a:effectLst/>
               <a:extLst>
                 <a:ext uri="{C572A759-6A51-4108-AA02-DFA0A04FC94B}">
-                  <ma14:wrappingTextBoxFlag xmlns:m="http://schemas.openxmlformats.org/officeDocument/2006/math" xmlns:a14="http://schemas.microsoft.com/office/drawing/2010/main" xmlns:ma14="http://schemas.microsoft.com/office/mac/drawingml/2011/main" xmlns="" val="1"/>
+                  <ma14:wrappingTextBoxFlag xmlns="" xmlns:ma14="http://schemas.microsoft.com/office/mac/drawingml/2011/main" xmlns:a14="http://schemas.microsoft.com/office/drawing/2010/main" xmlns:m="http://schemas.openxmlformats.org/officeDocument/2006/math" val="1"/>
                 </a:ext>
               </a:extLst>
             </p:spPr>
@@ -8101,7 +8278,7 @@
                 <a:effectLst/>
                 <a:extLst>
                   <a:ext uri="{C572A759-6A51-4108-AA02-DFA0A04FC94B}">
-                    <ma14:wrappingTextBoxFlag xmlns:m="http://schemas.openxmlformats.org/officeDocument/2006/math" xmlns:a14="http://schemas.microsoft.com/office/drawing/2010/main" xmlns:ma14="http://schemas.microsoft.com/office/mac/drawingml/2011/main" xmlns="" val="1"/>
+                    <ma14:wrappingTextBoxFlag xmlns="" xmlns:ma14="http://schemas.microsoft.com/office/mac/drawingml/2011/main" xmlns:a14="http://schemas.microsoft.com/office/drawing/2010/main" xmlns:m="http://schemas.openxmlformats.org/officeDocument/2006/math" val="1"/>
                   </a:ext>
                 </a:extLst>
               </p:spPr>
@@ -11792,7 +11969,7 @@
           </a:ln>
           <a:extLst>
             <a:ext uri="{C572A759-6A51-4108-AA02-DFA0A04FC94B}">
-              <ma14:wrappingTextBoxFlag xmlns="" xmlns:m="http://schemas.openxmlformats.org/officeDocument/2006/math" xmlns:a14="http://schemas.microsoft.com/office/drawing/2010/main" xmlns:ma14="http://schemas.microsoft.com/office/mac/drawingml/2011/main" val="1"/>
+              <ma14:wrappingTextBoxFlag xmlns:ma14="http://schemas.microsoft.com/office/mac/drawingml/2011/main" xmlns:a14="http://schemas.microsoft.com/office/drawing/2010/main" xmlns:m="http://schemas.openxmlformats.org/officeDocument/2006/math" xmlns="" val="1"/>
             </a:ext>
           </a:extLst>
         </p:spPr>
@@ -13679,7 +13856,7 @@
           </a:ln>
           <a:extLst>
             <a:ext uri="{C572A759-6A51-4108-AA02-DFA0A04FC94B}">
-              <ma14:wrappingTextBoxFlag xmlns:m="http://schemas.openxmlformats.org/officeDocument/2006/math" xmlns:a14="http://schemas.microsoft.com/office/drawing/2010/main" xmlns:ma14="http://schemas.microsoft.com/office/mac/drawingml/2011/main" xmlns="" val="1"/>
+              <ma14:wrappingTextBoxFlag xmlns="" xmlns:ma14="http://schemas.microsoft.com/office/mac/drawingml/2011/main" xmlns:a14="http://schemas.microsoft.com/office/drawing/2010/main" xmlns:m="http://schemas.openxmlformats.org/officeDocument/2006/math" val="1"/>
             </a:ext>
           </a:extLst>
         </p:spPr>
@@ -13716,7 +13893,7 @@
           </a:ln>
           <a:extLst>
             <a:ext uri="{C572A759-6A51-4108-AA02-DFA0A04FC94B}">
-              <ma14:wrappingTextBoxFlag xmlns:m="http://schemas.openxmlformats.org/officeDocument/2006/math" xmlns:a14="http://schemas.microsoft.com/office/drawing/2010/main" xmlns:ma14="http://schemas.microsoft.com/office/mac/drawingml/2011/main" xmlns="" val="1"/>
+              <ma14:wrappingTextBoxFlag xmlns="" xmlns:ma14="http://schemas.microsoft.com/office/mac/drawingml/2011/main" xmlns:a14="http://schemas.microsoft.com/office/drawing/2010/main" xmlns:m="http://schemas.openxmlformats.org/officeDocument/2006/math" val="1"/>
             </a:ext>
           </a:extLst>
         </p:spPr>
@@ -14678,7 +14855,7 @@
           </a:prstGeom>
           <a:extLst>
             <a:ext uri="{C572A759-6A51-4108-AA02-DFA0A04FC94B}">
-              <ma14:wrappingTextBoxFlag xmlns:ma14="http://schemas.microsoft.com/office/mac/drawingml/2011/main" xmlns:a14="http://schemas.microsoft.com/office/drawing/2010/main" xmlns:m="http://schemas.openxmlformats.org/officeDocument/2006/math" xmlns="" val="1"/>
+              <ma14:wrappingTextBoxFlag xmlns="" xmlns:m="http://schemas.openxmlformats.org/officeDocument/2006/math" xmlns:a14="http://schemas.microsoft.com/office/drawing/2010/main" xmlns:ma14="http://schemas.microsoft.com/office/mac/drawingml/2011/main" val="1"/>
             </a:ext>
           </a:extLst>
         </p:spPr>
@@ -14714,7 +14891,7 @@
           </a:prstGeom>
           <a:extLst>
             <a:ext uri="{C572A759-6A51-4108-AA02-DFA0A04FC94B}">
-              <ma14:wrappingTextBoxFlag xmlns:ma14="http://schemas.microsoft.com/office/mac/drawingml/2011/main" xmlns:a14="http://schemas.microsoft.com/office/drawing/2010/main" xmlns:m="http://schemas.openxmlformats.org/officeDocument/2006/math" xmlns="" val="1"/>
+              <ma14:wrappingTextBoxFlag xmlns="" xmlns:m="http://schemas.openxmlformats.org/officeDocument/2006/math" xmlns:a14="http://schemas.microsoft.com/office/drawing/2010/main" xmlns:ma14="http://schemas.microsoft.com/office/mac/drawingml/2011/main" val="1"/>
             </a:ext>
           </a:extLst>
         </p:spPr>
@@ -15770,7 +15947,7 @@
           </a:ln>
           <a:extLst>
             <a:ext uri="{C572A759-6A51-4108-AA02-DFA0A04FC94B}">
-              <ma14:wrappingTextBoxFlag xmlns:m="http://schemas.openxmlformats.org/officeDocument/2006/math" xmlns:a14="http://schemas.microsoft.com/office/drawing/2010/main" xmlns:ma14="http://schemas.microsoft.com/office/mac/drawingml/2011/main" xmlns="" val="1"/>
+              <ma14:wrappingTextBoxFlag xmlns="" xmlns:ma14="http://schemas.microsoft.com/office/mac/drawingml/2011/main" xmlns:a14="http://schemas.microsoft.com/office/drawing/2010/main" xmlns:m="http://schemas.openxmlformats.org/officeDocument/2006/math" val="1"/>
             </a:ext>
           </a:extLst>
         </p:spPr>
@@ -16850,7 +17027,7 @@
           </a:ln>
           <a:extLst>
             <a:ext uri="{C572A759-6A51-4108-AA02-DFA0A04FC94B}">
-              <ma14:wrappingTextBoxFlag xmlns:m="http://schemas.openxmlformats.org/officeDocument/2006/math" xmlns:a14="http://schemas.microsoft.com/office/drawing/2010/main" xmlns:ma14="http://schemas.microsoft.com/office/mac/drawingml/2011/main" xmlns="" val="1"/>
+              <ma14:wrappingTextBoxFlag xmlns="" xmlns:ma14="http://schemas.microsoft.com/office/mac/drawingml/2011/main" xmlns:a14="http://schemas.microsoft.com/office/drawing/2010/main" xmlns:m="http://schemas.openxmlformats.org/officeDocument/2006/math" val="1"/>
             </a:ext>
           </a:extLst>
         </p:spPr>
@@ -17661,7 +17838,7 @@
           </a:ln>
           <a:extLst>
             <a:ext uri="{C572A759-6A51-4108-AA02-DFA0A04FC94B}">
-              <ma14:wrappingTextBoxFlag xmlns="" xmlns:m="http://schemas.openxmlformats.org/officeDocument/2006/math" xmlns:a14="http://schemas.microsoft.com/office/drawing/2010/main" xmlns:ma14="http://schemas.microsoft.com/office/mac/drawingml/2011/main" val="1"/>
+              <ma14:wrappingTextBoxFlag xmlns:ma14="http://schemas.microsoft.com/office/mac/drawingml/2011/main" xmlns:a14="http://schemas.microsoft.com/office/drawing/2010/main" xmlns:m="http://schemas.openxmlformats.org/officeDocument/2006/math" xmlns="" val="1"/>
             </a:ext>
           </a:extLst>
         </p:spPr>
@@ -18797,7 +18974,7 @@
         </p:nvSpPr>
         <p:spPr>
           <a:xfrm>
-            <a:off x="698500" y="1028021"/>
+            <a:off x="698500" y="773378"/>
             <a:ext cx="10773500" cy="459134"/>
           </a:xfrm>
         </p:spPr>
@@ -18818,7 +18995,703 @@
               <a:rPr lang="en-GB" altLang="zh-CN" sz="2400" dirty="0">
                 <a:latin typeface="Arial" panose="020B0604020202020204" pitchFamily="34" charset="0"/>
               </a:rPr>
-              <a:t>Metrics: mean square error (MSE)</a:t>
+              <a:t>Trajectory</a:t>
+            </a:r>
+          </a:p>
+        </p:txBody>
+      </p:sp>
+      <p:pic>
+        <p:nvPicPr>
+          <p:cNvPr id="6" name="图片 5" descr="图表, 折线图&#10;&#10;描述已自动生成">
+            <a:extLst>
+              <a:ext uri="{FF2B5EF4-FFF2-40B4-BE49-F238E27FC236}">
+                <a16:creationId xmlns:a16="http://schemas.microsoft.com/office/drawing/2014/main" id="{C227922B-7C44-6D11-6D6F-D022CB415DA9}"/>
+              </a:ext>
+            </a:extLst>
+          </p:cNvPr>
+          <p:cNvPicPr>
+            <a:picLocks noChangeAspect="1"/>
+          </p:cNvPicPr>
+          <p:nvPr/>
+        </p:nvPicPr>
+        <p:blipFill>
+          <a:blip r:embed="rId3">
+            <a:extLst>
+              <a:ext uri="{28A0092B-C50C-407E-A947-70E740481C1C}">
+                <a14:useLocalDpi xmlns:a14="http://schemas.microsoft.com/office/drawing/2010/main" val="0"/>
+              </a:ext>
+            </a:extLst>
+          </a:blip>
+          <a:stretch>
+            <a:fillRect/>
+          </a:stretch>
+        </p:blipFill>
+        <p:spPr>
+          <a:xfrm>
+            <a:off x="6385257" y="1834397"/>
+            <a:ext cx="5806743" cy="4355057"/>
+          </a:xfrm>
+          <a:prstGeom prst="rect">
+            <a:avLst/>
+          </a:prstGeom>
+        </p:spPr>
+      </p:pic>
+      <p:pic>
+        <p:nvPicPr>
+          <p:cNvPr id="8" name="图片 7" descr="图表, 折线图&#10;&#10;描述已自动生成">
+            <a:extLst>
+              <a:ext uri="{FF2B5EF4-FFF2-40B4-BE49-F238E27FC236}">
+                <a16:creationId xmlns:a16="http://schemas.microsoft.com/office/drawing/2014/main" id="{E57C23FB-6259-6D23-BAB7-61271CC19484}"/>
+              </a:ext>
+            </a:extLst>
+          </p:cNvPr>
+          <p:cNvPicPr>
+            <a:picLocks noChangeAspect="1"/>
+          </p:cNvPicPr>
+          <p:nvPr/>
+        </p:nvPicPr>
+        <p:blipFill>
+          <a:blip r:embed="rId4">
+            <a:extLst>
+              <a:ext uri="{28A0092B-C50C-407E-A947-70E740481C1C}">
+                <a14:useLocalDpi xmlns:a14="http://schemas.microsoft.com/office/drawing/2010/main" val="0"/>
+              </a:ext>
+            </a:extLst>
+          </a:blip>
+          <a:stretch>
+            <a:fillRect/>
+          </a:stretch>
+        </p:blipFill>
+        <p:spPr>
+          <a:xfrm>
+            <a:off x="289258" y="1787440"/>
+            <a:ext cx="5806743" cy="4355057"/>
+          </a:xfrm>
+          <a:prstGeom prst="rect">
+            <a:avLst/>
+          </a:prstGeom>
+        </p:spPr>
+      </p:pic>
+      <p:sp>
+        <p:nvSpPr>
+          <p:cNvPr id="9" name="Text Placeholder 2">
+            <a:extLst>
+              <a:ext uri="{FF2B5EF4-FFF2-40B4-BE49-F238E27FC236}">
+                <a16:creationId xmlns:a16="http://schemas.microsoft.com/office/drawing/2014/main" id="{ACF7B7FC-75CC-F094-E767-B8305CC9C1EB}"/>
+              </a:ext>
+            </a:extLst>
+          </p:cNvPr>
+          <p:cNvSpPr txBox="1">
+            <a:spLocks/>
+          </p:cNvSpPr>
+          <p:nvPr/>
+        </p:nvSpPr>
+        <p:spPr>
+          <a:xfrm>
+            <a:off x="698500" y="1614633"/>
+            <a:ext cx="4811049" cy="459134"/>
+          </a:xfrm>
+          <a:prstGeom prst="rect">
+            <a:avLst/>
+          </a:prstGeom>
+          <a:ln w="12700">
+            <a:miter lim="400000"/>
+          </a:ln>
+          <a:extLst>
+            <a:ext uri="{C572A759-6A51-4108-AA02-DFA0A04FC94B}">
+              <ma14:wrappingTextBoxFlag xmlns="" xmlns:ma14="http://schemas.microsoft.com/office/mac/drawingml/2011/main" xmlns:a14="http://schemas.microsoft.com/office/drawing/2010/main" xmlns:m="http://schemas.openxmlformats.org/officeDocument/2006/math" val="1"/>
+            </a:ext>
+          </a:extLst>
+        </p:spPr>
+        <p:txBody>
+          <a:bodyPr lIns="0" tIns="0" rIns="0" bIns="0">
+            <a:normAutofit/>
+          </a:bodyPr>
+          <a:lstStyle>
+            <a:lvl1pPr marL="263525" marR="0" indent="-263525" algn="l" defTabSz="719137" rtl="0" latinLnBrk="0">
+              <a:lnSpc>
+                <a:spcPct val="90000"/>
+              </a:lnSpc>
+              <a:spcBef>
+                <a:spcPts val="1200"/>
+              </a:spcBef>
+              <a:spcAft>
+                <a:spcPts val="0"/>
+              </a:spcAft>
+              <a:buClr>
+                <a:schemeClr val="accent1"/>
+              </a:buClr>
+              <a:buSzPct val="100000"/>
+              <a:buFontTx/>
+              <a:buChar char="▪"/>
+              <a:tabLst/>
+              <a:defRPr sz="1600" b="0" i="0" u="none" strike="noStrike" cap="none" spc="0" baseline="0">
+                <a:solidFill>
+                  <a:srgbClr val="000000"/>
+                </a:solidFill>
+                <a:uFillTx/>
+                <a:latin typeface="Arial"/>
+                <a:ea typeface="Arial"/>
+                <a:cs typeface="Arial"/>
+                <a:sym typeface="Arial"/>
+              </a:defRPr>
+            </a:lvl1pPr>
+            <a:lvl2pPr marL="538162" marR="0" indent="-274638" algn="l" defTabSz="719137" rtl="0" latinLnBrk="0">
+              <a:lnSpc>
+                <a:spcPct val="90000"/>
+              </a:lnSpc>
+              <a:spcBef>
+                <a:spcPts val="1200"/>
+              </a:spcBef>
+              <a:spcAft>
+                <a:spcPts val="0"/>
+              </a:spcAft>
+              <a:buClr>
+                <a:schemeClr val="accent1"/>
+              </a:buClr>
+              <a:buSzPct val="100000"/>
+              <a:buFontTx/>
+              <a:buChar char="▪"/>
+              <a:tabLst/>
+              <a:defRPr sz="1600" b="0" i="0" u="none" strike="noStrike" cap="none" spc="0" baseline="0">
+                <a:solidFill>
+                  <a:srgbClr val="000000"/>
+                </a:solidFill>
+                <a:uFillTx/>
+                <a:latin typeface="Arial"/>
+                <a:ea typeface="Arial"/>
+                <a:cs typeface="Arial"/>
+                <a:sym typeface="Arial"/>
+              </a:defRPr>
+            </a:lvl2pPr>
+            <a:lvl3pPr marL="0" marR="0" indent="0" algn="l" defTabSz="719137" rtl="0" latinLnBrk="0">
+              <a:lnSpc>
+                <a:spcPct val="90000"/>
+              </a:lnSpc>
+              <a:spcBef>
+                <a:spcPts val="1200"/>
+              </a:spcBef>
+              <a:spcAft>
+                <a:spcPts val="0"/>
+              </a:spcAft>
+              <a:buClr>
+                <a:schemeClr val="accent1"/>
+              </a:buClr>
+              <a:buSzTx/>
+              <a:buFont typeface="Wingdings"/>
+              <a:buNone/>
+              <a:tabLst/>
+              <a:defRPr sz="1600" b="0" i="0" u="none" strike="noStrike" cap="none" spc="0" baseline="0">
+                <a:solidFill>
+                  <a:srgbClr val="000000"/>
+                </a:solidFill>
+                <a:uFillTx/>
+                <a:latin typeface="Arial"/>
+                <a:ea typeface="Arial"/>
+                <a:cs typeface="Arial"/>
+                <a:sym typeface="Arial"/>
+              </a:defRPr>
+            </a:lvl3pPr>
+            <a:lvl4pPr marL="0" marR="0" indent="0" algn="l" defTabSz="719137" rtl="0" latinLnBrk="0">
+              <a:lnSpc>
+                <a:spcPct val="90000"/>
+              </a:lnSpc>
+              <a:spcBef>
+                <a:spcPts val="1200"/>
+              </a:spcBef>
+              <a:spcAft>
+                <a:spcPts val="0"/>
+              </a:spcAft>
+              <a:buClr>
+                <a:schemeClr val="accent1"/>
+              </a:buClr>
+              <a:buSzTx/>
+              <a:buFont typeface="Wingdings"/>
+              <a:buNone/>
+              <a:tabLst/>
+              <a:defRPr sz="1600" b="0" i="0" u="none" strike="noStrike" cap="none" spc="0" baseline="0">
+                <a:solidFill>
+                  <a:srgbClr val="000000"/>
+                </a:solidFill>
+                <a:uFillTx/>
+                <a:latin typeface="Arial"/>
+                <a:ea typeface="Arial"/>
+                <a:cs typeface="Arial"/>
+                <a:sym typeface="Arial"/>
+              </a:defRPr>
+            </a:lvl4pPr>
+            <a:lvl5pPr marL="263525" marR="0" indent="-263525" algn="l" defTabSz="719137" rtl="0" latinLnBrk="0">
+              <a:lnSpc>
+                <a:spcPct val="90000"/>
+              </a:lnSpc>
+              <a:spcBef>
+                <a:spcPts val="1200"/>
+              </a:spcBef>
+              <a:spcAft>
+                <a:spcPts val="0"/>
+              </a:spcAft>
+              <a:buClr>
+                <a:schemeClr val="accent1"/>
+              </a:buClr>
+              <a:buSzPct val="100000"/>
+              <a:buFont typeface="Wingdings"/>
+              <a:buAutoNum type="arabicPeriod"/>
+              <a:tabLst/>
+              <a:defRPr sz="1600" b="0" i="0" u="none" strike="noStrike" cap="none" spc="0" baseline="0">
+                <a:solidFill>
+                  <a:srgbClr val="000000"/>
+                </a:solidFill>
+                <a:uFillTx/>
+                <a:latin typeface="Arial"/>
+                <a:ea typeface="Arial"/>
+                <a:cs typeface="Arial"/>
+                <a:sym typeface="Arial"/>
+              </a:defRPr>
+            </a:lvl5pPr>
+            <a:lvl6pPr marL="538162" marR="0" indent="-276225" algn="l" defTabSz="719137" rtl="0" latinLnBrk="0">
+              <a:lnSpc>
+                <a:spcPct val="90000"/>
+              </a:lnSpc>
+              <a:spcBef>
+                <a:spcPts val="1200"/>
+              </a:spcBef>
+              <a:spcAft>
+                <a:spcPts val="0"/>
+              </a:spcAft>
+              <a:buClr>
+                <a:schemeClr val="accent1"/>
+              </a:buClr>
+              <a:buSzPct val="100000"/>
+              <a:buFont typeface="Wingdings"/>
+              <a:buAutoNum type="alphaLcPeriod"/>
+              <a:tabLst/>
+              <a:defRPr sz="1600" b="0" i="0" u="none" strike="noStrike" cap="none" spc="0" baseline="0">
+                <a:solidFill>
+                  <a:srgbClr val="000000"/>
+                </a:solidFill>
+                <a:uFillTx/>
+                <a:latin typeface="Arial"/>
+                <a:ea typeface="Arial"/>
+                <a:cs typeface="Arial"/>
+                <a:sym typeface="Arial"/>
+              </a:defRPr>
+            </a:lvl6pPr>
+            <a:lvl7pPr marL="538162" marR="0" indent="-276225" algn="l" defTabSz="719137" rtl="0" latinLnBrk="0">
+              <a:lnSpc>
+                <a:spcPct val="90000"/>
+              </a:lnSpc>
+              <a:spcBef>
+                <a:spcPts val="1200"/>
+              </a:spcBef>
+              <a:spcAft>
+                <a:spcPts val="0"/>
+              </a:spcAft>
+              <a:buClr>
+                <a:schemeClr val="accent1"/>
+              </a:buClr>
+              <a:buSzPct val="100000"/>
+              <a:buFontTx/>
+              <a:buChar char="▪"/>
+              <a:tabLst/>
+              <a:defRPr sz="1600" b="0" i="0" u="none" strike="noStrike" cap="none" spc="0" baseline="0">
+                <a:solidFill>
+                  <a:srgbClr val="000000"/>
+                </a:solidFill>
+                <a:uFillTx/>
+                <a:latin typeface="Arial"/>
+                <a:ea typeface="Arial"/>
+                <a:cs typeface="Arial"/>
+                <a:sym typeface="Arial"/>
+              </a:defRPr>
+            </a:lvl7pPr>
+            <a:lvl8pPr marL="0" marR="0" indent="0" algn="l" defTabSz="719137" rtl="0" latinLnBrk="0">
+              <a:lnSpc>
+                <a:spcPct val="90000"/>
+              </a:lnSpc>
+              <a:spcBef>
+                <a:spcPts val="1200"/>
+              </a:spcBef>
+              <a:spcAft>
+                <a:spcPts val="0"/>
+              </a:spcAft>
+              <a:buClr>
+                <a:schemeClr val="accent1"/>
+              </a:buClr>
+              <a:buSzTx/>
+              <a:buFont typeface="Wingdings"/>
+              <a:buNone/>
+              <a:tabLst/>
+              <a:defRPr sz="1600" b="0" i="0" u="none" strike="noStrike" cap="none" spc="0" baseline="0">
+                <a:solidFill>
+                  <a:srgbClr val="000000"/>
+                </a:solidFill>
+                <a:uFillTx/>
+                <a:latin typeface="Arial"/>
+                <a:ea typeface="Arial"/>
+                <a:cs typeface="Arial"/>
+                <a:sym typeface="Arial"/>
+              </a:defRPr>
+            </a:lvl8pPr>
+            <a:lvl9pPr marL="0" marR="0" indent="0" algn="l" defTabSz="719137" rtl="0" latinLnBrk="0">
+              <a:lnSpc>
+                <a:spcPct val="90000"/>
+              </a:lnSpc>
+              <a:spcBef>
+                <a:spcPts val="1200"/>
+              </a:spcBef>
+              <a:spcAft>
+                <a:spcPts val="0"/>
+              </a:spcAft>
+              <a:buClr>
+                <a:schemeClr val="accent1"/>
+              </a:buClr>
+              <a:buSzTx/>
+              <a:buFont typeface="Wingdings"/>
+              <a:buNone/>
+              <a:tabLst/>
+              <a:defRPr sz="1600" b="0" i="0" u="none" strike="noStrike" cap="none" spc="0" baseline="0">
+                <a:solidFill>
+                  <a:srgbClr val="000000"/>
+                </a:solidFill>
+                <a:uFillTx/>
+                <a:latin typeface="Arial"/>
+                <a:ea typeface="Arial"/>
+                <a:cs typeface="Arial"/>
+                <a:sym typeface="Arial"/>
+              </a:defRPr>
+            </a:lvl9pPr>
+          </a:lstStyle>
+          <a:p>
+            <a:pPr marL="712788" hangingPunct="1">
+              <a:lnSpc>
+                <a:spcPct val="100000"/>
+              </a:lnSpc>
+              <a:buFont typeface="Arial" panose="020B0604020202020204" pitchFamily="34" charset="0"/>
+              <a:buChar char="•"/>
+            </a:pPr>
+            <a:r>
+              <a:rPr lang="en-GB" altLang="zh-CN" sz="2400" dirty="0">
+                <a:latin typeface="Arial" panose="020B0604020202020204" pitchFamily="34" charset="0"/>
+              </a:rPr>
+              <a:t>Odometry only</a:t>
+            </a:r>
+          </a:p>
+        </p:txBody>
+      </p:sp>
+      <p:sp>
+        <p:nvSpPr>
+          <p:cNvPr id="10" name="Text Placeholder 2">
+            <a:extLst>
+              <a:ext uri="{FF2B5EF4-FFF2-40B4-BE49-F238E27FC236}">
+                <a16:creationId xmlns:a16="http://schemas.microsoft.com/office/drawing/2014/main" id="{31410B60-3F1E-49D2-5EAD-310CE2E57E2E}"/>
+              </a:ext>
+            </a:extLst>
+          </p:cNvPr>
+          <p:cNvSpPr txBox="1">
+            <a:spLocks/>
+          </p:cNvSpPr>
+          <p:nvPr/>
+        </p:nvSpPr>
+        <p:spPr>
+          <a:xfrm>
+            <a:off x="6682453" y="1558530"/>
+            <a:ext cx="4811049" cy="459134"/>
+          </a:xfrm>
+          <a:prstGeom prst="rect">
+            <a:avLst/>
+          </a:prstGeom>
+          <a:ln w="12700">
+            <a:miter lim="400000"/>
+          </a:ln>
+          <a:extLst>
+            <a:ext uri="{C572A759-6A51-4108-AA02-DFA0A04FC94B}">
+              <ma14:wrappingTextBoxFlag xmlns="" xmlns:ma14="http://schemas.microsoft.com/office/mac/drawingml/2011/main" xmlns:a14="http://schemas.microsoft.com/office/drawing/2010/main" xmlns:m="http://schemas.openxmlformats.org/officeDocument/2006/math" val="1"/>
+            </a:ext>
+          </a:extLst>
+        </p:spPr>
+        <p:txBody>
+          <a:bodyPr lIns="0" tIns="0" rIns="0" bIns="0">
+            <a:normAutofit/>
+          </a:bodyPr>
+          <a:lstStyle>
+            <a:lvl1pPr marL="263525" marR="0" indent="-263525" algn="l" defTabSz="719137" rtl="0" latinLnBrk="0">
+              <a:lnSpc>
+                <a:spcPct val="90000"/>
+              </a:lnSpc>
+              <a:spcBef>
+                <a:spcPts val="1200"/>
+              </a:spcBef>
+              <a:spcAft>
+                <a:spcPts val="0"/>
+              </a:spcAft>
+              <a:buClr>
+                <a:schemeClr val="accent1"/>
+              </a:buClr>
+              <a:buSzPct val="100000"/>
+              <a:buFontTx/>
+              <a:buChar char="▪"/>
+              <a:tabLst/>
+              <a:defRPr sz="1600" b="0" i="0" u="none" strike="noStrike" cap="none" spc="0" baseline="0">
+                <a:solidFill>
+                  <a:srgbClr val="000000"/>
+                </a:solidFill>
+                <a:uFillTx/>
+                <a:latin typeface="Arial"/>
+                <a:ea typeface="Arial"/>
+                <a:cs typeface="Arial"/>
+                <a:sym typeface="Arial"/>
+              </a:defRPr>
+            </a:lvl1pPr>
+            <a:lvl2pPr marL="538162" marR="0" indent="-274638" algn="l" defTabSz="719137" rtl="0" latinLnBrk="0">
+              <a:lnSpc>
+                <a:spcPct val="90000"/>
+              </a:lnSpc>
+              <a:spcBef>
+                <a:spcPts val="1200"/>
+              </a:spcBef>
+              <a:spcAft>
+                <a:spcPts val="0"/>
+              </a:spcAft>
+              <a:buClr>
+                <a:schemeClr val="accent1"/>
+              </a:buClr>
+              <a:buSzPct val="100000"/>
+              <a:buFontTx/>
+              <a:buChar char="▪"/>
+              <a:tabLst/>
+              <a:defRPr sz="1600" b="0" i="0" u="none" strike="noStrike" cap="none" spc="0" baseline="0">
+                <a:solidFill>
+                  <a:srgbClr val="000000"/>
+                </a:solidFill>
+                <a:uFillTx/>
+                <a:latin typeface="Arial"/>
+                <a:ea typeface="Arial"/>
+                <a:cs typeface="Arial"/>
+                <a:sym typeface="Arial"/>
+              </a:defRPr>
+            </a:lvl2pPr>
+            <a:lvl3pPr marL="0" marR="0" indent="0" algn="l" defTabSz="719137" rtl="0" latinLnBrk="0">
+              <a:lnSpc>
+                <a:spcPct val="90000"/>
+              </a:lnSpc>
+              <a:spcBef>
+                <a:spcPts val="1200"/>
+              </a:spcBef>
+              <a:spcAft>
+                <a:spcPts val="0"/>
+              </a:spcAft>
+              <a:buClr>
+                <a:schemeClr val="accent1"/>
+              </a:buClr>
+              <a:buSzTx/>
+              <a:buFont typeface="Wingdings"/>
+              <a:buNone/>
+              <a:tabLst/>
+              <a:defRPr sz="1600" b="0" i="0" u="none" strike="noStrike" cap="none" spc="0" baseline="0">
+                <a:solidFill>
+                  <a:srgbClr val="000000"/>
+                </a:solidFill>
+                <a:uFillTx/>
+                <a:latin typeface="Arial"/>
+                <a:ea typeface="Arial"/>
+                <a:cs typeface="Arial"/>
+                <a:sym typeface="Arial"/>
+              </a:defRPr>
+            </a:lvl3pPr>
+            <a:lvl4pPr marL="0" marR="0" indent="0" algn="l" defTabSz="719137" rtl="0" latinLnBrk="0">
+              <a:lnSpc>
+                <a:spcPct val="90000"/>
+              </a:lnSpc>
+              <a:spcBef>
+                <a:spcPts val="1200"/>
+              </a:spcBef>
+              <a:spcAft>
+                <a:spcPts val="0"/>
+              </a:spcAft>
+              <a:buClr>
+                <a:schemeClr val="accent1"/>
+              </a:buClr>
+              <a:buSzTx/>
+              <a:buFont typeface="Wingdings"/>
+              <a:buNone/>
+              <a:tabLst/>
+              <a:defRPr sz="1600" b="0" i="0" u="none" strike="noStrike" cap="none" spc="0" baseline="0">
+                <a:solidFill>
+                  <a:srgbClr val="000000"/>
+                </a:solidFill>
+                <a:uFillTx/>
+                <a:latin typeface="Arial"/>
+                <a:ea typeface="Arial"/>
+                <a:cs typeface="Arial"/>
+                <a:sym typeface="Arial"/>
+              </a:defRPr>
+            </a:lvl4pPr>
+            <a:lvl5pPr marL="263525" marR="0" indent="-263525" algn="l" defTabSz="719137" rtl="0" latinLnBrk="0">
+              <a:lnSpc>
+                <a:spcPct val="90000"/>
+              </a:lnSpc>
+              <a:spcBef>
+                <a:spcPts val="1200"/>
+              </a:spcBef>
+              <a:spcAft>
+                <a:spcPts val="0"/>
+              </a:spcAft>
+              <a:buClr>
+                <a:schemeClr val="accent1"/>
+              </a:buClr>
+              <a:buSzPct val="100000"/>
+              <a:buFont typeface="Wingdings"/>
+              <a:buAutoNum type="arabicPeriod"/>
+              <a:tabLst/>
+              <a:defRPr sz="1600" b="0" i="0" u="none" strike="noStrike" cap="none" spc="0" baseline="0">
+                <a:solidFill>
+                  <a:srgbClr val="000000"/>
+                </a:solidFill>
+                <a:uFillTx/>
+                <a:latin typeface="Arial"/>
+                <a:ea typeface="Arial"/>
+                <a:cs typeface="Arial"/>
+                <a:sym typeface="Arial"/>
+              </a:defRPr>
+            </a:lvl5pPr>
+            <a:lvl6pPr marL="538162" marR="0" indent="-276225" algn="l" defTabSz="719137" rtl="0" latinLnBrk="0">
+              <a:lnSpc>
+                <a:spcPct val="90000"/>
+              </a:lnSpc>
+              <a:spcBef>
+                <a:spcPts val="1200"/>
+              </a:spcBef>
+              <a:spcAft>
+                <a:spcPts val="0"/>
+              </a:spcAft>
+              <a:buClr>
+                <a:schemeClr val="accent1"/>
+              </a:buClr>
+              <a:buSzPct val="100000"/>
+              <a:buFont typeface="Wingdings"/>
+              <a:buAutoNum type="alphaLcPeriod"/>
+              <a:tabLst/>
+              <a:defRPr sz="1600" b="0" i="0" u="none" strike="noStrike" cap="none" spc="0" baseline="0">
+                <a:solidFill>
+                  <a:srgbClr val="000000"/>
+                </a:solidFill>
+                <a:uFillTx/>
+                <a:latin typeface="Arial"/>
+                <a:ea typeface="Arial"/>
+                <a:cs typeface="Arial"/>
+                <a:sym typeface="Arial"/>
+              </a:defRPr>
+            </a:lvl6pPr>
+            <a:lvl7pPr marL="538162" marR="0" indent="-276225" algn="l" defTabSz="719137" rtl="0" latinLnBrk="0">
+              <a:lnSpc>
+                <a:spcPct val="90000"/>
+              </a:lnSpc>
+              <a:spcBef>
+                <a:spcPts val="1200"/>
+              </a:spcBef>
+              <a:spcAft>
+                <a:spcPts val="0"/>
+              </a:spcAft>
+              <a:buClr>
+                <a:schemeClr val="accent1"/>
+              </a:buClr>
+              <a:buSzPct val="100000"/>
+              <a:buFontTx/>
+              <a:buChar char="▪"/>
+              <a:tabLst/>
+              <a:defRPr sz="1600" b="0" i="0" u="none" strike="noStrike" cap="none" spc="0" baseline="0">
+                <a:solidFill>
+                  <a:srgbClr val="000000"/>
+                </a:solidFill>
+                <a:uFillTx/>
+                <a:latin typeface="Arial"/>
+                <a:ea typeface="Arial"/>
+                <a:cs typeface="Arial"/>
+                <a:sym typeface="Arial"/>
+              </a:defRPr>
+            </a:lvl7pPr>
+            <a:lvl8pPr marL="0" marR="0" indent="0" algn="l" defTabSz="719137" rtl="0" latinLnBrk="0">
+              <a:lnSpc>
+                <a:spcPct val="90000"/>
+              </a:lnSpc>
+              <a:spcBef>
+                <a:spcPts val="1200"/>
+              </a:spcBef>
+              <a:spcAft>
+                <a:spcPts val="0"/>
+              </a:spcAft>
+              <a:buClr>
+                <a:schemeClr val="accent1"/>
+              </a:buClr>
+              <a:buSzTx/>
+              <a:buFont typeface="Wingdings"/>
+              <a:buNone/>
+              <a:tabLst/>
+              <a:defRPr sz="1600" b="0" i="0" u="none" strike="noStrike" cap="none" spc="0" baseline="0">
+                <a:solidFill>
+                  <a:srgbClr val="000000"/>
+                </a:solidFill>
+                <a:uFillTx/>
+                <a:latin typeface="Arial"/>
+                <a:ea typeface="Arial"/>
+                <a:cs typeface="Arial"/>
+                <a:sym typeface="Arial"/>
+              </a:defRPr>
+            </a:lvl8pPr>
+            <a:lvl9pPr marL="0" marR="0" indent="0" algn="l" defTabSz="719137" rtl="0" latinLnBrk="0">
+              <a:lnSpc>
+                <a:spcPct val="90000"/>
+              </a:lnSpc>
+              <a:spcBef>
+                <a:spcPts val="1200"/>
+              </a:spcBef>
+              <a:spcAft>
+                <a:spcPts val="0"/>
+              </a:spcAft>
+              <a:buClr>
+                <a:schemeClr val="accent1"/>
+              </a:buClr>
+              <a:buSzTx/>
+              <a:buFont typeface="Wingdings"/>
+              <a:buNone/>
+              <a:tabLst/>
+              <a:defRPr sz="1600" b="0" i="0" u="none" strike="noStrike" cap="none" spc="0" baseline="0">
+                <a:solidFill>
+                  <a:srgbClr val="000000"/>
+                </a:solidFill>
+                <a:uFillTx/>
+                <a:latin typeface="Arial"/>
+                <a:ea typeface="Arial"/>
+                <a:cs typeface="Arial"/>
+                <a:sym typeface="Arial"/>
+              </a:defRPr>
+            </a:lvl9pPr>
+          </a:lstStyle>
+          <a:p>
+            <a:pPr marL="712788" hangingPunct="1">
+              <a:lnSpc>
+                <a:spcPct val="100000"/>
+              </a:lnSpc>
+              <a:buFont typeface="Arial" panose="020B0604020202020204" pitchFamily="34" charset="0"/>
+              <a:buChar char="•"/>
+            </a:pPr>
+            <a:r>
+              <a:rPr lang="en-GB" altLang="zh-CN" sz="2400" dirty="0">
+                <a:latin typeface="Arial" panose="020B0604020202020204" pitchFamily="34" charset="0"/>
+              </a:rPr>
+              <a:t>OWA </a:t>
+            </a:r>
+            <a:r>
+              <a:rPr lang="en-GB" altLang="zh-CN" sz="2400" dirty="0" err="1">
+                <a:latin typeface="Arial" panose="020B0604020202020204" pitchFamily="34" charset="0"/>
+              </a:rPr>
+              <a:t>mr</a:t>
+            </a:r>
+            <a:r>
+              <a:rPr lang="en-GB" altLang="zh-CN" sz="2400" dirty="0">
+                <a:latin typeface="Arial" panose="020B0604020202020204" pitchFamily="34" charset="0"/>
+              </a:rPr>
+              <a:t>-EKF</a:t>
             </a:r>
           </a:p>
         </p:txBody>
@@ -18872,6 +19745,492 @@
         </p:nvSpPr>
         <p:spPr>
           <a:xfrm>
+            <a:off x="698500" y="147139"/>
+            <a:ext cx="10775071" cy="841255"/>
+          </a:xfrm>
+        </p:spPr>
+        <p:txBody>
+          <a:bodyPr>
+            <a:noAutofit/>
+          </a:bodyPr>
+          <a:lstStyle/>
+          <a:p>
+            <a:r>
+              <a:rPr lang="en-GB" b="0" i="0" dirty="0">
+                <a:effectLst/>
+                <a:latin typeface="Arial" panose="020B0604020202020204" pitchFamily="34" charset="0"/>
+              </a:rPr>
+              <a:t>2. </a:t>
+            </a:r>
+            <a:r>
+              <a:rPr lang="en-GB" altLang="zh-CN" dirty="0">
+                <a:latin typeface="Arial" panose="020B0604020202020204" pitchFamily="34" charset="0"/>
+              </a:rPr>
+              <a:t>Result</a:t>
+            </a:r>
+            <a:endParaRPr lang="en-GB" dirty="0"/>
+          </a:p>
+        </p:txBody>
+      </p:sp>
+      <p:sp>
+        <p:nvSpPr>
+          <p:cNvPr id="3" name="Text Placeholder 2">
+            <a:extLst>
+              <a:ext uri="{FF2B5EF4-FFF2-40B4-BE49-F238E27FC236}">
+                <a16:creationId xmlns:a16="http://schemas.microsoft.com/office/drawing/2014/main" id="{D678EF46-F590-D77C-D3C8-251A4EDE1821}"/>
+              </a:ext>
+            </a:extLst>
+          </p:cNvPr>
+          <p:cNvSpPr>
+            <a:spLocks noGrp="1"/>
+          </p:cNvSpPr>
+          <p:nvPr>
+            <p:ph type="body" idx="1"/>
+          </p:nvPr>
+        </p:nvSpPr>
+        <p:spPr>
+          <a:xfrm>
+            <a:off x="698500" y="773378"/>
+            <a:ext cx="10773500" cy="459134"/>
+          </a:xfrm>
+        </p:spPr>
+        <p:txBody>
+          <a:bodyPr>
+            <a:normAutofit/>
+          </a:bodyPr>
+          <a:lstStyle/>
+          <a:p>
+            <a:pPr marL="712788">
+              <a:lnSpc>
+                <a:spcPct val="100000"/>
+              </a:lnSpc>
+              <a:buFont typeface="Arial" panose="020B0604020202020204" pitchFamily="34" charset="0"/>
+              <a:buChar char="•"/>
+            </a:pPr>
+            <a:r>
+              <a:rPr lang="en-GB" altLang="zh-CN" sz="2400" dirty="0">
+                <a:latin typeface="Arial" panose="020B0604020202020204" pitchFamily="34" charset="0"/>
+              </a:rPr>
+              <a:t>Metrics: mean square error (MSE) comparison</a:t>
+            </a:r>
+          </a:p>
+        </p:txBody>
+      </p:sp>
+      <p:pic>
+        <p:nvPicPr>
+          <p:cNvPr id="5" name="图片 4">
+            <a:extLst>
+              <a:ext uri="{FF2B5EF4-FFF2-40B4-BE49-F238E27FC236}">
+                <a16:creationId xmlns:a16="http://schemas.microsoft.com/office/drawing/2014/main" id="{207E7E15-08BD-94E8-15B4-1AB20B1DEFB5}"/>
+              </a:ext>
+            </a:extLst>
+          </p:cNvPr>
+          <p:cNvPicPr>
+            <a:picLocks noChangeAspect="1"/>
+          </p:cNvPicPr>
+          <p:nvPr/>
+        </p:nvPicPr>
+        <p:blipFill>
+          <a:blip r:embed="rId3"/>
+          <a:stretch>
+            <a:fillRect/>
+          </a:stretch>
+        </p:blipFill>
+        <p:spPr>
+          <a:xfrm>
+            <a:off x="1604962" y="1270130"/>
+            <a:ext cx="8982075" cy="2590800"/>
+          </a:xfrm>
+          <a:prstGeom prst="rect">
+            <a:avLst/>
+          </a:prstGeom>
+        </p:spPr>
+      </p:pic>
+      <p:pic>
+        <p:nvPicPr>
+          <p:cNvPr id="7" name="图片 6">
+            <a:extLst>
+              <a:ext uri="{FF2B5EF4-FFF2-40B4-BE49-F238E27FC236}">
+                <a16:creationId xmlns:a16="http://schemas.microsoft.com/office/drawing/2014/main" id="{0FC6BA8D-2614-2DAD-F321-8C6DE34A0BF5}"/>
+              </a:ext>
+            </a:extLst>
+          </p:cNvPr>
+          <p:cNvPicPr>
+            <a:picLocks noChangeAspect="1"/>
+          </p:cNvPicPr>
+          <p:nvPr/>
+        </p:nvPicPr>
+        <p:blipFill>
+          <a:blip r:embed="rId4"/>
+          <a:stretch>
+            <a:fillRect/>
+          </a:stretch>
+        </p:blipFill>
+        <p:spPr>
+          <a:xfrm>
+            <a:off x="1556112" y="4577244"/>
+            <a:ext cx="9058275" cy="828675"/>
+          </a:xfrm>
+          <a:prstGeom prst="rect">
+            <a:avLst/>
+          </a:prstGeom>
+        </p:spPr>
+      </p:pic>
+      <p:sp>
+        <p:nvSpPr>
+          <p:cNvPr id="8" name="Text Placeholder 2">
+            <a:extLst>
+              <a:ext uri="{FF2B5EF4-FFF2-40B4-BE49-F238E27FC236}">
+                <a16:creationId xmlns:a16="http://schemas.microsoft.com/office/drawing/2014/main" id="{F6ADE69F-8B8D-3833-B275-26A1EE201D3A}"/>
+              </a:ext>
+            </a:extLst>
+          </p:cNvPr>
+          <p:cNvSpPr txBox="1">
+            <a:spLocks/>
+          </p:cNvSpPr>
+          <p:nvPr/>
+        </p:nvSpPr>
+        <p:spPr>
+          <a:xfrm>
+            <a:off x="698500" y="3989520"/>
+            <a:ext cx="10773500" cy="459134"/>
+          </a:xfrm>
+          <a:prstGeom prst="rect">
+            <a:avLst/>
+          </a:prstGeom>
+          <a:ln w="12700">
+            <a:miter lim="400000"/>
+          </a:ln>
+          <a:extLst>
+            <a:ext uri="{C572A759-6A51-4108-AA02-DFA0A04FC94B}">
+              <ma14:wrappingTextBoxFlag xmlns="" xmlns:ma14="http://schemas.microsoft.com/office/mac/drawingml/2011/main" xmlns:a14="http://schemas.microsoft.com/office/drawing/2010/main" xmlns:m="http://schemas.openxmlformats.org/officeDocument/2006/math" val="1"/>
+            </a:ext>
+          </a:extLst>
+        </p:spPr>
+        <p:txBody>
+          <a:bodyPr lIns="0" tIns="0" rIns="0" bIns="0">
+            <a:normAutofit/>
+          </a:bodyPr>
+          <a:lstStyle>
+            <a:lvl1pPr marL="263525" marR="0" indent="-263525" algn="l" defTabSz="719137" rtl="0" latinLnBrk="0">
+              <a:lnSpc>
+                <a:spcPct val="90000"/>
+              </a:lnSpc>
+              <a:spcBef>
+                <a:spcPts val="1200"/>
+              </a:spcBef>
+              <a:spcAft>
+                <a:spcPts val="0"/>
+              </a:spcAft>
+              <a:buClr>
+                <a:schemeClr val="accent1"/>
+              </a:buClr>
+              <a:buSzPct val="100000"/>
+              <a:buFontTx/>
+              <a:buChar char="▪"/>
+              <a:tabLst/>
+              <a:defRPr sz="1600" b="0" i="0" u="none" strike="noStrike" cap="none" spc="0" baseline="0">
+                <a:solidFill>
+                  <a:srgbClr val="000000"/>
+                </a:solidFill>
+                <a:uFillTx/>
+                <a:latin typeface="Arial"/>
+                <a:ea typeface="Arial"/>
+                <a:cs typeface="Arial"/>
+                <a:sym typeface="Arial"/>
+              </a:defRPr>
+            </a:lvl1pPr>
+            <a:lvl2pPr marL="538162" marR="0" indent="-274638" algn="l" defTabSz="719137" rtl="0" latinLnBrk="0">
+              <a:lnSpc>
+                <a:spcPct val="90000"/>
+              </a:lnSpc>
+              <a:spcBef>
+                <a:spcPts val="1200"/>
+              </a:spcBef>
+              <a:spcAft>
+                <a:spcPts val="0"/>
+              </a:spcAft>
+              <a:buClr>
+                <a:schemeClr val="accent1"/>
+              </a:buClr>
+              <a:buSzPct val="100000"/>
+              <a:buFontTx/>
+              <a:buChar char="▪"/>
+              <a:tabLst/>
+              <a:defRPr sz="1600" b="0" i="0" u="none" strike="noStrike" cap="none" spc="0" baseline="0">
+                <a:solidFill>
+                  <a:srgbClr val="000000"/>
+                </a:solidFill>
+                <a:uFillTx/>
+                <a:latin typeface="Arial"/>
+                <a:ea typeface="Arial"/>
+                <a:cs typeface="Arial"/>
+                <a:sym typeface="Arial"/>
+              </a:defRPr>
+            </a:lvl2pPr>
+            <a:lvl3pPr marL="0" marR="0" indent="0" algn="l" defTabSz="719137" rtl="0" latinLnBrk="0">
+              <a:lnSpc>
+                <a:spcPct val="90000"/>
+              </a:lnSpc>
+              <a:spcBef>
+                <a:spcPts val="1200"/>
+              </a:spcBef>
+              <a:spcAft>
+                <a:spcPts val="0"/>
+              </a:spcAft>
+              <a:buClr>
+                <a:schemeClr val="accent1"/>
+              </a:buClr>
+              <a:buSzTx/>
+              <a:buFont typeface="Wingdings"/>
+              <a:buNone/>
+              <a:tabLst/>
+              <a:defRPr sz="1600" b="0" i="0" u="none" strike="noStrike" cap="none" spc="0" baseline="0">
+                <a:solidFill>
+                  <a:srgbClr val="000000"/>
+                </a:solidFill>
+                <a:uFillTx/>
+                <a:latin typeface="Arial"/>
+                <a:ea typeface="Arial"/>
+                <a:cs typeface="Arial"/>
+                <a:sym typeface="Arial"/>
+              </a:defRPr>
+            </a:lvl3pPr>
+            <a:lvl4pPr marL="0" marR="0" indent="0" algn="l" defTabSz="719137" rtl="0" latinLnBrk="0">
+              <a:lnSpc>
+                <a:spcPct val="90000"/>
+              </a:lnSpc>
+              <a:spcBef>
+                <a:spcPts val="1200"/>
+              </a:spcBef>
+              <a:spcAft>
+                <a:spcPts val="0"/>
+              </a:spcAft>
+              <a:buClr>
+                <a:schemeClr val="accent1"/>
+              </a:buClr>
+              <a:buSzTx/>
+              <a:buFont typeface="Wingdings"/>
+              <a:buNone/>
+              <a:tabLst/>
+              <a:defRPr sz="1600" b="0" i="0" u="none" strike="noStrike" cap="none" spc="0" baseline="0">
+                <a:solidFill>
+                  <a:srgbClr val="000000"/>
+                </a:solidFill>
+                <a:uFillTx/>
+                <a:latin typeface="Arial"/>
+                <a:ea typeface="Arial"/>
+                <a:cs typeface="Arial"/>
+                <a:sym typeface="Arial"/>
+              </a:defRPr>
+            </a:lvl4pPr>
+            <a:lvl5pPr marL="263525" marR="0" indent="-263525" algn="l" defTabSz="719137" rtl="0" latinLnBrk="0">
+              <a:lnSpc>
+                <a:spcPct val="90000"/>
+              </a:lnSpc>
+              <a:spcBef>
+                <a:spcPts val="1200"/>
+              </a:spcBef>
+              <a:spcAft>
+                <a:spcPts val="0"/>
+              </a:spcAft>
+              <a:buClr>
+                <a:schemeClr val="accent1"/>
+              </a:buClr>
+              <a:buSzPct val="100000"/>
+              <a:buFont typeface="Wingdings"/>
+              <a:buAutoNum type="arabicPeriod"/>
+              <a:tabLst/>
+              <a:defRPr sz="1600" b="0" i="0" u="none" strike="noStrike" cap="none" spc="0" baseline="0">
+                <a:solidFill>
+                  <a:srgbClr val="000000"/>
+                </a:solidFill>
+                <a:uFillTx/>
+                <a:latin typeface="Arial"/>
+                <a:ea typeface="Arial"/>
+                <a:cs typeface="Arial"/>
+                <a:sym typeface="Arial"/>
+              </a:defRPr>
+            </a:lvl5pPr>
+            <a:lvl6pPr marL="538162" marR="0" indent="-276225" algn="l" defTabSz="719137" rtl="0" latinLnBrk="0">
+              <a:lnSpc>
+                <a:spcPct val="90000"/>
+              </a:lnSpc>
+              <a:spcBef>
+                <a:spcPts val="1200"/>
+              </a:spcBef>
+              <a:spcAft>
+                <a:spcPts val="0"/>
+              </a:spcAft>
+              <a:buClr>
+                <a:schemeClr val="accent1"/>
+              </a:buClr>
+              <a:buSzPct val="100000"/>
+              <a:buFont typeface="Wingdings"/>
+              <a:buAutoNum type="alphaLcPeriod"/>
+              <a:tabLst/>
+              <a:defRPr sz="1600" b="0" i="0" u="none" strike="noStrike" cap="none" spc="0" baseline="0">
+                <a:solidFill>
+                  <a:srgbClr val="000000"/>
+                </a:solidFill>
+                <a:uFillTx/>
+                <a:latin typeface="Arial"/>
+                <a:ea typeface="Arial"/>
+                <a:cs typeface="Arial"/>
+                <a:sym typeface="Arial"/>
+              </a:defRPr>
+            </a:lvl6pPr>
+            <a:lvl7pPr marL="538162" marR="0" indent="-276225" algn="l" defTabSz="719137" rtl="0" latinLnBrk="0">
+              <a:lnSpc>
+                <a:spcPct val="90000"/>
+              </a:lnSpc>
+              <a:spcBef>
+                <a:spcPts val="1200"/>
+              </a:spcBef>
+              <a:spcAft>
+                <a:spcPts val="0"/>
+              </a:spcAft>
+              <a:buClr>
+                <a:schemeClr val="accent1"/>
+              </a:buClr>
+              <a:buSzPct val="100000"/>
+              <a:buFontTx/>
+              <a:buChar char="▪"/>
+              <a:tabLst/>
+              <a:defRPr sz="1600" b="0" i="0" u="none" strike="noStrike" cap="none" spc="0" baseline="0">
+                <a:solidFill>
+                  <a:srgbClr val="000000"/>
+                </a:solidFill>
+                <a:uFillTx/>
+                <a:latin typeface="Arial"/>
+                <a:ea typeface="Arial"/>
+                <a:cs typeface="Arial"/>
+                <a:sym typeface="Arial"/>
+              </a:defRPr>
+            </a:lvl7pPr>
+            <a:lvl8pPr marL="0" marR="0" indent="0" algn="l" defTabSz="719137" rtl="0" latinLnBrk="0">
+              <a:lnSpc>
+                <a:spcPct val="90000"/>
+              </a:lnSpc>
+              <a:spcBef>
+                <a:spcPts val="1200"/>
+              </a:spcBef>
+              <a:spcAft>
+                <a:spcPts val="0"/>
+              </a:spcAft>
+              <a:buClr>
+                <a:schemeClr val="accent1"/>
+              </a:buClr>
+              <a:buSzTx/>
+              <a:buFont typeface="Wingdings"/>
+              <a:buNone/>
+              <a:tabLst/>
+              <a:defRPr sz="1600" b="0" i="0" u="none" strike="noStrike" cap="none" spc="0" baseline="0">
+                <a:solidFill>
+                  <a:srgbClr val="000000"/>
+                </a:solidFill>
+                <a:uFillTx/>
+                <a:latin typeface="Arial"/>
+                <a:ea typeface="Arial"/>
+                <a:cs typeface="Arial"/>
+                <a:sym typeface="Arial"/>
+              </a:defRPr>
+            </a:lvl8pPr>
+            <a:lvl9pPr marL="0" marR="0" indent="0" algn="l" defTabSz="719137" rtl="0" latinLnBrk="0">
+              <a:lnSpc>
+                <a:spcPct val="90000"/>
+              </a:lnSpc>
+              <a:spcBef>
+                <a:spcPts val="1200"/>
+              </a:spcBef>
+              <a:spcAft>
+                <a:spcPts val="0"/>
+              </a:spcAft>
+              <a:buClr>
+                <a:schemeClr val="accent1"/>
+              </a:buClr>
+              <a:buSzTx/>
+              <a:buFont typeface="Wingdings"/>
+              <a:buNone/>
+              <a:tabLst/>
+              <a:defRPr sz="1600" b="0" i="0" u="none" strike="noStrike" cap="none" spc="0" baseline="0">
+                <a:solidFill>
+                  <a:srgbClr val="000000"/>
+                </a:solidFill>
+                <a:uFillTx/>
+                <a:latin typeface="Arial"/>
+                <a:ea typeface="Arial"/>
+                <a:cs typeface="Arial"/>
+                <a:sym typeface="Arial"/>
+              </a:defRPr>
+            </a:lvl9pPr>
+          </a:lstStyle>
+          <a:p>
+            <a:pPr marL="712788" hangingPunct="1">
+              <a:lnSpc>
+                <a:spcPct val="100000"/>
+              </a:lnSpc>
+              <a:buFont typeface="Arial" panose="020B0604020202020204" pitchFamily="34" charset="0"/>
+              <a:buChar char="•"/>
+            </a:pPr>
+            <a:r>
+              <a:rPr lang="en-GB" altLang="zh-CN" sz="2400" dirty="0">
+                <a:latin typeface="Arial" panose="020B0604020202020204" pitchFamily="34" charset="0"/>
+              </a:rPr>
+              <a:t>Average MSE comparison(including outliers)</a:t>
+            </a:r>
+          </a:p>
+        </p:txBody>
+      </p:sp>
+    </p:spTree>
+    <p:extLst>
+      <p:ext uri="{BB962C8B-B14F-4D97-AF65-F5344CB8AC3E}">
+        <p14:creationId xmlns:p14="http://schemas.microsoft.com/office/powerpoint/2010/main" val="2569947764"/>
+      </p:ext>
+    </p:extLst>
+  </p:cSld>
+  <p:clrMapOvr>
+    <a:masterClrMapping/>
+  </p:clrMapOvr>
+  <p:transition spd="med"/>
+</p:sld>
+</file>
+
+<file path=ppt/slides/slide26.xml><?xml version="1.0" encoding="utf-8"?>
+<p:sld xmlns:a="http://schemas.openxmlformats.org/drawingml/2006/main" xmlns:r="http://schemas.openxmlformats.org/officeDocument/2006/relationships" xmlns:p="http://schemas.openxmlformats.org/presentationml/2006/main">
+  <p:cSld>
+    <p:spTree>
+      <p:nvGrpSpPr>
+        <p:cNvPr id="1" name=""/>
+        <p:cNvGrpSpPr/>
+        <p:nvPr/>
+      </p:nvGrpSpPr>
+      <p:grpSpPr>
+        <a:xfrm>
+          <a:off x="0" y="0"/>
+          <a:ext cx="0" cy="0"/>
+          <a:chOff x="0" y="0"/>
+          <a:chExt cx="0" cy="0"/>
+        </a:xfrm>
+      </p:grpSpPr>
+      <p:sp>
+        <p:nvSpPr>
+          <p:cNvPr id="2" name="Title 1">
+            <a:extLst>
+              <a:ext uri="{FF2B5EF4-FFF2-40B4-BE49-F238E27FC236}">
+                <a16:creationId xmlns:a16="http://schemas.microsoft.com/office/drawing/2014/main" id="{FC23EE60-9574-3A75-9B76-DA940A4BD7BA}"/>
+              </a:ext>
+            </a:extLst>
+          </p:cNvPr>
+          <p:cNvSpPr>
+            <a:spLocks noGrp="1"/>
+          </p:cNvSpPr>
+          <p:nvPr>
+            <p:ph type="title"/>
+          </p:nvPr>
+        </p:nvSpPr>
+        <p:spPr>
+          <a:xfrm>
             <a:off x="698500" y="924379"/>
             <a:ext cx="10775071" cy="841255"/>
           </a:xfrm>
@@ -18991,7 +20350,7 @@
 </p:sld>
 </file>
 
-<file path=ppt/slides/slide26.xml><?xml version="1.0" encoding="utf-8"?>
+<file path=ppt/slides/slide27.xml><?xml version="1.0" encoding="utf-8"?>
 <p:sld xmlns:a="http://schemas.openxmlformats.org/drawingml/2006/main" xmlns:r="http://schemas.openxmlformats.org/officeDocument/2006/relationships" xmlns:p="http://schemas.openxmlformats.org/presentationml/2006/main">
   <p:cSld>
     <p:spTree>
@@ -19861,7 +21220,7 @@
           </a:ln>
           <a:extLst>
             <a:ext uri="{C572A759-6A51-4108-AA02-DFA0A04FC94B}">
-              <ma14:wrappingTextBoxFlag xmlns:m="http://schemas.openxmlformats.org/officeDocument/2006/math" xmlns:a14="http://schemas.microsoft.com/office/drawing/2010/main" xmlns:ma14="http://schemas.microsoft.com/office/mac/drawingml/2011/main" xmlns="" val="1"/>
+              <ma14:wrappingTextBoxFlag xmlns="" xmlns:ma14="http://schemas.microsoft.com/office/mac/drawingml/2011/main" xmlns:a14="http://schemas.microsoft.com/office/drawing/2010/main" xmlns:m="http://schemas.openxmlformats.org/officeDocument/2006/math" val="1"/>
             </a:ext>
           </a:extLst>
         </p:spPr>
@@ -22919,6 +24278,25 @@
 </file>
 
 <file path=customXml/item1.xml><?xml version="1.0" encoding="utf-8"?>
+<p:properties xmlns:p="http://schemas.microsoft.com/office/2006/metadata/properties" xmlns:xsi="http://www.w3.org/2001/XMLSchema-instance" xmlns:pc="http://schemas.microsoft.com/office/infopath/2007/PartnerControls">
+  <documentManagement>
+    <SharedWithUsers xmlns="4878a322-d110-404d-8591-8977e4f7768d">
+      <UserInfo>
+        <DisplayName>Lea Stritzke</DisplayName>
+        <AccountId>8695</AccountId>
+        <AccountType/>
+      </UserInfo>
+      <UserInfo>
+        <DisplayName>Cas van Gemeren</DisplayName>
+        <AccountId>8697</AccountId>
+        <AccountType/>
+      </UserInfo>
+    </SharedWithUsers>
+  </documentManagement>
+</p:properties>
+</file>
+
+<file path=customXml/item2.xml><?xml version="1.0" encoding="utf-8"?>
 <ct:contentTypeSchema xmlns:ct="http://schemas.microsoft.com/office/2006/metadata/contentType" xmlns:ma="http://schemas.microsoft.com/office/2006/metadata/properties/metaAttributes" ct:_="" ma:_="" ma:contentTypeName="Document" ma:contentTypeID="0x01010051ED4DCF60591A44AAB3EE560AB47ABB" ma:contentTypeVersion="4" ma:contentTypeDescription="Een nieuw document maken." ma:contentTypeScope="" ma:versionID="82ac3a51116a7e2a5ddbdd1ed37f67c1">
   <xsd:schema xmlns:xsd="http://www.w3.org/2001/XMLSchema" xmlns:xs="http://www.w3.org/2001/XMLSchema" xmlns:p="http://schemas.microsoft.com/office/2006/metadata/properties" xmlns:ns2="0fee4eeb-e725-4e09-a2c6-b2e7e1963b2c" xmlns:ns3="4878a322-d110-404d-8591-8977e4f7768d" targetNamespace="http://schemas.microsoft.com/office/2006/metadata/properties" ma:root="true" ma:fieldsID="d0d60f5b3da63a431ec21b1780a4f539" ns2:_="" ns3:_="">
     <xsd:import namespace="0fee4eeb-e725-4e09-a2c6-b2e7e1963b2c"/>
@@ -23083,25 +24461,6 @@
 </ct:contentTypeSchema>
 </file>
 
-<file path=customXml/item2.xml><?xml version="1.0" encoding="utf-8"?>
-<p:properties xmlns:p="http://schemas.microsoft.com/office/2006/metadata/properties" xmlns:xsi="http://www.w3.org/2001/XMLSchema-instance" xmlns:pc="http://schemas.microsoft.com/office/infopath/2007/PartnerControls">
-  <documentManagement>
-    <SharedWithUsers xmlns="4878a322-d110-404d-8591-8977e4f7768d">
-      <UserInfo>
-        <DisplayName>Lea Stritzke</DisplayName>
-        <AccountId>8695</AccountId>
-        <AccountType/>
-      </UserInfo>
-      <UserInfo>
-        <DisplayName>Cas van Gemeren</DisplayName>
-        <AccountId>8697</AccountId>
-        <AccountType/>
-      </UserInfo>
-    </SharedWithUsers>
-  </documentManagement>
-</p:properties>
-</file>
-
 <file path=customXml/item3.xml><?xml version="1.0" encoding="utf-8"?>
 <?mso-contentType ?>
 <FormTemplates xmlns="http://schemas.microsoft.com/sharepoint/v3/contenttype/forms">
@@ -23112,6 +24471,23 @@
 </file>
 
 <file path=customXml/itemProps1.xml><?xml version="1.0" encoding="utf-8"?>
+<ds:datastoreItem xmlns:ds="http://schemas.openxmlformats.org/officeDocument/2006/customXml" ds:itemID="{F5C1CCE6-C8A7-4511-AAE7-C62DEFECE697}">
+  <ds:schemaRefs>
+    <ds:schemaRef ds:uri="http://schemas.microsoft.com/office/2006/documentManagement/types"/>
+    <ds:schemaRef ds:uri="http://schemas.microsoft.com/office/infopath/2007/PartnerControls"/>
+    <ds:schemaRef ds:uri="http://www.w3.org/XML/1998/namespace"/>
+    <ds:schemaRef ds:uri="http://purl.org/dc/elements/1.1/"/>
+    <ds:schemaRef ds:uri="4878a322-d110-404d-8591-8977e4f7768d"/>
+    <ds:schemaRef ds:uri="http://purl.org/dc/dcmitype/"/>
+    <ds:schemaRef ds:uri="http://schemas.microsoft.com/office/2006/metadata/properties"/>
+    <ds:schemaRef ds:uri="http://purl.org/dc/terms/"/>
+    <ds:schemaRef ds:uri="http://schemas.openxmlformats.org/package/2006/metadata/core-properties"/>
+    <ds:schemaRef ds:uri="0fee4eeb-e725-4e09-a2c6-b2e7e1963b2c"/>
+  </ds:schemaRefs>
+</ds:datastoreItem>
+</file>
+
+<file path=customXml/itemProps2.xml><?xml version="1.0" encoding="utf-8"?>
 <ds:datastoreItem xmlns:ds="http://schemas.openxmlformats.org/officeDocument/2006/customXml" ds:itemID="{9AEE24FF-1891-44AF-970D-42F00AEE0D7A}">
   <ds:schemaRefs>
     <ds:schemaRef ds:uri="0fee4eeb-e725-4e09-a2c6-b2e7e1963b2c"/>
@@ -23130,23 +24506,6 @@
 </ds:datastoreItem>
 </file>
 
-<file path=customXml/itemProps2.xml><?xml version="1.0" encoding="utf-8"?>
-<ds:datastoreItem xmlns:ds="http://schemas.openxmlformats.org/officeDocument/2006/customXml" ds:itemID="{F5C1CCE6-C8A7-4511-AAE7-C62DEFECE697}">
-  <ds:schemaRefs>
-    <ds:schemaRef ds:uri="http://schemas.microsoft.com/office/2006/documentManagement/types"/>
-    <ds:schemaRef ds:uri="http://schemas.microsoft.com/office/infopath/2007/PartnerControls"/>
-    <ds:schemaRef ds:uri="http://www.w3.org/XML/1998/namespace"/>
-    <ds:schemaRef ds:uri="http://purl.org/dc/elements/1.1/"/>
-    <ds:schemaRef ds:uri="4878a322-d110-404d-8591-8977e4f7768d"/>
-    <ds:schemaRef ds:uri="http://purl.org/dc/dcmitype/"/>
-    <ds:schemaRef ds:uri="http://schemas.microsoft.com/office/2006/metadata/properties"/>
-    <ds:schemaRef ds:uri="http://purl.org/dc/terms/"/>
-    <ds:schemaRef ds:uri="http://schemas.openxmlformats.org/package/2006/metadata/core-properties"/>
-    <ds:schemaRef ds:uri="0fee4eeb-e725-4e09-a2c6-b2e7e1963b2c"/>
-  </ds:schemaRefs>
-</ds:datastoreItem>
-</file>
-
 <file path=customXml/itemProps3.xml><?xml version="1.0" encoding="utf-8"?>
 <ds:datastoreItem xmlns:ds="http://schemas.openxmlformats.org/officeDocument/2006/customXml" ds:itemID="{AA0E60D1-47F0-4938-95EF-8D82199D5953}">
   <ds:schemaRefs>

</xml_diff>